<commit_message>
modify the footer style
</commit_message>
<xml_diff>
--- a/CSS/CSS.pptx
+++ b/CSS/CSS.pptx
@@ -7367,6 +7367,19 @@
           <a:bodyPr/>
           <a:lstStyle/>
           <a:p>
+            <a:r>
+              <a:rPr lang="en-US" dirty="0" smtClean="0"/>
+              <a:t>Different style source </a:t>
+            </a:r>
+          </a:p>
+          <a:p>
+            <a:pPr lvl="1"/>
+            <a:r>
+              <a:rPr lang="en-US" dirty="0" smtClean="0"/>
+              <a:t>User, Browser, Author</a:t>
+            </a:r>
+          </a:p>
+          <a:p>
             <a:endParaRPr lang="en-US" dirty="0"/>
           </a:p>
         </p:txBody>
@@ -7425,7 +7438,11 @@
           <a:p>
             <a:r>
               <a:rPr lang="en-US" dirty="0" smtClean="0"/>
-              <a:t>Ways to use CSS</a:t>
+              <a:t>Ways to </a:t>
+            </a:r>
+            <a:r>
+              <a:rPr lang="en-US" dirty="0" smtClean="0"/>
+              <a:t>write CSS</a:t>
             </a:r>
             <a:endParaRPr lang="en-US" dirty="0"/>
           </a:p>
@@ -7534,7 +7551,43 @@
           <a:bodyPr/>
           <a:lstStyle/>
           <a:p>
-            <a:endParaRPr lang="en-US"/>
+            <a:r>
+              <a:rPr lang="en-US" dirty="0" smtClean="0"/>
+              <a:t>UA declaration</a:t>
+            </a:r>
+          </a:p>
+          <a:p>
+            <a:r>
+              <a:rPr lang="en-US" dirty="0" smtClean="0"/>
+              <a:t>User normal declaration</a:t>
+            </a:r>
+          </a:p>
+          <a:p>
+            <a:r>
+              <a:rPr lang="en-US" dirty="0" smtClean="0"/>
+              <a:t>Author normal declaration</a:t>
+            </a:r>
+          </a:p>
+          <a:p>
+            <a:pPr lvl="1"/>
+            <a:r>
+              <a:rPr lang="en-US" dirty="0" smtClean="0"/>
+              <a:t>Inline, internal, external</a:t>
+            </a:r>
+            <a:endParaRPr lang="en-US" dirty="0" smtClean="0"/>
+          </a:p>
+          <a:p>
+            <a:r>
+              <a:rPr lang="en-US" dirty="0" smtClean="0"/>
+              <a:t>User important declaration</a:t>
+            </a:r>
+          </a:p>
+          <a:p>
+            <a:r>
+              <a:rPr lang="en-US" dirty="0" smtClean="0"/>
+              <a:t>Author important declaration</a:t>
+            </a:r>
+            <a:endParaRPr lang="en-US" dirty="0"/>
           </a:p>
         </p:txBody>
       </p:sp>
@@ -7613,10 +7666,70 @@
           <a:bodyPr/>
           <a:lstStyle/>
           <a:p>
-            <a:endParaRPr lang="en-US"/>
-          </a:p>
-        </p:txBody>
-      </p:sp>
+            <a:r>
+              <a:rPr lang="en-US" dirty="0" smtClean="0"/>
+              <a:t>Button</a:t>
+            </a:r>
+          </a:p>
+          <a:p>
+            <a:pPr lvl="1"/>
+            <a:r>
+              <a:rPr lang="en-US" dirty="0" smtClean="0"/>
+              <a:t>Box model</a:t>
+            </a:r>
+          </a:p>
+          <a:p>
+            <a:pPr lvl="2"/>
+            <a:r>
+              <a:rPr lang="en-US" dirty="0" smtClean="0"/>
+              <a:t>Border, padding, margin</a:t>
+            </a:r>
+            <a:r>
+              <a:rPr lang="en-US" dirty="0" smtClean="0"/>
+              <a:t>, width, height</a:t>
+            </a:r>
+          </a:p>
+          <a:p>
+            <a:pPr lvl="1"/>
+            <a:r>
+              <a:rPr lang="en-US" dirty="0" smtClean="0"/>
+              <a:t>Background style</a:t>
+            </a:r>
+          </a:p>
+          <a:p>
+            <a:pPr lvl="1"/>
+            <a:r>
+              <a:rPr lang="en-US" dirty="0" smtClean="0"/>
+              <a:t>Text style</a:t>
+            </a:r>
+            <a:endParaRPr lang="en-US" dirty="0" smtClean="0"/>
+          </a:p>
+        </p:txBody>
+      </p:sp>
+      <p:pic>
+        <p:nvPicPr>
+          <p:cNvPr id="4" name="Picture 3"/>
+          <p:cNvPicPr>
+            <a:picLocks noChangeAspect="1"/>
+          </p:cNvPicPr>
+          <p:nvPr/>
+        </p:nvPicPr>
+        <p:blipFill>
+          <a:blip r:embed="rId2"/>
+          <a:stretch>
+            <a:fillRect/>
+          </a:stretch>
+        </p:blipFill>
+        <p:spPr>
+          <a:xfrm>
+            <a:off x="2767495" y="4134294"/>
+            <a:ext cx="3568700" cy="965200"/>
+          </a:xfrm>
+          <a:prstGeom prst="rect">
+            <a:avLst/>
+          </a:prstGeom>
+        </p:spPr>
+      </p:pic>
     </p:spTree>
     <p:extLst>
       <p:ext uri="{BB962C8B-B14F-4D97-AF65-F5344CB8AC3E}">
@@ -7725,17 +7838,61 @@
           <a:p>
             <a:pPr lvl="1"/>
             <a:r>
-              <a:rPr lang="en-US" dirty="0"/>
-              <a:t>a</a:t>
-            </a:r>
-            <a:r>
-              <a:rPr lang="en-US" dirty="0" smtClean="0"/>
-              <a:t>bsolute, relative, static, fix</a:t>
-            </a:r>
-            <a:endParaRPr lang="en-US" dirty="0"/>
-          </a:p>
-        </p:txBody>
-      </p:sp>
+              <a:rPr lang="en-US" dirty="0" smtClean="0"/>
+              <a:t>Absolute</a:t>
+            </a:r>
+          </a:p>
+          <a:p>
+            <a:pPr lvl="1"/>
+            <a:r>
+              <a:rPr lang="en-US" dirty="0" smtClean="0"/>
+              <a:t>R</a:t>
+            </a:r>
+            <a:r>
+              <a:rPr lang="en-US" dirty="0" smtClean="0"/>
+              <a:t>elative</a:t>
+            </a:r>
+          </a:p>
+          <a:p>
+            <a:pPr lvl="1"/>
+            <a:r>
+              <a:rPr lang="en-US" dirty="0" smtClean="0"/>
+              <a:t>Static</a:t>
+            </a:r>
+          </a:p>
+          <a:p>
+            <a:pPr lvl="1"/>
+            <a:r>
+              <a:rPr lang="en-US" dirty="0" smtClean="0"/>
+              <a:t>Fix</a:t>
+            </a:r>
+          </a:p>
+        </p:txBody>
+      </p:sp>
+      <p:pic>
+        <p:nvPicPr>
+          <p:cNvPr id="4" name="Picture 3"/>
+          <p:cNvPicPr>
+            <a:picLocks noChangeAspect="1"/>
+          </p:cNvPicPr>
+          <p:nvPr/>
+        </p:nvPicPr>
+        <p:blipFill>
+          <a:blip r:embed="rId2"/>
+          <a:stretch>
+            <a:fillRect/>
+          </a:stretch>
+        </p:blipFill>
+        <p:spPr>
+          <a:xfrm>
+            <a:off x="2797899" y="2154042"/>
+            <a:ext cx="4618033" cy="3665283"/>
+          </a:xfrm>
+          <a:prstGeom prst="rect">
+            <a:avLst/>
+          </a:prstGeom>
+        </p:spPr>
+      </p:pic>
     </p:spTree>
     <p:extLst>
       <p:ext uri="{BB962C8B-B14F-4D97-AF65-F5344CB8AC3E}">
@@ -7914,7 +8071,7 @@
         <p:spPr/>
         <p:txBody>
           <a:bodyPr>
-            <a:normAutofit lnSpcReduction="10000"/>
+            <a:normAutofit fontScale="85000" lnSpcReduction="20000"/>
           </a:bodyPr>
           <a:lstStyle/>
           <a:p>
@@ -7962,7 +8119,17 @@
           <a:p>
             <a:r>
               <a:rPr lang="en-US" dirty="0" smtClean="0"/>
-              <a:t>Multiple Column Layout</a:t>
+              <a:t>Multiple Column </a:t>
+            </a:r>
+            <a:r>
+              <a:rPr lang="en-US" dirty="0" smtClean="0"/>
+              <a:t>Layout</a:t>
+            </a:r>
+          </a:p>
+          <a:p>
+            <a:r>
+              <a:rPr lang="en-US" dirty="0" smtClean="0"/>
+              <a:t>…</a:t>
             </a:r>
             <a:endParaRPr lang="en-US" dirty="0"/>
           </a:p>
@@ -8057,6 +8224,58 @@
           </a:p>
         </p:txBody>
       </p:sp>
+      <p:sp>
+        <p:nvSpPr>
+          <p:cNvPr id="4" name="Rectangle 3"/>
+          <p:cNvSpPr/>
+          <p:nvPr/>
+        </p:nvSpPr>
+        <p:spPr>
+          <a:xfrm>
+            <a:off x="77223" y="5121030"/>
+            <a:ext cx="9820871" cy="646331"/>
+          </a:xfrm>
+          <a:prstGeom prst="rect">
+            <a:avLst/>
+          </a:prstGeom>
+        </p:spPr>
+        <p:txBody>
+          <a:bodyPr wrap="square">
+            <a:spAutoFit/>
+          </a:bodyPr>
+          <a:lstStyle/>
+          <a:p>
+            <a:r>
+              <a:rPr lang="en-US" dirty="0">
+                <a:hlinkClick r:id="rId2"/>
+              </a:rPr>
+              <a:t>http://</a:t>
+            </a:r>
+            <a:r>
+              <a:rPr lang="en-US" dirty="0" err="1">
+                <a:hlinkClick r:id="rId2"/>
+              </a:rPr>
+              <a:t>www.realcommercial.com.au</a:t>
+            </a:r>
+            <a:r>
+              <a:rPr lang="en-US" dirty="0">
+                <a:hlinkClick r:id="rId2"/>
+              </a:rPr>
+              <a:t>/for-lease/map-1?includeSurrounding=</a:t>
+            </a:r>
+            <a:r>
+              <a:rPr lang="en-US" dirty="0" smtClean="0">
+                <a:hlinkClick r:id="rId2"/>
+              </a:rPr>
+              <a:t>false</a:t>
+            </a:r>
+            <a:endParaRPr lang="en-US" dirty="0"/>
+          </a:p>
+          <a:p>
+            <a:endParaRPr lang="en-US" dirty="0" smtClean="0"/>
+          </a:p>
+        </p:txBody>
+      </p:sp>
     </p:spTree>
     <p:extLst>
       <p:ext uri="{BB962C8B-B14F-4D97-AF65-F5344CB8AC3E}">
@@ -8102,7 +8321,11 @@
           <a:bodyPr/>
           <a:lstStyle/>
           <a:p>
-            <a:endParaRPr lang="en-US"/>
+            <a:r>
+              <a:rPr lang="en-US" dirty="0" smtClean="0"/>
+              <a:t>References</a:t>
+            </a:r>
+            <a:endParaRPr lang="en-US" dirty="0"/>
           </a:p>
         </p:txBody>
       </p:sp>
@@ -8119,7 +8342,7 @@
         <p:spPr/>
         <p:txBody>
           <a:bodyPr>
-            <a:normAutofit fontScale="92500" lnSpcReduction="10000"/>
+            <a:normAutofit fontScale="77500" lnSpcReduction="20000"/>
           </a:bodyPr>
           <a:lstStyle/>
           <a:p>
@@ -8216,6 +8439,45 @@
               </a:rPr>
               <a:t>/</a:t>
             </a:r>
+            <a:endParaRPr lang="en-US" dirty="0"/>
+          </a:p>
+          <a:p>
+            <a:r>
+              <a:rPr lang="en-US" dirty="0">
+                <a:hlinkClick r:id="rId8"/>
+              </a:rPr>
+              <a:t>http://www.vanseodesign.com/css/understanding-css-</a:t>
+            </a:r>
+            <a:r>
+              <a:rPr lang="en-US">
+                <a:hlinkClick r:id="rId8"/>
+              </a:rPr>
+              <a:t>floats</a:t>
+            </a:r>
+            <a:r>
+              <a:rPr lang="en-US" smtClean="0">
+                <a:hlinkClick r:id="rId8"/>
+              </a:rPr>
+              <a:t>/</a:t>
+            </a:r>
+            <a:endParaRPr lang="en-US" dirty="0" smtClean="0"/>
+          </a:p>
+          <a:p>
+            <a:r>
+              <a:rPr lang="hu-HU" dirty="0">
+                <a:hlinkClick r:id="rId9"/>
+              </a:rPr>
+              <a:t>http://w3help.org/zh-cn/kb/</a:t>
+            </a:r>
+            <a:r>
+              <a:rPr lang="hu-HU" dirty="0" smtClean="0">
+                <a:hlinkClick r:id="rId9"/>
+              </a:rPr>
+              <a:t>index.html</a:t>
+            </a:r>
+            <a:endParaRPr lang="hu-HU" dirty="0" smtClean="0"/>
+          </a:p>
+          <a:p>
             <a:endParaRPr lang="en-US" dirty="0" smtClean="0"/>
           </a:p>
           <a:p>
@@ -8289,7 +8551,19 @@
           <a:p>
             <a:r>
               <a:rPr lang="en-US" dirty="0" smtClean="0"/>
-              <a:t>How did browser present</a:t>
+              <a:t>How </a:t>
+            </a:r>
+            <a:r>
+              <a:rPr lang="en-US" dirty="0" smtClean="0"/>
+              <a:t>is</a:t>
+            </a:r>
+            <a:r>
+              <a:rPr lang="en-US" dirty="0" smtClean="0"/>
+              <a:t> </a:t>
+            </a:r>
+            <a:r>
+              <a:rPr lang="en-US" dirty="0" smtClean="0"/>
+              <a:t>browser present</a:t>
             </a:r>
             <a:endParaRPr lang="en-US" dirty="0"/>
           </a:p>
@@ -8310,6 +8584,16 @@
           <a:bodyPr/>
           <a:lstStyle/>
           <a:p>
+            <a:r>
+              <a:rPr lang="en-US" dirty="0" smtClean="0"/>
+              <a:t>Box</a:t>
+            </a:r>
+          </a:p>
+          <a:p>
+            <a:r>
+              <a:rPr lang="en-US" dirty="0" smtClean="0"/>
+              <a:t>Document flow</a:t>
+            </a:r>
             <a:endParaRPr lang="en-US" dirty="0"/>
           </a:p>
         </p:txBody>
@@ -8324,6 +8608,13 @@
   <p:clrMapOvr>
     <a:masterClrMapping/>
   </p:clrMapOvr>
+  <p:timing>
+    <p:tnLst>
+      <p:par>
+        <p:cTn xmlns:p14="http://schemas.microsoft.com/office/powerpoint/2010/main" id="1" dur="indefinite" restart="never" nodeType="tmRoot"/>
+      </p:par>
+    </p:tnLst>
+  </p:timing>
 </p:sld>
 </file>
 
@@ -8404,6 +8695,30 @@
           </a:p>
         </p:txBody>
       </p:sp>
+      <p:pic>
+        <p:nvPicPr>
+          <p:cNvPr id="4" name="Picture 3"/>
+          <p:cNvPicPr>
+            <a:picLocks noChangeAspect="1"/>
+          </p:cNvPicPr>
+          <p:nvPr/>
+        </p:nvPicPr>
+        <p:blipFill>
+          <a:blip r:embed="rId2"/>
+          <a:stretch>
+            <a:fillRect/>
+          </a:stretch>
+        </p:blipFill>
+        <p:spPr>
+          <a:xfrm>
+            <a:off x="3107157" y="2113157"/>
+            <a:ext cx="4954890" cy="4146511"/>
+          </a:xfrm>
+          <a:prstGeom prst="rect">
+            <a:avLst/>
+          </a:prstGeom>
+        </p:spPr>
+      </p:pic>
     </p:spTree>
     <p:extLst>
       <p:ext uri="{BB962C8B-B14F-4D97-AF65-F5344CB8AC3E}">
@@ -8480,18 +8795,20 @@
           <a:lstStyle/>
           <a:p>
             <a:r>
-              <a:rPr lang="en-US" dirty="0"/>
-              <a:t>b</a:t>
-            </a:r>
-            <a:r>
-              <a:rPr lang="en-US" dirty="0" smtClean="0"/>
-              <a:t>lock, inline</a:t>
-            </a:r>
-          </a:p>
-          <a:p>
-            <a:r>
-              <a:rPr lang="en-US" dirty="0" smtClean="0"/>
-              <a:t>float, position</a:t>
+              <a:rPr lang="en-US" dirty="0" smtClean="0"/>
+              <a:t>block, inline</a:t>
+            </a:r>
+          </a:p>
+          <a:p>
+            <a:r>
+              <a:rPr lang="en-US" dirty="0" smtClean="0"/>
+              <a:t>float</a:t>
+            </a:r>
+          </a:p>
+          <a:p>
+            <a:r>
+              <a:rPr lang="en-US" dirty="0" smtClean="0"/>
+              <a:t>position</a:t>
             </a:r>
             <a:endParaRPr lang="en-US" dirty="0"/>
           </a:p>

</xml_diff>

<commit_message>
remove some of the content
</commit_message>
<xml_diff>
--- a/CSS/CSS.pptx
+++ b/CSS/CSS.pptx
@@ -5,31 +5,27 @@
     <p:sldMasterId id="2147483660" r:id="rId1"/>
   </p:sldMasterIdLst>
   <p:notesMasterIdLst>
-    <p:notesMasterId r:id="rId24"/>
+    <p:notesMasterId r:id="rId20"/>
   </p:notesMasterIdLst>
   <p:sldIdLst>
     <p:sldId id="256" r:id="rId2"/>
     <p:sldId id="268" r:id="rId3"/>
     <p:sldId id="265" r:id="rId4"/>
-    <p:sldId id="266" r:id="rId5"/>
-    <p:sldId id="257" r:id="rId6"/>
-    <p:sldId id="277" r:id="rId7"/>
-    <p:sldId id="261" r:id="rId8"/>
-    <p:sldId id="262" r:id="rId9"/>
-    <p:sldId id="273" r:id="rId10"/>
+    <p:sldId id="278" r:id="rId5"/>
+    <p:sldId id="266" r:id="rId6"/>
+    <p:sldId id="257" r:id="rId7"/>
+    <p:sldId id="277" r:id="rId8"/>
+    <p:sldId id="261" r:id="rId9"/>
+    <p:sldId id="262" r:id="rId10"/>
     <p:sldId id="269" r:id="rId11"/>
     <p:sldId id="258" r:id="rId12"/>
     <p:sldId id="270" r:id="rId13"/>
-    <p:sldId id="264" r:id="rId14"/>
-    <p:sldId id="259" r:id="rId15"/>
-    <p:sldId id="274" r:id="rId16"/>
-    <p:sldId id="275" r:id="rId17"/>
-    <p:sldId id="276" r:id="rId18"/>
-    <p:sldId id="260" r:id="rId19"/>
-    <p:sldId id="272" r:id="rId20"/>
-    <p:sldId id="263" r:id="rId21"/>
-    <p:sldId id="271" r:id="rId22"/>
-    <p:sldId id="267" r:id="rId23"/>
+    <p:sldId id="259" r:id="rId14"/>
+    <p:sldId id="274" r:id="rId15"/>
+    <p:sldId id="275" r:id="rId16"/>
+    <p:sldId id="272" r:id="rId17"/>
+    <p:sldId id="263" r:id="rId18"/>
+    <p:sldId id="267" r:id="rId19"/>
   </p:sldIdLst>
   <p:sldSz cx="9144000" cy="6858000" type="screen4x3"/>
   <p:notesSz cx="6858000" cy="9144000"/>
@@ -642,7 +638,7 @@
           <a:p>
             <a:fld id="{653F4CEA-1515-664B-98C0-DFC136CA012D}" type="slidenum">
               <a:rPr lang="en-US" smtClean="0"/>
-              <a:t>15</a:t>
+              <a:t>14</a:t>
             </a:fld>
             <a:endParaRPr lang="en-US"/>
           </a:p>
@@ -705,39 +701,11 @@
           <a:bodyPr/>
           <a:lstStyle/>
           <a:p>
-            <a:pPr marL="228600" indent="-228600">
-              <a:buAutoNum type="arabicPeriod"/>
-            </a:pPr>
-            <a:r>
-              <a:rPr lang="en-US" dirty="0" smtClean="0"/>
-              <a:t>h1, h2, h3 {}</a:t>
-            </a:r>
-          </a:p>
-          <a:p>
-            <a:pPr marL="228600" indent="-228600">
-              <a:buAutoNum type="arabicPeriod"/>
-            </a:pPr>
-            <a:r>
-              <a:rPr lang="en-US" dirty="0" smtClean="0"/>
-              <a:t>Use margin:</a:t>
-            </a:r>
-            <a:r>
-              <a:rPr lang="en-US" baseline="0" dirty="0" smtClean="0"/>
-              <a:t> 3px 0; instead of </a:t>
-            </a:r>
-            <a:r>
-              <a:rPr lang="en-US" dirty="0" smtClean="0"/>
-              <a:t>margin-top,</a:t>
-            </a:r>
-            <a:r>
-              <a:rPr lang="en-US" baseline="0" dirty="0" smtClean="0"/>
-              <a:t> margin-bottom </a:t>
-            </a:r>
-            <a:r>
-              <a:rPr lang="en-US" baseline="0" dirty="0" err="1" smtClean="0"/>
-              <a:t>seperately</a:t>
-            </a:r>
-            <a:endParaRPr lang="en-US" dirty="0" smtClean="0"/>
+            <a:r>
+              <a:rPr lang="en-US" dirty="0" smtClean="0"/>
+              <a:t>Absolute used with relative</a:t>
+            </a:r>
+            <a:endParaRPr lang="en-US" dirty="0"/>
           </a:p>
         </p:txBody>
       </p:sp>
@@ -758,7 +726,7 @@
           <a:p>
             <a:fld id="{653F4CEA-1515-664B-98C0-DFC136CA012D}" type="slidenum">
               <a:rPr lang="en-US" smtClean="0"/>
-              <a:t>19</a:t>
+              <a:t>15</a:t>
             </a:fld>
             <a:endParaRPr lang="en-US"/>
           </a:p>
@@ -767,7 +735,7 @@
     </p:spTree>
     <p:extLst>
       <p:ext uri="{BB962C8B-B14F-4D97-AF65-F5344CB8AC3E}">
-        <p14:creationId xmlns:p14="http://schemas.microsoft.com/office/powerpoint/2010/main" val="807384520"/>
+        <p14:creationId xmlns:p14="http://schemas.microsoft.com/office/powerpoint/2010/main" val="4037586239"/>
       </p:ext>
     </p:extLst>
   </p:cSld>
@@ -826,6 +794,130 @@
             </a:pPr>
             <a:r>
               <a:rPr lang="en-US" dirty="0" smtClean="0"/>
+              <a:t>h1, h2, h3 {}</a:t>
+            </a:r>
+          </a:p>
+          <a:p>
+            <a:pPr marL="228600" indent="-228600">
+              <a:buAutoNum type="arabicPeriod"/>
+            </a:pPr>
+            <a:r>
+              <a:rPr lang="en-US" dirty="0" smtClean="0"/>
+              <a:t>Use </a:t>
+            </a:r>
+            <a:r>
+              <a:rPr lang="en-US" dirty="0" smtClean="0"/>
+              <a:t>margin:</a:t>
+            </a:r>
+            <a:r>
+              <a:rPr lang="en-US" baseline="0" dirty="0" smtClean="0"/>
+              <a:t> 3px 0; instead of </a:t>
+            </a:r>
+            <a:r>
+              <a:rPr lang="en-US" dirty="0" smtClean="0"/>
+              <a:t>margin-top,</a:t>
+            </a:r>
+            <a:r>
+              <a:rPr lang="en-US" baseline="0" dirty="0" smtClean="0"/>
+              <a:t> margin-</a:t>
+            </a:r>
+            <a:r>
+              <a:rPr lang="en-US" baseline="0" dirty="0" smtClean="0"/>
+              <a:t>bottom </a:t>
+            </a:r>
+            <a:r>
+              <a:rPr lang="en-US" baseline="0" dirty="0" err="1" smtClean="0"/>
+              <a:t>seperately</a:t>
+            </a:r>
+            <a:endParaRPr lang="en-US" dirty="0" smtClean="0"/>
+          </a:p>
+        </p:txBody>
+      </p:sp>
+      <p:sp>
+        <p:nvSpPr>
+          <p:cNvPr id="4" name="Slide Number Placeholder 3"/>
+          <p:cNvSpPr>
+            <a:spLocks noGrp="1"/>
+          </p:cNvSpPr>
+          <p:nvPr>
+            <p:ph type="sldNum" sz="quarter" idx="10"/>
+          </p:nvPr>
+        </p:nvSpPr>
+        <p:spPr/>
+        <p:txBody>
+          <a:bodyPr/>
+          <a:lstStyle/>
+          <a:p>
+            <a:fld id="{653F4CEA-1515-664B-98C0-DFC136CA012D}" type="slidenum">
+              <a:rPr lang="en-US" smtClean="0"/>
+              <a:t>16</a:t>
+            </a:fld>
+            <a:endParaRPr lang="en-US"/>
+          </a:p>
+        </p:txBody>
+      </p:sp>
+    </p:spTree>
+    <p:extLst>
+      <p:ext uri="{BB962C8B-B14F-4D97-AF65-F5344CB8AC3E}">
+        <p14:creationId xmlns:p14="http://schemas.microsoft.com/office/powerpoint/2010/main" val="807384520"/>
+      </p:ext>
+    </p:extLst>
+  </p:cSld>
+  <p:clrMapOvr>
+    <a:masterClrMapping/>
+  </p:clrMapOvr>
+</p:notes>
+</file>
+
+<file path=ppt/notesSlides/notesSlide5.xml><?xml version="1.0" encoding="utf-8"?>
+<p:notes xmlns:a="http://schemas.openxmlformats.org/drawingml/2006/main" xmlns:r="http://schemas.openxmlformats.org/officeDocument/2006/relationships" xmlns:p="http://schemas.openxmlformats.org/presentationml/2006/main">
+  <p:cSld>
+    <p:spTree>
+      <p:nvGrpSpPr>
+        <p:cNvPr id="1" name=""/>
+        <p:cNvGrpSpPr/>
+        <p:nvPr/>
+      </p:nvGrpSpPr>
+      <p:grpSpPr>
+        <a:xfrm>
+          <a:off x="0" y="0"/>
+          <a:ext cx="0" cy="0"/>
+          <a:chOff x="0" y="0"/>
+          <a:chExt cx="0" cy="0"/>
+        </a:xfrm>
+      </p:grpSpPr>
+      <p:sp>
+        <p:nvSpPr>
+          <p:cNvPr id="2" name="Slide Image Placeholder 1"/>
+          <p:cNvSpPr>
+            <a:spLocks noGrp="1" noRot="1" noChangeAspect="1"/>
+          </p:cNvSpPr>
+          <p:nvPr>
+            <p:ph type="sldImg"/>
+          </p:nvPr>
+        </p:nvSpPr>
+        <p:spPr/>
+      </p:sp>
+      <p:sp>
+        <p:nvSpPr>
+          <p:cNvPr id="3" name="Notes Placeholder 2"/>
+          <p:cNvSpPr>
+            <a:spLocks noGrp="1"/>
+          </p:cNvSpPr>
+          <p:nvPr>
+            <p:ph type="body" idx="1"/>
+          </p:nvPr>
+        </p:nvSpPr>
+        <p:spPr/>
+        <p:txBody>
+          <a:bodyPr/>
+          <a:lstStyle/>
+          <a:p>
+            <a:pPr marL="228600" indent="-228600">
+              <a:buAutoNum type="arabicPeriod"/>
+            </a:pPr>
+            <a:r>
+              <a:rPr lang="en-US" dirty="0" smtClean="0"/>
               <a:t>An animation is an effect that lets  an element gradually change from one style to another style</a:t>
             </a:r>
           </a:p>
@@ -947,7 +1039,7 @@
           <a:p>
             <a:fld id="{653F4CEA-1515-664B-98C0-DFC136CA012D}" type="slidenum">
               <a:rPr lang="en-US" smtClean="0"/>
-              <a:t>20</a:t>
+              <a:t>17</a:t>
             </a:fld>
             <a:endParaRPr lang="en-US"/>
           </a:p>
@@ -8219,11 +8311,7 @@
           <a:p>
             <a:r>
               <a:rPr lang="en-US" dirty="0" smtClean="0"/>
-              <a:t> Which </a:t>
-            </a:r>
-            <a:r>
-              <a:rPr lang="en-US" dirty="0" smtClean="0"/>
-              <a:t>style</a:t>
+              <a:t>Single item</a:t>
             </a:r>
             <a:endParaRPr lang="en-US" dirty="0"/>
           </a:p>
@@ -8246,48 +8334,72 @@
           <a:p>
             <a:r>
               <a:rPr lang="en-US" dirty="0" smtClean="0"/>
-              <a:t>UA declaration</a:t>
-            </a:r>
-          </a:p>
-          <a:p>
-            <a:r>
-              <a:rPr lang="en-US" dirty="0" smtClean="0"/>
-              <a:t>User normal declaration</a:t>
-            </a:r>
-          </a:p>
-          <a:p>
-            <a:r>
-              <a:rPr lang="en-US" dirty="0" smtClean="0"/>
-              <a:t>Author normal declaration</a:t>
+              <a:t>Button</a:t>
             </a:r>
           </a:p>
           <a:p>
             <a:pPr lvl="1"/>
             <a:r>
               <a:rPr lang="en-US" dirty="0" smtClean="0"/>
-              <a:t>Inline, internal, external</a:t>
+              <a:t>Box model</a:t>
+            </a:r>
+          </a:p>
+          <a:p>
+            <a:pPr lvl="2"/>
+            <a:r>
+              <a:rPr lang="en-US" dirty="0" smtClean="0"/>
+              <a:t>Border, padding, margin</a:t>
+            </a:r>
+            <a:r>
+              <a:rPr lang="en-US" dirty="0" smtClean="0"/>
+              <a:t>, width, height</a:t>
+            </a:r>
+          </a:p>
+          <a:p>
+            <a:pPr lvl="1"/>
+            <a:r>
+              <a:rPr lang="en-US" dirty="0" smtClean="0"/>
+              <a:t>Background style</a:t>
+            </a:r>
+          </a:p>
+          <a:p>
+            <a:pPr lvl="1"/>
+            <a:r>
+              <a:rPr lang="en-US" dirty="0" smtClean="0"/>
+              <a:t>Text style</a:t>
             </a:r>
             <a:endParaRPr lang="en-US" dirty="0" smtClean="0"/>
           </a:p>
-          <a:p>
-            <a:r>
-              <a:rPr lang="en-US" dirty="0" smtClean="0"/>
-              <a:t>User important declaration</a:t>
-            </a:r>
-          </a:p>
-          <a:p>
-            <a:r>
-              <a:rPr lang="en-US" dirty="0" smtClean="0"/>
-              <a:t>Author important declaration</a:t>
-            </a:r>
-            <a:endParaRPr lang="en-US" dirty="0"/>
-          </a:p>
-        </p:txBody>
-      </p:sp>
+        </p:txBody>
+      </p:sp>
+      <p:pic>
+        <p:nvPicPr>
+          <p:cNvPr id="4" name="Picture 3"/>
+          <p:cNvPicPr>
+            <a:picLocks noChangeAspect="1"/>
+          </p:cNvPicPr>
+          <p:nvPr/>
+        </p:nvPicPr>
+        <p:blipFill>
+          <a:blip r:embed="rId2"/>
+          <a:stretch>
+            <a:fillRect/>
+          </a:stretch>
+        </p:blipFill>
+        <p:spPr>
+          <a:xfrm>
+            <a:off x="2767495" y="4134294"/>
+            <a:ext cx="3568700" cy="965200"/>
+          </a:xfrm>
+          <a:prstGeom prst="rect">
+            <a:avLst/>
+          </a:prstGeom>
+        </p:spPr>
+      </p:pic>
     </p:spTree>
     <p:extLst>
       <p:ext uri="{BB962C8B-B14F-4D97-AF65-F5344CB8AC3E}">
-        <p14:creationId xmlns:p14="http://schemas.microsoft.com/office/powerpoint/2010/main" val="1185137528"/>
+        <p14:creationId xmlns:p14="http://schemas.microsoft.com/office/powerpoint/2010/main" val="283046464"/>
       </p:ext>
     </p:extLst>
   </p:cSld>
@@ -8338,7 +8450,7 @@
           <a:p>
             <a:r>
               <a:rPr lang="en-US" dirty="0" smtClean="0"/>
-              <a:t>Single item</a:t>
+              <a:t>Location(1)</a:t>
             </a:r>
             <a:endParaRPr lang="en-US" dirty="0"/>
           </a:p>
@@ -8361,62 +8473,135 @@
           <a:p>
             <a:r>
               <a:rPr lang="en-US" dirty="0" smtClean="0"/>
-              <a:t>Button</a:t>
-            </a:r>
-          </a:p>
-          <a:p>
-            <a:pPr lvl="1"/>
-            <a:r>
-              <a:rPr lang="en-US" dirty="0" smtClean="0"/>
-              <a:t>Box model</a:t>
-            </a:r>
-          </a:p>
-          <a:p>
-            <a:pPr lvl="2"/>
-            <a:r>
-              <a:rPr lang="en-US" dirty="0" smtClean="0"/>
-              <a:t>Border, padding, margin</a:t>
-            </a:r>
-            <a:r>
-              <a:rPr lang="en-US" dirty="0" smtClean="0"/>
-              <a:t>, width, height</a:t>
-            </a:r>
-          </a:p>
-          <a:p>
-            <a:pPr lvl="1"/>
-            <a:r>
-              <a:rPr lang="en-US" dirty="0" smtClean="0"/>
-              <a:t>Background style</a:t>
-            </a:r>
-          </a:p>
-          <a:p>
-            <a:pPr lvl="1"/>
-            <a:r>
-              <a:rPr lang="en-US" dirty="0" smtClean="0"/>
-              <a:t>Text style</a:t>
-            </a:r>
-            <a:endParaRPr lang="en-US" dirty="0" smtClean="0"/>
+              <a:t>Float</a:t>
+            </a:r>
+          </a:p>
+        </p:txBody>
+      </p:sp>
+      <p:sp>
+        <p:nvSpPr>
+          <p:cNvPr id="4" name="Rectangle 3"/>
+          <p:cNvSpPr/>
+          <p:nvPr/>
+        </p:nvSpPr>
+        <p:spPr>
+          <a:xfrm>
+            <a:off x="291541" y="2867259"/>
+            <a:ext cx="5513752" cy="1200329"/>
+          </a:xfrm>
+          <a:prstGeom prst="rect">
+            <a:avLst/>
+          </a:prstGeom>
+        </p:spPr>
+        <p:txBody>
+          <a:bodyPr wrap="square">
+            <a:spAutoFit/>
+          </a:bodyPr>
+          <a:lstStyle/>
+          <a:p>
+            <a:r>
+              <a:rPr lang="en-US" dirty="0" smtClean="0"/>
+              <a:t>&lt;section&gt;</a:t>
+            </a:r>
+          </a:p>
+          <a:p>
+            <a:r>
+              <a:rPr lang="en-US" dirty="0" smtClean="0"/>
+              <a:t>  &lt;span&gt; I want button on the left &lt;/span&gt;</a:t>
+            </a:r>
+          </a:p>
+          <a:p>
+            <a:r>
+              <a:rPr lang="en-US" dirty="0" smtClean="0"/>
+              <a:t>  &lt;input type="submit" class="button"/&gt;</a:t>
+            </a:r>
+          </a:p>
+          <a:p>
+            <a:r>
+              <a:rPr lang="en-US" dirty="0" smtClean="0"/>
+              <a:t>&lt;/section&gt;</a:t>
+            </a:r>
+            <a:endParaRPr lang="en-US" dirty="0"/>
+          </a:p>
+        </p:txBody>
+      </p:sp>
+      <p:sp>
+        <p:nvSpPr>
+          <p:cNvPr id="5" name="Rectangle 4"/>
+          <p:cNvSpPr/>
+          <p:nvPr/>
+        </p:nvSpPr>
+        <p:spPr>
+          <a:xfrm>
+            <a:off x="5313090" y="2509982"/>
+            <a:ext cx="3304972" cy="1754327"/>
+          </a:xfrm>
+          <a:prstGeom prst="rect">
+            <a:avLst/>
+          </a:prstGeom>
+        </p:spPr>
+        <p:txBody>
+          <a:bodyPr wrap="square">
+            <a:spAutoFit/>
+          </a:bodyPr>
+          <a:lstStyle/>
+          <a:p>
+            <a:r>
+              <a:rPr lang="en-US" dirty="0"/>
+              <a:t>span {</a:t>
+            </a:r>
+          </a:p>
+          <a:p>
+            <a:r>
+              <a:rPr lang="en-US" dirty="0"/>
+              <a:t>  background: #00ff00;</a:t>
+            </a:r>
+          </a:p>
+          <a:p>
+            <a:r>
+              <a:rPr lang="en-US" dirty="0" smtClean="0"/>
+              <a:t>}</a:t>
+            </a:r>
+            <a:endParaRPr lang="en-US" dirty="0"/>
+          </a:p>
+          <a:p>
+            <a:r>
+              <a:rPr lang="en-US" dirty="0"/>
+              <a:t>.button {</a:t>
+            </a:r>
+          </a:p>
+          <a:p>
+            <a:r>
+              <a:rPr lang="en-US" dirty="0"/>
+              <a:t>  float: left;</a:t>
+            </a:r>
+          </a:p>
+          <a:p>
+            <a:r>
+              <a:rPr lang="en-US" dirty="0"/>
+              <a:t>}</a:t>
+            </a:r>
           </a:p>
         </p:txBody>
       </p:sp>
       <p:pic>
         <p:nvPicPr>
-          <p:cNvPr id="4" name="Picture 3"/>
+          <p:cNvPr id="6" name="Picture 5"/>
           <p:cNvPicPr>
             <a:picLocks noChangeAspect="1"/>
           </p:cNvPicPr>
           <p:nvPr/>
         </p:nvPicPr>
         <p:blipFill>
-          <a:blip r:embed="rId2"/>
+          <a:blip r:embed="rId3"/>
           <a:stretch>
             <a:fillRect/>
           </a:stretch>
         </p:blipFill>
         <p:spPr>
           <a:xfrm>
-            <a:off x="2767495" y="4134294"/>
-            <a:ext cx="3568700" cy="965200"/>
+            <a:off x="2731606" y="4925007"/>
+            <a:ext cx="3708400" cy="419100"/>
           </a:xfrm>
           <a:prstGeom prst="rect">
             <a:avLst/>
@@ -8426,7 +8611,7 @@
     </p:spTree>
     <p:extLst>
       <p:ext uri="{BB962C8B-B14F-4D97-AF65-F5344CB8AC3E}">
-        <p14:creationId xmlns:p14="http://schemas.microsoft.com/office/powerpoint/2010/main" val="283046464"/>
+        <p14:creationId xmlns:p14="http://schemas.microsoft.com/office/powerpoint/2010/main" val="246670905"/>
       </p:ext>
     </p:extLst>
   </p:cSld>
@@ -8477,7 +8662,7 @@
           <a:p>
             <a:r>
               <a:rPr lang="en-US" dirty="0" smtClean="0"/>
-              <a:t>Location(1)</a:t>
+              <a:t>Location(2)</a:t>
             </a:r>
             <a:endParaRPr lang="en-US" dirty="0"/>
           </a:p>
@@ -8500,114 +8685,16 @@
           <a:p>
             <a:r>
               <a:rPr lang="en-US" dirty="0" smtClean="0"/>
-              <a:t>Float</a:t>
-            </a:r>
-          </a:p>
-        </p:txBody>
-      </p:sp>
-      <p:sp>
-        <p:nvSpPr>
-          <p:cNvPr id="4" name="Rectangle 3"/>
-          <p:cNvSpPr/>
-          <p:nvPr/>
-        </p:nvSpPr>
-        <p:spPr>
-          <a:xfrm>
-            <a:off x="291541" y="2867259"/>
-            <a:ext cx="5513752" cy="1200329"/>
-          </a:xfrm>
-          <a:prstGeom prst="rect">
-            <a:avLst/>
-          </a:prstGeom>
-        </p:spPr>
-        <p:txBody>
-          <a:bodyPr wrap="square">
-            <a:spAutoFit/>
-          </a:bodyPr>
-          <a:lstStyle/>
-          <a:p>
-            <a:r>
-              <a:rPr lang="en-US" dirty="0" smtClean="0"/>
-              <a:t>&lt;section&gt;</a:t>
-            </a:r>
-          </a:p>
-          <a:p>
-            <a:r>
-              <a:rPr lang="en-US" dirty="0" smtClean="0"/>
-              <a:t>  &lt;span&gt; I want button on the left &lt;/span&gt;</a:t>
-            </a:r>
-          </a:p>
-          <a:p>
-            <a:r>
-              <a:rPr lang="en-US" dirty="0" smtClean="0"/>
-              <a:t>  &lt;input type="submit" class="button"/&gt;</a:t>
-            </a:r>
-          </a:p>
-          <a:p>
-            <a:r>
-              <a:rPr lang="en-US" dirty="0" smtClean="0"/>
-              <a:t>&lt;/section&gt;</a:t>
+              <a:t>Position</a:t>
+            </a:r>
+          </a:p>
+          <a:p>
+            <a:pPr lvl="1"/>
+            <a:r>
+              <a:rPr lang="en-US" dirty="0" smtClean="0"/>
+              <a:t>Absolute, fixed, relative, static</a:t>
             </a:r>
             <a:endParaRPr lang="en-US" dirty="0"/>
-          </a:p>
-        </p:txBody>
-      </p:sp>
-      <p:sp>
-        <p:nvSpPr>
-          <p:cNvPr id="5" name="Rectangle 4"/>
-          <p:cNvSpPr/>
-          <p:nvPr/>
-        </p:nvSpPr>
-        <p:spPr>
-          <a:xfrm>
-            <a:off x="5313090" y="2509982"/>
-            <a:ext cx="3304972" cy="1754327"/>
-          </a:xfrm>
-          <a:prstGeom prst="rect">
-            <a:avLst/>
-          </a:prstGeom>
-        </p:spPr>
-        <p:txBody>
-          <a:bodyPr wrap="square">
-            <a:spAutoFit/>
-          </a:bodyPr>
-          <a:lstStyle/>
-          <a:p>
-            <a:r>
-              <a:rPr lang="en-US" dirty="0"/>
-              <a:t>span {</a:t>
-            </a:r>
-          </a:p>
-          <a:p>
-            <a:r>
-              <a:rPr lang="en-US" dirty="0"/>
-              <a:t>  background: #00ff00;</a:t>
-            </a:r>
-          </a:p>
-          <a:p>
-            <a:r>
-              <a:rPr lang="en-US" dirty="0" smtClean="0"/>
-              <a:t>}</a:t>
-            </a:r>
-            <a:endParaRPr lang="en-US" dirty="0"/>
-          </a:p>
-          <a:p>
-            <a:r>
-              <a:rPr lang="en-US" dirty="0"/>
-              <a:t>.button {</a:t>
-            </a:r>
-          </a:p>
-          <a:p>
-            <a:r>
-              <a:rPr lang="en-US" dirty="0"/>
-              <a:t>  float: left;</a:t>
-            </a:r>
-          </a:p>
-          <a:p>
-            <a:r>
-              <a:rPr lang="en-US" dirty="0"/>
-              <a:t>}</a:t>
-            </a:r>
           </a:p>
         </p:txBody>
       </p:sp>
@@ -8627,18 +8714,156 @@
         </p:blipFill>
         <p:spPr>
           <a:xfrm>
-            <a:off x="2731606" y="4925007"/>
-            <a:ext cx="3708400" cy="419100"/>
+            <a:off x="3567068" y="3500838"/>
+            <a:ext cx="2273300" cy="1016000"/>
           </a:xfrm>
           <a:prstGeom prst="rect">
             <a:avLst/>
           </a:prstGeom>
         </p:spPr>
       </p:pic>
+      <p:pic>
+        <p:nvPicPr>
+          <p:cNvPr id="7" name="Picture 6"/>
+          <p:cNvPicPr>
+            <a:picLocks noChangeAspect="1"/>
+          </p:cNvPicPr>
+          <p:nvPr/>
+        </p:nvPicPr>
+        <p:blipFill>
+          <a:blip r:embed="rId4"/>
+          <a:stretch>
+            <a:fillRect/>
+          </a:stretch>
+        </p:blipFill>
+        <p:spPr>
+          <a:xfrm>
+            <a:off x="6415515" y="3513538"/>
+            <a:ext cx="2324100" cy="1003300"/>
+          </a:xfrm>
+          <a:prstGeom prst="rect">
+            <a:avLst/>
+          </a:prstGeom>
+        </p:spPr>
+      </p:pic>
+      <p:pic>
+        <p:nvPicPr>
+          <p:cNvPr id="8" name="Picture 7"/>
+          <p:cNvPicPr>
+            <a:picLocks noChangeAspect="1"/>
+          </p:cNvPicPr>
+          <p:nvPr/>
+        </p:nvPicPr>
+        <p:blipFill>
+          <a:blip r:embed="rId5"/>
+          <a:stretch>
+            <a:fillRect/>
+          </a:stretch>
+        </p:blipFill>
+        <p:spPr>
+          <a:xfrm>
+            <a:off x="3553263" y="5021681"/>
+            <a:ext cx="2387600" cy="1066800"/>
+          </a:xfrm>
+          <a:prstGeom prst="rect">
+            <a:avLst/>
+          </a:prstGeom>
+        </p:spPr>
+      </p:pic>
+      <p:pic>
+        <p:nvPicPr>
+          <p:cNvPr id="9" name="Picture 8"/>
+          <p:cNvPicPr>
+            <a:picLocks noChangeAspect="1"/>
+          </p:cNvPicPr>
+          <p:nvPr/>
+        </p:nvPicPr>
+        <p:blipFill>
+          <a:blip r:embed="rId6"/>
+          <a:stretch>
+            <a:fillRect/>
+          </a:stretch>
+        </p:blipFill>
+        <p:spPr>
+          <a:xfrm>
+            <a:off x="6415515" y="5072481"/>
+            <a:ext cx="2247900" cy="1016000"/>
+          </a:xfrm>
+          <a:prstGeom prst="rect">
+            <a:avLst/>
+          </a:prstGeom>
+        </p:spPr>
+      </p:pic>
+      <p:sp>
+        <p:nvSpPr>
+          <p:cNvPr id="10" name="Rectangle 9"/>
+          <p:cNvSpPr/>
+          <p:nvPr/>
+        </p:nvSpPr>
+        <p:spPr>
+          <a:xfrm>
+            <a:off x="457199" y="3708270"/>
+            <a:ext cx="2752778" cy="2031325"/>
+          </a:xfrm>
+          <a:prstGeom prst="rect">
+            <a:avLst/>
+          </a:prstGeom>
+        </p:spPr>
+        <p:txBody>
+          <a:bodyPr wrap="square">
+            <a:spAutoFit/>
+          </a:bodyPr>
+          <a:lstStyle/>
+          <a:p>
+            <a:r>
+              <a:rPr lang="is-IS" dirty="0"/>
+              <a:t>.position {</a:t>
+            </a:r>
+          </a:p>
+          <a:p>
+            <a:r>
+              <a:rPr lang="is-IS" dirty="0"/>
+              <a:t>  position: </a:t>
+            </a:r>
+            <a:r>
+              <a:rPr lang="is-IS" dirty="0" smtClean="0"/>
+              <a:t>***;</a:t>
+            </a:r>
+            <a:endParaRPr lang="is-IS" dirty="0"/>
+          </a:p>
+          <a:p>
+            <a:r>
+              <a:rPr lang="is-IS" dirty="0"/>
+              <a:t>  top: 0;</a:t>
+            </a:r>
+          </a:p>
+          <a:p>
+            <a:r>
+              <a:rPr lang="is-IS" dirty="0"/>
+              <a:t>  left: 0;</a:t>
+            </a:r>
+          </a:p>
+          <a:p>
+            <a:r>
+              <a:rPr lang="is-IS" dirty="0"/>
+              <a:t>  margin: 0;</a:t>
+            </a:r>
+          </a:p>
+          <a:p>
+            <a:r>
+              <a:rPr lang="is-IS" dirty="0"/>
+              <a:t>}</a:t>
+            </a:r>
+          </a:p>
+          <a:p>
+            <a:endParaRPr lang="is-IS" dirty="0"/>
+          </a:p>
+        </p:txBody>
+      </p:sp>
     </p:spTree>
     <p:extLst>
       <p:ext uri="{BB962C8B-B14F-4D97-AF65-F5344CB8AC3E}">
-        <p14:creationId xmlns:p14="http://schemas.microsoft.com/office/powerpoint/2010/main" val="246670905"/>
+        <p14:creationId xmlns:p14="http://schemas.microsoft.com/office/powerpoint/2010/main" val="3921735894"/>
       </p:ext>
     </p:extLst>
   </p:cSld>
@@ -8689,7 +8914,7 @@
           <a:p>
             <a:r>
               <a:rPr lang="en-US" dirty="0" smtClean="0"/>
-              <a:t>Location(2)</a:t>
+              <a:t>Principles</a:t>
             </a:r>
             <a:endParaRPr lang="en-US" dirty="0"/>
           </a:p>
@@ -8712,185 +8937,40 @@
           <a:p>
             <a:r>
               <a:rPr lang="en-US" dirty="0" smtClean="0"/>
-              <a:t>Position</a:t>
-            </a:r>
+              <a:t>DRY</a:t>
+            </a:r>
+            <a:endParaRPr lang="en-US" dirty="0" smtClean="0"/>
           </a:p>
           <a:p>
             <a:pPr lvl="1"/>
             <a:r>
               <a:rPr lang="en-US" dirty="0" smtClean="0"/>
-              <a:t>Absolute, fixed, relative, static</a:t>
-            </a:r>
-            <a:endParaRPr lang="en-US" dirty="0"/>
-          </a:p>
-        </p:txBody>
-      </p:sp>
-      <p:pic>
-        <p:nvPicPr>
-          <p:cNvPr id="6" name="Picture 5"/>
-          <p:cNvPicPr>
-            <a:picLocks noChangeAspect="1"/>
-          </p:cNvPicPr>
-          <p:nvPr/>
-        </p:nvPicPr>
-        <p:blipFill>
-          <a:blip r:embed="rId2"/>
-          <a:stretch>
-            <a:fillRect/>
-          </a:stretch>
-        </p:blipFill>
-        <p:spPr>
-          <a:xfrm>
-            <a:off x="3567068" y="3500838"/>
-            <a:ext cx="2273300" cy="1016000"/>
-          </a:xfrm>
-          <a:prstGeom prst="rect">
-            <a:avLst/>
-          </a:prstGeom>
-        </p:spPr>
-      </p:pic>
-      <p:pic>
-        <p:nvPicPr>
-          <p:cNvPr id="7" name="Picture 6"/>
-          <p:cNvPicPr>
-            <a:picLocks noChangeAspect="1"/>
-          </p:cNvPicPr>
-          <p:nvPr/>
-        </p:nvPicPr>
-        <p:blipFill>
-          <a:blip r:embed="rId3"/>
-          <a:stretch>
-            <a:fillRect/>
-          </a:stretch>
-        </p:blipFill>
-        <p:spPr>
-          <a:xfrm>
-            <a:off x="6415515" y="3513538"/>
-            <a:ext cx="2324100" cy="1003300"/>
-          </a:xfrm>
-          <a:prstGeom prst="rect">
-            <a:avLst/>
-          </a:prstGeom>
-        </p:spPr>
-      </p:pic>
-      <p:pic>
-        <p:nvPicPr>
-          <p:cNvPr id="8" name="Picture 7"/>
-          <p:cNvPicPr>
-            <a:picLocks noChangeAspect="1"/>
-          </p:cNvPicPr>
-          <p:nvPr/>
-        </p:nvPicPr>
-        <p:blipFill>
-          <a:blip r:embed="rId4"/>
-          <a:stretch>
-            <a:fillRect/>
-          </a:stretch>
-        </p:blipFill>
-        <p:spPr>
-          <a:xfrm>
-            <a:off x="3553263" y="5021681"/>
-            <a:ext cx="2387600" cy="1066800"/>
-          </a:xfrm>
-          <a:prstGeom prst="rect">
-            <a:avLst/>
-          </a:prstGeom>
-        </p:spPr>
-      </p:pic>
-      <p:pic>
-        <p:nvPicPr>
-          <p:cNvPr id="9" name="Picture 8"/>
-          <p:cNvPicPr>
-            <a:picLocks noChangeAspect="1"/>
-          </p:cNvPicPr>
-          <p:nvPr/>
-        </p:nvPicPr>
-        <p:blipFill>
-          <a:blip r:embed="rId5"/>
-          <a:stretch>
-            <a:fillRect/>
-          </a:stretch>
-        </p:blipFill>
-        <p:spPr>
-          <a:xfrm>
-            <a:off x="6415515" y="5072481"/>
-            <a:ext cx="2247900" cy="1016000"/>
-          </a:xfrm>
-          <a:prstGeom prst="rect">
-            <a:avLst/>
-          </a:prstGeom>
-        </p:spPr>
-      </p:pic>
-      <p:sp>
-        <p:nvSpPr>
-          <p:cNvPr id="10" name="Rectangle 9"/>
-          <p:cNvSpPr/>
-          <p:nvPr/>
-        </p:nvSpPr>
-        <p:spPr>
-          <a:xfrm>
-            <a:off x="457199" y="3708270"/>
-            <a:ext cx="2752778" cy="2031325"/>
-          </a:xfrm>
-          <a:prstGeom prst="rect">
-            <a:avLst/>
-          </a:prstGeom>
-        </p:spPr>
-        <p:txBody>
-          <a:bodyPr wrap="square">
-            <a:spAutoFit/>
-          </a:bodyPr>
-          <a:lstStyle/>
-          <a:p>
-            <a:r>
-              <a:rPr lang="is-IS" dirty="0"/>
-              <a:t>.position {</a:t>
-            </a:r>
-          </a:p>
-          <a:p>
-            <a:r>
-              <a:rPr lang="is-IS" dirty="0"/>
-              <a:t>  position: </a:t>
-            </a:r>
-            <a:r>
-              <a:rPr lang="is-IS" dirty="0" smtClean="0"/>
-              <a:t>***;</a:t>
-            </a:r>
-            <a:endParaRPr lang="is-IS" dirty="0"/>
-          </a:p>
-          <a:p>
-            <a:r>
-              <a:rPr lang="is-IS" dirty="0"/>
-              <a:t>  top: 0;</a:t>
-            </a:r>
-          </a:p>
-          <a:p>
-            <a:r>
-              <a:rPr lang="is-IS" dirty="0"/>
-              <a:t>  left: 0;</a:t>
-            </a:r>
-          </a:p>
-          <a:p>
-            <a:r>
-              <a:rPr lang="is-IS" dirty="0"/>
-              <a:t>  margin: 0;</a:t>
-            </a:r>
-          </a:p>
-          <a:p>
-            <a:r>
-              <a:rPr lang="is-IS" dirty="0"/>
-              <a:t>}</a:t>
-            </a:r>
-          </a:p>
-          <a:p>
-            <a:endParaRPr lang="is-IS" dirty="0"/>
+              <a:t>Group the normal CSS code</a:t>
+            </a:r>
+          </a:p>
+          <a:p>
+            <a:pPr lvl="1"/>
+            <a:r>
+              <a:rPr lang="en-US" dirty="0" err="1" smtClean="0"/>
+              <a:t>Shorthands</a:t>
+            </a:r>
+            <a:r>
+              <a:rPr lang="en-US" dirty="0" smtClean="0"/>
+              <a:t> properties</a:t>
+            </a:r>
+          </a:p>
+          <a:p>
+            <a:r>
+              <a:rPr lang="en-US" dirty="0" smtClean="0"/>
+              <a:t>Order</a:t>
+            </a:r>
           </a:p>
         </p:txBody>
       </p:sp>
     </p:spTree>
     <p:extLst>
       <p:ext uri="{BB962C8B-B14F-4D97-AF65-F5344CB8AC3E}">
-        <p14:creationId xmlns:p14="http://schemas.microsoft.com/office/powerpoint/2010/main" val="3921735894"/>
+        <p14:creationId xmlns:p14="http://schemas.microsoft.com/office/powerpoint/2010/main" val="2197775129"/>
       </p:ext>
     </p:extLst>
   </p:cSld>
@@ -8941,7 +9021,7 @@
           <a:p>
             <a:r>
               <a:rPr lang="en-US" dirty="0" smtClean="0"/>
-              <a:t>Location(3)</a:t>
+              <a:t>CSS3</a:t>
             </a:r>
             <a:endParaRPr lang="en-US" dirty="0"/>
           </a:p>
@@ -8959,45 +9039,73 @@
         </p:nvSpPr>
         <p:spPr/>
         <p:txBody>
-          <a:bodyPr/>
-          <a:lstStyle/>
-          <a:p>
-            <a:r>
-              <a:rPr lang="en-US" dirty="0" smtClean="0"/>
-              <a:t>z-index</a:t>
+          <a:bodyPr>
+            <a:normAutofit lnSpcReduction="10000"/>
+          </a:bodyPr>
+          <a:lstStyle/>
+          <a:p>
+            <a:r>
+              <a:rPr lang="en-US" dirty="0" smtClean="0"/>
+              <a:t>Animations</a:t>
+            </a:r>
+          </a:p>
+          <a:p>
+            <a:r>
+              <a:rPr lang="en-US" dirty="0" smtClean="0"/>
+              <a:t>Backgrounds and Borders</a:t>
+            </a:r>
+          </a:p>
+          <a:p>
+            <a:r>
+              <a:rPr lang="en-US" dirty="0" smtClean="0"/>
+              <a:t>Selectors</a:t>
+            </a:r>
+          </a:p>
+          <a:p>
+            <a:r>
+              <a:rPr lang="en-US" dirty="0" smtClean="0"/>
+              <a:t>2D</a:t>
+            </a:r>
+            <a:r>
+              <a:rPr lang="en-US" dirty="0" smtClean="0"/>
+              <a:t>/3D Transformations</a:t>
+            </a:r>
+          </a:p>
+          <a:p>
+            <a:r>
+              <a:rPr lang="en-US" dirty="0" smtClean="0"/>
+              <a:t>Text Effects</a:t>
+            </a:r>
+          </a:p>
+          <a:p>
+            <a:r>
+              <a:rPr lang="en-US" dirty="0" smtClean="0"/>
+              <a:t>User Interface</a:t>
+            </a:r>
+          </a:p>
+          <a:p>
+            <a:r>
+              <a:rPr lang="en-US" dirty="0" smtClean="0"/>
+              <a:t>Multiple Column </a:t>
+            </a:r>
+            <a:r>
+              <a:rPr lang="en-US" dirty="0" smtClean="0"/>
+              <a:t>Layout</a:t>
+            </a:r>
+          </a:p>
+          <a:p>
+            <a:r>
+              <a:rPr lang="en-US" dirty="0" smtClean="0"/>
+              <a:t>…</a:t>
             </a:r>
             <a:endParaRPr lang="en-US" dirty="0"/>
           </a:p>
         </p:txBody>
       </p:sp>
-      <p:pic>
-        <p:nvPicPr>
-          <p:cNvPr id="4" name="Picture 3"/>
-          <p:cNvPicPr>
-            <a:picLocks noChangeAspect="1"/>
-          </p:cNvPicPr>
-          <p:nvPr/>
-        </p:nvPicPr>
-        <p:blipFill>
-          <a:blip r:embed="rId2"/>
-          <a:stretch>
-            <a:fillRect/>
-          </a:stretch>
-        </p:blipFill>
-        <p:spPr>
-          <a:xfrm>
-            <a:off x="1979158" y="2392308"/>
-            <a:ext cx="5376614" cy="3910265"/>
-          </a:xfrm>
-          <a:prstGeom prst="rect">
-            <a:avLst/>
-          </a:prstGeom>
-        </p:spPr>
-      </p:pic>
     </p:spTree>
     <p:extLst>
       <p:ext uri="{BB962C8B-B14F-4D97-AF65-F5344CB8AC3E}">
-        <p14:creationId xmlns:p14="http://schemas.microsoft.com/office/powerpoint/2010/main" val="1240615727"/>
+        <p14:creationId xmlns:p14="http://schemas.microsoft.com/office/powerpoint/2010/main" val="3661054646"/>
       </p:ext>
     </p:extLst>
   </p:cSld>
@@ -9047,12 +9155,8 @@
           <a:lstStyle/>
           <a:p>
             <a:r>
-              <a:rPr lang="en-US" dirty="0"/>
-              <a:t>L</a:t>
-            </a:r>
-            <a:r>
-              <a:rPr lang="en-US" dirty="0" smtClean="0"/>
-              <a:t>ayout</a:t>
+              <a:rPr lang="en-US" dirty="0" smtClean="0"/>
+              <a:t>References</a:t>
             </a:r>
             <a:endParaRPr lang="en-US" dirty="0"/>
           </a:p>
@@ -9070,226 +9174,178 @@
         </p:nvSpPr>
         <p:spPr/>
         <p:txBody>
-          <a:bodyPr/>
-          <a:lstStyle/>
-          <a:p>
-            <a:r>
-              <a:rPr lang="en-US" dirty="0" smtClean="0"/>
-              <a:t>float</a:t>
-            </a:r>
-          </a:p>
-          <a:p>
-            <a:pPr lvl="1"/>
-            <a:r>
-              <a:rPr lang="en-US" dirty="0"/>
-              <a:t>c</a:t>
-            </a:r>
-            <a:r>
-              <a:rPr lang="en-US" dirty="0" smtClean="0"/>
-              <a:t>lear </a:t>
-            </a:r>
-          </a:p>
-          <a:p>
-            <a:r>
-              <a:rPr lang="en-US" dirty="0"/>
-              <a:t>p</a:t>
-            </a:r>
-            <a:r>
-              <a:rPr lang="en-US" dirty="0" smtClean="0"/>
-              <a:t>osition</a:t>
-            </a:r>
-          </a:p>
-          <a:p>
-            <a:pPr lvl="1"/>
-            <a:r>
-              <a:rPr lang="en-US" dirty="0" smtClean="0"/>
-              <a:t>Absolute</a:t>
-            </a:r>
-          </a:p>
-          <a:p>
-            <a:pPr lvl="1"/>
-            <a:r>
-              <a:rPr lang="en-US" dirty="0" smtClean="0"/>
-              <a:t>R</a:t>
-            </a:r>
-            <a:r>
-              <a:rPr lang="en-US" dirty="0" smtClean="0"/>
-              <a:t>elative</a:t>
-            </a:r>
-          </a:p>
-          <a:p>
-            <a:pPr lvl="1"/>
-            <a:r>
-              <a:rPr lang="en-US" dirty="0" smtClean="0"/>
-              <a:t>Static</a:t>
-            </a:r>
-          </a:p>
-          <a:p>
-            <a:pPr lvl="1"/>
-            <a:r>
-              <a:rPr lang="en-US" dirty="0" smtClean="0"/>
-              <a:t>Fix</a:t>
-            </a:r>
-          </a:p>
-          <a:p>
-            <a:r>
-              <a:rPr lang="en-US" dirty="0" smtClean="0"/>
-              <a:t>Inline-block</a:t>
-            </a:r>
-          </a:p>
-        </p:txBody>
-      </p:sp>
-      <p:pic>
-        <p:nvPicPr>
-          <p:cNvPr id="4" name="Picture 3"/>
-          <p:cNvPicPr>
-            <a:picLocks noChangeAspect="1"/>
-          </p:cNvPicPr>
-          <p:nvPr/>
-        </p:nvPicPr>
-        <p:blipFill>
-          <a:blip r:embed="rId2"/>
-          <a:stretch>
-            <a:fillRect/>
-          </a:stretch>
-        </p:blipFill>
-        <p:spPr>
-          <a:xfrm>
-            <a:off x="2797899" y="2154042"/>
-            <a:ext cx="4618033" cy="3665283"/>
-          </a:xfrm>
-          <a:prstGeom prst="rect">
-            <a:avLst/>
-          </a:prstGeom>
-        </p:spPr>
-      </p:pic>
+          <a:bodyPr>
+            <a:normAutofit fontScale="70000" lnSpcReduction="20000"/>
+          </a:bodyPr>
+          <a:lstStyle/>
+          <a:p>
+            <a:r>
+              <a:rPr lang="pl-PL" dirty="0" smtClean="0">
+                <a:hlinkClick r:id="rId2"/>
+              </a:rPr>
+              <a:t>http</a:t>
+            </a:r>
+            <a:r>
+              <a:rPr lang="pl-PL" dirty="0">
+                <a:hlinkClick r:id="rId2"/>
+              </a:rPr>
+              <a:t>://codepen.io/pen</a:t>
+            </a:r>
+            <a:r>
+              <a:rPr lang="pl-PL" dirty="0" smtClean="0">
+                <a:hlinkClick r:id="rId2"/>
+              </a:rPr>
+              <a:t>/</a:t>
+            </a:r>
+            <a:endParaRPr lang="pl-PL" dirty="0" smtClean="0"/>
+          </a:p>
+          <a:p>
+            <a:r>
+              <a:rPr lang="en-US" dirty="0">
+                <a:hlinkClick r:id="rId3"/>
+              </a:rPr>
+              <a:t>http://csslint.net</a:t>
+            </a:r>
+            <a:r>
+              <a:rPr lang="en-US" dirty="0" smtClean="0">
+                <a:hlinkClick r:id="rId3"/>
+              </a:rPr>
+              <a:t>/</a:t>
+            </a:r>
+            <a:endParaRPr lang="en-US" dirty="0" smtClean="0"/>
+          </a:p>
+          <a:p>
+            <a:r>
+              <a:rPr lang="en-US" dirty="0">
+                <a:hlinkClick r:id="rId4"/>
+              </a:rPr>
+              <a:t>http://www.tutorialchip.com/css/css-frameworks-easy-ways-to-keep-your-website-in-style</a:t>
+            </a:r>
+            <a:r>
+              <a:rPr lang="en-US" dirty="0" smtClean="0">
+                <a:hlinkClick r:id="rId4"/>
+              </a:rPr>
+              <a:t>/</a:t>
+            </a:r>
+            <a:endParaRPr lang="en-US" dirty="0"/>
+          </a:p>
+          <a:p>
+            <a:r>
+              <a:rPr lang="en-US" dirty="0">
+                <a:hlinkClick r:id="rId5"/>
+              </a:rPr>
+              <a:t>http://coding.smashingmagazine.com/2008/11/12/12-principles-for-keeping-your-code-clean</a:t>
+            </a:r>
+            <a:r>
+              <a:rPr lang="en-US" dirty="0" smtClean="0">
+                <a:hlinkClick r:id="rId5"/>
+              </a:rPr>
+              <a:t>/</a:t>
+            </a:r>
+            <a:endParaRPr lang="en-US" dirty="0" smtClean="0"/>
+          </a:p>
+          <a:p>
+            <a:r>
+              <a:rPr lang="en-US" dirty="0">
+                <a:hlinkClick r:id="rId6"/>
+              </a:rPr>
+              <a:t>https://github.com/necolas/idiomatic-</a:t>
+            </a:r>
+            <a:r>
+              <a:rPr lang="en-US" dirty="0" smtClean="0">
+                <a:hlinkClick r:id="rId6"/>
+              </a:rPr>
+              <a:t>css</a:t>
+            </a:r>
+            <a:endParaRPr lang="en-US" dirty="0" smtClean="0"/>
+          </a:p>
+          <a:p>
+            <a:r>
+              <a:rPr lang="en-US" dirty="0">
+                <a:hlinkClick r:id="rId7"/>
+              </a:rPr>
+              <a:t>http://www.vanseodesign.com/css/css-selector-performance</a:t>
+            </a:r>
+            <a:r>
+              <a:rPr lang="en-US" dirty="0" smtClean="0">
+                <a:hlinkClick r:id="rId7"/>
+              </a:rPr>
+              <a:t>/</a:t>
+            </a:r>
+            <a:endParaRPr lang="en-US" dirty="0"/>
+          </a:p>
+          <a:p>
+            <a:r>
+              <a:rPr lang="en-US" dirty="0">
+                <a:hlinkClick r:id="rId8"/>
+              </a:rPr>
+              <a:t>http://www.vanseodesign.com/css/understanding-css-floats</a:t>
+            </a:r>
+            <a:r>
+              <a:rPr lang="en-US" dirty="0" smtClean="0">
+                <a:hlinkClick r:id="rId8"/>
+              </a:rPr>
+              <a:t>/</a:t>
+            </a:r>
+            <a:endParaRPr lang="en-US" dirty="0" smtClean="0"/>
+          </a:p>
+          <a:p>
+            <a:r>
+              <a:rPr lang="hu-HU" dirty="0">
+                <a:hlinkClick r:id="rId9"/>
+              </a:rPr>
+              <a:t>http://w3help.org/zh-cn/kb/</a:t>
+            </a:r>
+            <a:r>
+              <a:rPr lang="hu-HU" dirty="0" smtClean="0">
+                <a:hlinkClick r:id="rId9"/>
+              </a:rPr>
+              <a:t>index.html</a:t>
+            </a:r>
+            <a:endParaRPr lang="hu-HU" dirty="0" smtClean="0"/>
+          </a:p>
+          <a:p>
+            <a:r>
+              <a:rPr lang="pl-PL" dirty="0">
+                <a:hlinkClick r:id="rId10"/>
+              </a:rPr>
+              <a:t>http://www.css3.info/preview</a:t>
+            </a:r>
+            <a:r>
+              <a:rPr lang="pl-PL" dirty="0" smtClean="0">
+                <a:hlinkClick r:id="rId10"/>
+              </a:rPr>
+              <a:t>/</a:t>
+            </a:r>
+            <a:endParaRPr lang="pl-PL" dirty="0" smtClean="0"/>
+          </a:p>
+          <a:p>
+            <a:endParaRPr lang="hu-HU" dirty="0" smtClean="0"/>
+          </a:p>
+          <a:p>
+            <a:endParaRPr lang="en-US" dirty="0" smtClean="0"/>
+          </a:p>
+          <a:p>
+            <a:endParaRPr lang="en-US" dirty="0" smtClean="0"/>
+          </a:p>
+          <a:p>
+            <a:endParaRPr lang="en-US" dirty="0" smtClean="0"/>
+          </a:p>
+          <a:p>
+            <a:endParaRPr lang="pl-PL" dirty="0" smtClean="0"/>
+          </a:p>
+          <a:p>
+            <a:endParaRPr lang="en-US" dirty="0" smtClean="0"/>
+          </a:p>
+          <a:p>
+            <a:endParaRPr lang="en-US" dirty="0"/>
+          </a:p>
+        </p:txBody>
+      </p:sp>
     </p:spTree>
     <p:extLst>
       <p:ext uri="{BB962C8B-B14F-4D97-AF65-F5344CB8AC3E}">
-        <p14:creationId xmlns:p14="http://schemas.microsoft.com/office/powerpoint/2010/main" val="144652962"/>
-      </p:ext>
-    </p:extLst>
-  </p:cSld>
-  <p:clrMapOvr>
-    <a:masterClrMapping/>
-  </p:clrMapOvr>
-  <p:timing>
-    <p:tnLst>
-      <p:par>
-        <p:cTn xmlns:p14="http://schemas.microsoft.com/office/powerpoint/2010/main" id="1" dur="indefinite" restart="never" nodeType="tmRoot"/>
-      </p:par>
-    </p:tnLst>
-  </p:timing>
-</p:sld>
-</file>
-
-<file path=ppt/slides/slide19.xml><?xml version="1.0" encoding="utf-8"?>
-<p:sld xmlns:a="http://schemas.openxmlformats.org/drawingml/2006/main" xmlns:r="http://schemas.openxmlformats.org/officeDocument/2006/relationships" xmlns:p="http://schemas.openxmlformats.org/presentationml/2006/main">
-  <p:cSld>
-    <p:spTree>
-      <p:nvGrpSpPr>
-        <p:cNvPr id="1" name=""/>
-        <p:cNvGrpSpPr/>
-        <p:nvPr/>
-      </p:nvGrpSpPr>
-      <p:grpSpPr>
-        <a:xfrm>
-          <a:off x="0" y="0"/>
-          <a:ext cx="0" cy="0"/>
-          <a:chOff x="0" y="0"/>
-          <a:chExt cx="0" cy="0"/>
-        </a:xfrm>
-      </p:grpSpPr>
-      <p:sp>
-        <p:nvSpPr>
-          <p:cNvPr id="2" name="Title 1"/>
-          <p:cNvSpPr>
-            <a:spLocks noGrp="1"/>
-          </p:cNvSpPr>
-          <p:nvPr>
-            <p:ph type="title"/>
-          </p:nvPr>
-        </p:nvSpPr>
-        <p:spPr/>
-        <p:txBody>
-          <a:bodyPr/>
-          <a:lstStyle/>
-          <a:p>
-            <a:r>
-              <a:rPr lang="en-US" dirty="0" smtClean="0"/>
-              <a:t>Principles</a:t>
-            </a:r>
-            <a:endParaRPr lang="en-US" dirty="0"/>
-          </a:p>
-        </p:txBody>
-      </p:sp>
-      <p:sp>
-        <p:nvSpPr>
-          <p:cNvPr id="3" name="Content Placeholder 2"/>
-          <p:cNvSpPr>
-            <a:spLocks noGrp="1"/>
-          </p:cNvSpPr>
-          <p:nvPr>
-            <p:ph idx="1"/>
-          </p:nvPr>
-        </p:nvSpPr>
-        <p:spPr/>
-        <p:txBody>
-          <a:bodyPr/>
-          <a:lstStyle/>
-          <a:p>
-            <a:r>
-              <a:rPr lang="en-US" dirty="0" smtClean="0"/>
-              <a:t>Use class instead of use </a:t>
-            </a:r>
-            <a:r>
-              <a:rPr lang="en-US" dirty="0" smtClean="0"/>
-              <a:t>ID</a:t>
-            </a:r>
-          </a:p>
-          <a:p>
-            <a:r>
-              <a:rPr lang="en-US" dirty="0" smtClean="0"/>
-              <a:t>Separate style and logic</a:t>
-            </a:r>
-            <a:endParaRPr lang="en-US" dirty="0" smtClean="0"/>
-          </a:p>
-          <a:p>
-            <a:r>
-              <a:rPr lang="en-US" dirty="0" smtClean="0"/>
-              <a:t>DRY</a:t>
-            </a:r>
-          </a:p>
-          <a:p>
-            <a:pPr lvl="1"/>
-            <a:r>
-              <a:rPr lang="en-US" dirty="0" smtClean="0"/>
-              <a:t>Group the normal CSS code</a:t>
-            </a:r>
-          </a:p>
-          <a:p>
-            <a:pPr lvl="1"/>
-            <a:r>
-              <a:rPr lang="en-US" dirty="0" err="1" smtClean="0"/>
-              <a:t>Shorthands</a:t>
-            </a:r>
-            <a:r>
-              <a:rPr lang="en-US" dirty="0" smtClean="0"/>
-              <a:t> properties</a:t>
-            </a:r>
-          </a:p>
-          <a:p>
-            <a:r>
-              <a:rPr lang="en-US" dirty="0" smtClean="0"/>
-              <a:t>Order</a:t>
-            </a:r>
-          </a:p>
-        </p:txBody>
-      </p:sp>
-    </p:spTree>
-    <p:extLst>
-      <p:ext uri="{BB962C8B-B14F-4D97-AF65-F5344CB8AC3E}">
-        <p14:creationId xmlns:p14="http://schemas.microsoft.com/office/powerpoint/2010/main" val="2197775129"/>
+        <p14:creationId xmlns:p14="http://schemas.microsoft.com/office/powerpoint/2010/main" val="2812459127"/>
       </p:ext>
     </p:extLst>
   </p:cSld>
@@ -9391,522 +9447,6 @@
     <p:extLst>
       <p:ext uri="{BB962C8B-B14F-4D97-AF65-F5344CB8AC3E}">
         <p14:creationId xmlns:p14="http://schemas.microsoft.com/office/powerpoint/2010/main" val="2281794661"/>
-      </p:ext>
-    </p:extLst>
-  </p:cSld>
-  <p:clrMapOvr>
-    <a:masterClrMapping/>
-  </p:clrMapOvr>
-  <p:timing>
-    <p:tnLst>
-      <p:par>
-        <p:cTn xmlns:p14="http://schemas.microsoft.com/office/powerpoint/2010/main" id="1" dur="indefinite" restart="never" nodeType="tmRoot"/>
-      </p:par>
-    </p:tnLst>
-  </p:timing>
-</p:sld>
-</file>
-
-<file path=ppt/slides/slide20.xml><?xml version="1.0" encoding="utf-8"?>
-<p:sld xmlns:a="http://schemas.openxmlformats.org/drawingml/2006/main" xmlns:r="http://schemas.openxmlformats.org/officeDocument/2006/relationships" xmlns:p="http://schemas.openxmlformats.org/presentationml/2006/main">
-  <p:cSld>
-    <p:spTree>
-      <p:nvGrpSpPr>
-        <p:cNvPr id="1" name=""/>
-        <p:cNvGrpSpPr/>
-        <p:nvPr/>
-      </p:nvGrpSpPr>
-      <p:grpSpPr>
-        <a:xfrm>
-          <a:off x="0" y="0"/>
-          <a:ext cx="0" cy="0"/>
-          <a:chOff x="0" y="0"/>
-          <a:chExt cx="0" cy="0"/>
-        </a:xfrm>
-      </p:grpSpPr>
-      <p:sp>
-        <p:nvSpPr>
-          <p:cNvPr id="2" name="Title 1"/>
-          <p:cNvSpPr>
-            <a:spLocks noGrp="1"/>
-          </p:cNvSpPr>
-          <p:nvPr>
-            <p:ph type="title"/>
-          </p:nvPr>
-        </p:nvSpPr>
-        <p:spPr/>
-        <p:txBody>
-          <a:bodyPr/>
-          <a:lstStyle/>
-          <a:p>
-            <a:r>
-              <a:rPr lang="en-US" dirty="0" smtClean="0"/>
-              <a:t>CSS3</a:t>
-            </a:r>
-            <a:endParaRPr lang="en-US" dirty="0"/>
-          </a:p>
-        </p:txBody>
-      </p:sp>
-      <p:sp>
-        <p:nvSpPr>
-          <p:cNvPr id="3" name="Content Placeholder 2"/>
-          <p:cNvSpPr>
-            <a:spLocks noGrp="1"/>
-          </p:cNvSpPr>
-          <p:nvPr>
-            <p:ph idx="1"/>
-          </p:nvPr>
-        </p:nvSpPr>
-        <p:spPr/>
-        <p:txBody>
-          <a:bodyPr>
-            <a:normAutofit lnSpcReduction="10000"/>
-          </a:bodyPr>
-          <a:lstStyle/>
-          <a:p>
-            <a:r>
-              <a:rPr lang="en-US" dirty="0" smtClean="0"/>
-              <a:t>Animations</a:t>
-            </a:r>
-          </a:p>
-          <a:p>
-            <a:r>
-              <a:rPr lang="en-US" dirty="0" smtClean="0"/>
-              <a:t>Backgrounds and Borders</a:t>
-            </a:r>
-          </a:p>
-          <a:p>
-            <a:r>
-              <a:rPr lang="en-US" dirty="0" smtClean="0"/>
-              <a:t>Selectors</a:t>
-            </a:r>
-          </a:p>
-          <a:p>
-            <a:r>
-              <a:rPr lang="en-US" dirty="0" smtClean="0"/>
-              <a:t>2D</a:t>
-            </a:r>
-            <a:r>
-              <a:rPr lang="en-US" dirty="0" smtClean="0"/>
-              <a:t>/3D Transformations</a:t>
-            </a:r>
-          </a:p>
-          <a:p>
-            <a:r>
-              <a:rPr lang="en-US" dirty="0" smtClean="0"/>
-              <a:t>Text Effects</a:t>
-            </a:r>
-          </a:p>
-          <a:p>
-            <a:r>
-              <a:rPr lang="en-US" dirty="0" smtClean="0"/>
-              <a:t>User Interface</a:t>
-            </a:r>
-          </a:p>
-          <a:p>
-            <a:r>
-              <a:rPr lang="en-US" dirty="0" smtClean="0"/>
-              <a:t>Multiple Column </a:t>
-            </a:r>
-            <a:r>
-              <a:rPr lang="en-US" dirty="0" smtClean="0"/>
-              <a:t>Layout</a:t>
-            </a:r>
-          </a:p>
-          <a:p>
-            <a:r>
-              <a:rPr lang="en-US" dirty="0" smtClean="0"/>
-              <a:t>…</a:t>
-            </a:r>
-            <a:endParaRPr lang="en-US" dirty="0"/>
-          </a:p>
-        </p:txBody>
-      </p:sp>
-    </p:spTree>
-    <p:extLst>
-      <p:ext uri="{BB962C8B-B14F-4D97-AF65-F5344CB8AC3E}">
-        <p14:creationId xmlns:p14="http://schemas.microsoft.com/office/powerpoint/2010/main" val="3661054646"/>
-      </p:ext>
-    </p:extLst>
-  </p:cSld>
-  <p:clrMapOvr>
-    <a:masterClrMapping/>
-  </p:clrMapOvr>
-  <p:timing>
-    <p:tnLst>
-      <p:par>
-        <p:cTn xmlns:p14="http://schemas.microsoft.com/office/powerpoint/2010/main" id="1" dur="indefinite" restart="never" nodeType="tmRoot"/>
-      </p:par>
-    </p:tnLst>
-  </p:timing>
-</p:sld>
-</file>
-
-<file path=ppt/slides/slide21.xml><?xml version="1.0" encoding="utf-8"?>
-<p:sld xmlns:a="http://schemas.openxmlformats.org/drawingml/2006/main" xmlns:r="http://schemas.openxmlformats.org/officeDocument/2006/relationships" xmlns:p="http://schemas.openxmlformats.org/presentationml/2006/main">
-  <p:cSld>
-    <p:spTree>
-      <p:nvGrpSpPr>
-        <p:cNvPr id="1" name=""/>
-        <p:cNvGrpSpPr/>
-        <p:nvPr/>
-      </p:nvGrpSpPr>
-      <p:grpSpPr>
-        <a:xfrm>
-          <a:off x="0" y="0"/>
-          <a:ext cx="0" cy="0"/>
-          <a:chOff x="0" y="0"/>
-          <a:chExt cx="0" cy="0"/>
-        </a:xfrm>
-      </p:grpSpPr>
-      <p:sp>
-        <p:nvSpPr>
-          <p:cNvPr id="2" name="Title 1"/>
-          <p:cNvSpPr>
-            <a:spLocks noGrp="1"/>
-          </p:cNvSpPr>
-          <p:nvPr>
-            <p:ph type="title"/>
-          </p:nvPr>
-        </p:nvSpPr>
-        <p:spPr/>
-        <p:txBody>
-          <a:bodyPr/>
-          <a:lstStyle/>
-          <a:p>
-            <a:r>
-              <a:rPr lang="en-US" dirty="0" smtClean="0"/>
-              <a:t>CSS3</a:t>
-            </a:r>
-            <a:endParaRPr lang="en-US" dirty="0"/>
-          </a:p>
-        </p:txBody>
-      </p:sp>
-      <p:sp>
-        <p:nvSpPr>
-          <p:cNvPr id="3" name="Content Placeholder 2"/>
-          <p:cNvSpPr>
-            <a:spLocks noGrp="1"/>
-          </p:cNvSpPr>
-          <p:nvPr>
-            <p:ph idx="1"/>
-          </p:nvPr>
-        </p:nvSpPr>
-        <p:spPr/>
-        <p:txBody>
-          <a:bodyPr/>
-          <a:lstStyle/>
-          <a:p>
-            <a:r>
-              <a:rPr lang="en-US" dirty="0" smtClean="0"/>
-              <a:t>More effect</a:t>
-            </a:r>
-          </a:p>
-          <a:p>
-            <a:r>
-              <a:rPr lang="en-US" dirty="0" smtClean="0"/>
-              <a:t>Faster and accurate</a:t>
-            </a:r>
-            <a:endParaRPr lang="en-US" dirty="0"/>
-          </a:p>
-        </p:txBody>
-      </p:sp>
-      <p:sp>
-        <p:nvSpPr>
-          <p:cNvPr id="4" name="Rectangle 3"/>
-          <p:cNvSpPr/>
-          <p:nvPr/>
-        </p:nvSpPr>
-        <p:spPr>
-          <a:xfrm>
-            <a:off x="77223" y="5121030"/>
-            <a:ext cx="9820871" cy="646331"/>
-          </a:xfrm>
-          <a:prstGeom prst="rect">
-            <a:avLst/>
-          </a:prstGeom>
-        </p:spPr>
-        <p:txBody>
-          <a:bodyPr wrap="square">
-            <a:spAutoFit/>
-          </a:bodyPr>
-          <a:lstStyle/>
-          <a:p>
-            <a:r>
-              <a:rPr lang="en-US" dirty="0">
-                <a:hlinkClick r:id="rId2"/>
-              </a:rPr>
-              <a:t>http://</a:t>
-            </a:r>
-            <a:r>
-              <a:rPr lang="en-US" dirty="0" err="1">
-                <a:hlinkClick r:id="rId2"/>
-              </a:rPr>
-              <a:t>www.realcommercial.com.au</a:t>
-            </a:r>
-            <a:r>
-              <a:rPr lang="en-US" dirty="0">
-                <a:hlinkClick r:id="rId2"/>
-              </a:rPr>
-              <a:t>/for-lease/map-1?includeSurrounding=</a:t>
-            </a:r>
-            <a:r>
-              <a:rPr lang="en-US" dirty="0" smtClean="0">
-                <a:hlinkClick r:id="rId2"/>
-              </a:rPr>
-              <a:t>false</a:t>
-            </a:r>
-            <a:endParaRPr lang="en-US" dirty="0"/>
-          </a:p>
-          <a:p>
-            <a:endParaRPr lang="en-US" dirty="0" smtClean="0"/>
-          </a:p>
-        </p:txBody>
-      </p:sp>
-    </p:spTree>
-    <p:extLst>
-      <p:ext uri="{BB962C8B-B14F-4D97-AF65-F5344CB8AC3E}">
-        <p14:creationId xmlns:p14="http://schemas.microsoft.com/office/powerpoint/2010/main" val="3914601001"/>
-      </p:ext>
-    </p:extLst>
-  </p:cSld>
-  <p:clrMapOvr>
-    <a:masterClrMapping/>
-  </p:clrMapOvr>
-  <p:timing>
-    <p:tnLst>
-      <p:par>
-        <p:cTn xmlns:p14="http://schemas.microsoft.com/office/powerpoint/2010/main" id="1" dur="indefinite" restart="never" nodeType="tmRoot"/>
-      </p:par>
-    </p:tnLst>
-  </p:timing>
-</p:sld>
-</file>
-
-<file path=ppt/slides/slide22.xml><?xml version="1.0" encoding="utf-8"?>
-<p:sld xmlns:a="http://schemas.openxmlformats.org/drawingml/2006/main" xmlns:r="http://schemas.openxmlformats.org/officeDocument/2006/relationships" xmlns:p="http://schemas.openxmlformats.org/presentationml/2006/main">
-  <p:cSld>
-    <p:spTree>
-      <p:nvGrpSpPr>
-        <p:cNvPr id="1" name=""/>
-        <p:cNvGrpSpPr/>
-        <p:nvPr/>
-      </p:nvGrpSpPr>
-      <p:grpSpPr>
-        <a:xfrm>
-          <a:off x="0" y="0"/>
-          <a:ext cx="0" cy="0"/>
-          <a:chOff x="0" y="0"/>
-          <a:chExt cx="0" cy="0"/>
-        </a:xfrm>
-      </p:grpSpPr>
-      <p:sp>
-        <p:nvSpPr>
-          <p:cNvPr id="2" name="Title 1"/>
-          <p:cNvSpPr>
-            <a:spLocks noGrp="1"/>
-          </p:cNvSpPr>
-          <p:nvPr>
-            <p:ph type="title"/>
-          </p:nvPr>
-        </p:nvSpPr>
-        <p:spPr/>
-        <p:txBody>
-          <a:bodyPr/>
-          <a:lstStyle/>
-          <a:p>
-            <a:r>
-              <a:rPr lang="en-US" dirty="0" smtClean="0"/>
-              <a:t>References</a:t>
-            </a:r>
-            <a:endParaRPr lang="en-US" dirty="0"/>
-          </a:p>
-        </p:txBody>
-      </p:sp>
-      <p:sp>
-        <p:nvSpPr>
-          <p:cNvPr id="3" name="Content Placeholder 2"/>
-          <p:cNvSpPr>
-            <a:spLocks noGrp="1"/>
-          </p:cNvSpPr>
-          <p:nvPr>
-            <p:ph idx="1"/>
-          </p:nvPr>
-        </p:nvSpPr>
-        <p:spPr/>
-        <p:txBody>
-          <a:bodyPr>
-            <a:normAutofit fontScale="70000" lnSpcReduction="20000"/>
-          </a:bodyPr>
-          <a:lstStyle/>
-          <a:p>
-            <a:r>
-              <a:rPr lang="pl-PL" dirty="0" smtClean="0">
-                <a:hlinkClick r:id="rId2"/>
-              </a:rPr>
-              <a:t>http</a:t>
-            </a:r>
-            <a:r>
-              <a:rPr lang="pl-PL" dirty="0">
-                <a:hlinkClick r:id="rId2"/>
-              </a:rPr>
-              <a:t>://codepen.io/pen</a:t>
-            </a:r>
-            <a:r>
-              <a:rPr lang="pl-PL" dirty="0" smtClean="0">
-                <a:hlinkClick r:id="rId2"/>
-              </a:rPr>
-              <a:t>/</a:t>
-            </a:r>
-            <a:endParaRPr lang="pl-PL" dirty="0" smtClean="0"/>
-          </a:p>
-          <a:p>
-            <a:r>
-              <a:rPr lang="en-US" dirty="0">
-                <a:hlinkClick r:id="rId3"/>
-              </a:rPr>
-              <a:t>http://csslint.net</a:t>
-            </a:r>
-            <a:r>
-              <a:rPr lang="en-US" dirty="0" smtClean="0">
-                <a:hlinkClick r:id="rId3"/>
-              </a:rPr>
-              <a:t>/</a:t>
-            </a:r>
-            <a:endParaRPr lang="en-US" dirty="0" smtClean="0"/>
-          </a:p>
-          <a:p>
-            <a:r>
-              <a:rPr lang="en-US" dirty="0">
-                <a:hlinkClick r:id="rId4"/>
-              </a:rPr>
-              <a:t>http://www.tutorialchip.com/css/css-frameworks-easy-ways-to-keep-your-website-in-style</a:t>
-            </a:r>
-            <a:r>
-              <a:rPr lang="en-US" dirty="0" smtClean="0">
-                <a:hlinkClick r:id="rId4"/>
-              </a:rPr>
-              <a:t>/</a:t>
-            </a:r>
-            <a:endParaRPr lang="en-US" dirty="0"/>
-          </a:p>
-          <a:p>
-            <a:r>
-              <a:rPr lang="en-US" dirty="0">
-                <a:hlinkClick r:id="rId5"/>
-              </a:rPr>
-              <a:t>http://coding.smashingmagazine.com/2008/11/12/12-principles-for-keeping-your-code-clean</a:t>
-            </a:r>
-            <a:r>
-              <a:rPr lang="en-US" dirty="0" smtClean="0">
-                <a:hlinkClick r:id="rId5"/>
-              </a:rPr>
-              <a:t>/</a:t>
-            </a:r>
-            <a:endParaRPr lang="en-US" dirty="0" smtClean="0"/>
-          </a:p>
-          <a:p>
-            <a:r>
-              <a:rPr lang="en-US" dirty="0">
-                <a:hlinkClick r:id="rId6"/>
-              </a:rPr>
-              <a:t>https://github.com/necolas/idiomatic-</a:t>
-            </a:r>
-            <a:r>
-              <a:rPr lang="en-US" dirty="0" smtClean="0">
-                <a:hlinkClick r:id="rId6"/>
-              </a:rPr>
-              <a:t>css</a:t>
-            </a:r>
-            <a:endParaRPr lang="en-US" dirty="0" smtClean="0"/>
-          </a:p>
-          <a:p>
-            <a:r>
-              <a:rPr lang="en-US" dirty="0">
-                <a:hlinkClick r:id="rId7"/>
-              </a:rPr>
-              <a:t>http://www.vanseodesign.com/css/css-selector-performance</a:t>
-            </a:r>
-            <a:r>
-              <a:rPr lang="en-US" dirty="0" smtClean="0">
-                <a:hlinkClick r:id="rId7"/>
-              </a:rPr>
-              <a:t>/</a:t>
-            </a:r>
-            <a:endParaRPr lang="en-US" dirty="0"/>
-          </a:p>
-          <a:p>
-            <a:r>
-              <a:rPr lang="en-US" dirty="0">
-                <a:hlinkClick r:id="rId8"/>
-              </a:rPr>
-              <a:t>http://www.vanseodesign.com/css/understanding-css-floats</a:t>
-            </a:r>
-            <a:r>
-              <a:rPr lang="en-US" dirty="0" smtClean="0">
-                <a:hlinkClick r:id="rId8"/>
-              </a:rPr>
-              <a:t>/</a:t>
-            </a:r>
-            <a:endParaRPr lang="en-US" dirty="0" smtClean="0"/>
-          </a:p>
-          <a:p>
-            <a:r>
-              <a:rPr lang="hu-HU" dirty="0">
-                <a:hlinkClick r:id="rId9"/>
-              </a:rPr>
-              <a:t>http://w3help.org/zh-cn/kb/</a:t>
-            </a:r>
-            <a:r>
-              <a:rPr lang="hu-HU" dirty="0" smtClean="0">
-                <a:hlinkClick r:id="rId9"/>
-              </a:rPr>
-              <a:t>index.html</a:t>
-            </a:r>
-            <a:endParaRPr lang="hu-HU" dirty="0" smtClean="0"/>
-          </a:p>
-          <a:p>
-            <a:r>
-              <a:rPr lang="pl-PL" dirty="0">
-                <a:hlinkClick r:id="rId10"/>
-              </a:rPr>
-              <a:t>http://www.css3.info/preview</a:t>
-            </a:r>
-            <a:r>
-              <a:rPr lang="pl-PL" dirty="0" smtClean="0">
-                <a:hlinkClick r:id="rId10"/>
-              </a:rPr>
-              <a:t>/</a:t>
-            </a:r>
-            <a:endParaRPr lang="pl-PL" dirty="0" smtClean="0"/>
-          </a:p>
-          <a:p>
-            <a:endParaRPr lang="hu-HU" dirty="0" smtClean="0"/>
-          </a:p>
-          <a:p>
-            <a:endParaRPr lang="en-US" dirty="0" smtClean="0"/>
-          </a:p>
-          <a:p>
-            <a:endParaRPr lang="en-US" dirty="0" smtClean="0"/>
-          </a:p>
-          <a:p>
-            <a:endParaRPr lang="en-US" dirty="0" smtClean="0"/>
-          </a:p>
-          <a:p>
-            <a:endParaRPr lang="pl-PL" dirty="0" smtClean="0"/>
-          </a:p>
-          <a:p>
-            <a:endParaRPr lang="en-US" dirty="0" smtClean="0"/>
-          </a:p>
-          <a:p>
-            <a:endParaRPr lang="en-US" dirty="0"/>
-          </a:p>
-        </p:txBody>
-      </p:sp>
-    </p:spTree>
-    <p:extLst>
-      <p:ext uri="{BB962C8B-B14F-4D97-AF65-F5344CB8AC3E}">
-        <p14:creationId xmlns:p14="http://schemas.microsoft.com/office/powerpoint/2010/main" val="2812459127"/>
       </p:ext>
     </p:extLst>
   </p:cSld>
@@ -10078,6 +9618,78 @@
           <a:p>
             <a:r>
               <a:rPr lang="en-US" dirty="0" smtClean="0"/>
+              <a:t>Two box models</a:t>
+            </a:r>
+            <a:endParaRPr lang="en-US" dirty="0"/>
+          </a:p>
+        </p:txBody>
+      </p:sp>
+      <p:sp>
+        <p:nvSpPr>
+          <p:cNvPr id="3" name="Content Placeholder 2"/>
+          <p:cNvSpPr>
+            <a:spLocks noGrp="1"/>
+          </p:cNvSpPr>
+          <p:nvPr>
+            <p:ph idx="1"/>
+          </p:nvPr>
+        </p:nvSpPr>
+        <p:spPr/>
+        <p:txBody>
+          <a:bodyPr/>
+          <a:lstStyle/>
+          <a:p>
+            <a:endParaRPr lang="en-US"/>
+          </a:p>
+        </p:txBody>
+      </p:sp>
+    </p:spTree>
+    <p:extLst>
+      <p:ext uri="{BB962C8B-B14F-4D97-AF65-F5344CB8AC3E}">
+        <p14:creationId xmlns:p14="http://schemas.microsoft.com/office/powerpoint/2010/main" val="4143059879"/>
+      </p:ext>
+    </p:extLst>
+  </p:cSld>
+  <p:clrMapOvr>
+    <a:masterClrMapping/>
+  </p:clrMapOvr>
+</p:sld>
+</file>
+
+<file path=ppt/slides/slide5.xml><?xml version="1.0" encoding="utf-8"?>
+<p:sld xmlns:a="http://schemas.openxmlformats.org/drawingml/2006/main" xmlns:r="http://schemas.openxmlformats.org/officeDocument/2006/relationships" xmlns:p="http://schemas.openxmlformats.org/presentationml/2006/main">
+  <p:cSld>
+    <p:spTree>
+      <p:nvGrpSpPr>
+        <p:cNvPr id="1" name=""/>
+        <p:cNvGrpSpPr/>
+        <p:nvPr/>
+      </p:nvGrpSpPr>
+      <p:grpSpPr>
+        <a:xfrm>
+          <a:off x="0" y="0"/>
+          <a:ext cx="0" cy="0"/>
+          <a:chOff x="0" y="0"/>
+          <a:chExt cx="0" cy="0"/>
+        </a:xfrm>
+      </p:grpSpPr>
+      <p:sp>
+        <p:nvSpPr>
+          <p:cNvPr id="2" name="Title 1"/>
+          <p:cNvSpPr>
+            <a:spLocks noGrp="1"/>
+          </p:cNvSpPr>
+          <p:nvPr>
+            <p:ph type="title"/>
+          </p:nvPr>
+        </p:nvSpPr>
+        <p:spPr/>
+        <p:txBody>
+          <a:bodyPr/>
+          <a:lstStyle/>
+          <a:p>
+            <a:r>
+              <a:rPr lang="en-US" dirty="0" smtClean="0"/>
               <a:t>Document flow</a:t>
             </a:r>
             <a:endParaRPr lang="en-US" dirty="0"/>
@@ -10231,7 +9843,7 @@
 </p:sld>
 </file>
 
-<file path=ppt/slides/slide5.xml><?xml version="1.0" encoding="utf-8"?>
+<file path=ppt/slides/slide6.xml><?xml version="1.0" encoding="utf-8"?>
 <p:sld xmlns:a="http://schemas.openxmlformats.org/drawingml/2006/main" xmlns:r="http://schemas.openxmlformats.org/officeDocument/2006/relationships" xmlns:p="http://schemas.openxmlformats.org/presentationml/2006/main">
   <p:cSld>
     <p:spTree>
@@ -10341,7 +9953,7 @@
 </p:sld>
 </file>
 
-<file path=ppt/slides/slide6.xml><?xml version="1.0" encoding="utf-8"?>
+<file path=ppt/slides/slide7.xml><?xml version="1.0" encoding="utf-8"?>
 <p:sld xmlns:a="http://schemas.openxmlformats.org/drawingml/2006/main" xmlns:r="http://schemas.openxmlformats.org/officeDocument/2006/relationships" xmlns:p="http://schemas.openxmlformats.org/presentationml/2006/main">
   <p:cSld>
     <p:spTree>
@@ -10551,111 +10163,6 @@
 </p:sld>
 </file>
 
-<file path=ppt/slides/slide7.xml><?xml version="1.0" encoding="utf-8"?>
-<p:sld xmlns:a="http://schemas.openxmlformats.org/drawingml/2006/main" xmlns:r="http://schemas.openxmlformats.org/officeDocument/2006/relationships" xmlns:p="http://schemas.openxmlformats.org/presentationml/2006/main">
-  <p:cSld>
-    <p:spTree>
-      <p:nvGrpSpPr>
-        <p:cNvPr id="1" name=""/>
-        <p:cNvGrpSpPr/>
-        <p:nvPr/>
-      </p:nvGrpSpPr>
-      <p:grpSpPr>
-        <a:xfrm>
-          <a:off x="0" y="0"/>
-          <a:ext cx="0" cy="0"/>
-          <a:chOff x="0" y="0"/>
-          <a:chExt cx="0" cy="0"/>
-        </a:xfrm>
-      </p:grpSpPr>
-      <p:sp>
-        <p:nvSpPr>
-          <p:cNvPr id="2" name="Title 1"/>
-          <p:cNvSpPr>
-            <a:spLocks noGrp="1"/>
-          </p:cNvSpPr>
-          <p:nvPr>
-            <p:ph type="title"/>
-          </p:nvPr>
-        </p:nvSpPr>
-        <p:spPr/>
-        <p:txBody>
-          <a:bodyPr/>
-          <a:lstStyle/>
-          <a:p>
-            <a:r>
-              <a:rPr lang="en-US" dirty="0" smtClean="0"/>
-              <a:t>Component of CSS</a:t>
-            </a:r>
-            <a:endParaRPr lang="en-US" dirty="0"/>
-          </a:p>
-        </p:txBody>
-      </p:sp>
-      <p:sp>
-        <p:nvSpPr>
-          <p:cNvPr id="3" name="Content Placeholder 2"/>
-          <p:cNvSpPr>
-            <a:spLocks noGrp="1"/>
-          </p:cNvSpPr>
-          <p:nvPr>
-            <p:ph idx="1"/>
-          </p:nvPr>
-        </p:nvSpPr>
-        <p:spPr/>
-        <p:txBody>
-          <a:bodyPr/>
-          <a:lstStyle/>
-          <a:p>
-            <a:r>
-              <a:rPr lang="en-US" dirty="0" smtClean="0"/>
-              <a:t>Selector</a:t>
-            </a:r>
-          </a:p>
-          <a:p>
-            <a:pPr lvl="1"/>
-            <a:r>
-              <a:rPr lang="en-US" dirty="0" smtClean="0"/>
-              <a:t>Id, class, tag</a:t>
-            </a:r>
-          </a:p>
-          <a:p>
-            <a:r>
-              <a:rPr lang="en-US" dirty="0" smtClean="0"/>
-              <a:t>Declaration</a:t>
-            </a:r>
-          </a:p>
-          <a:p>
-            <a:pPr lvl="1"/>
-            <a:r>
-              <a:rPr lang="en-US" dirty="0" smtClean="0"/>
-              <a:t>Rules</a:t>
-            </a:r>
-          </a:p>
-          <a:p>
-            <a:endParaRPr lang="en-US" dirty="0"/>
-          </a:p>
-        </p:txBody>
-      </p:sp>
-    </p:spTree>
-    <p:extLst>
-      <p:ext uri="{BB962C8B-B14F-4D97-AF65-F5344CB8AC3E}">
-        <p14:creationId xmlns:p14="http://schemas.microsoft.com/office/powerpoint/2010/main" val="2684417700"/>
-      </p:ext>
-    </p:extLst>
-  </p:cSld>
-  <p:clrMapOvr>
-    <a:masterClrMapping/>
-  </p:clrMapOvr>
-  <p:timing>
-    <p:tnLst>
-      <p:par>
-        <p:cTn xmlns:p14="http://schemas.microsoft.com/office/powerpoint/2010/main" id="1" dur="indefinite" restart="never" nodeType="tmRoot"/>
-      </p:par>
-    </p:tnLst>
-  </p:timing>
-</p:sld>
-</file>
-
 <file path=ppt/slides/slide8.xml><?xml version="1.0" encoding="utf-8"?>
 <p:sld xmlns:a="http://schemas.openxmlformats.org/drawingml/2006/main" xmlns:r="http://schemas.openxmlformats.org/officeDocument/2006/relationships" xmlns:p="http://schemas.openxmlformats.org/presentationml/2006/main">
   <p:cSld>
@@ -10689,12 +10196,8 @@
           <a:lstStyle/>
           <a:p>
             <a:r>
-              <a:rPr lang="en-US" dirty="0"/>
-              <a:t>S</a:t>
-            </a:r>
-            <a:r>
-              <a:rPr lang="en-US" dirty="0" smtClean="0"/>
-              <a:t>elector</a:t>
+              <a:rPr lang="en-US" dirty="0" smtClean="0"/>
+              <a:t>Component of CSS</a:t>
             </a:r>
             <a:endParaRPr lang="en-US" dirty="0"/>
           </a:p>
@@ -10702,263 +10205,53 @@
       </p:sp>
       <p:sp>
         <p:nvSpPr>
-          <p:cNvPr id="4" name="Rectangle 3"/>
-          <p:cNvSpPr/>
-          <p:nvPr/>
-        </p:nvSpPr>
-        <p:spPr>
-          <a:xfrm>
-            <a:off x="4378737" y="2134665"/>
-            <a:ext cx="3987014" cy="2031325"/>
-          </a:xfrm>
-          <a:prstGeom prst="rect">
-            <a:avLst/>
-          </a:prstGeom>
-        </p:spPr>
-        <p:txBody>
-          <a:bodyPr wrap="square">
-            <a:spAutoFit/>
-          </a:bodyPr>
-          <a:lstStyle/>
-          <a:p>
-            <a:r>
-              <a:rPr lang="en-US" dirty="0" smtClean="0"/>
-              <a:t>&lt;body&gt;</a:t>
-            </a:r>
-          </a:p>
-          <a:p>
-            <a:r>
-              <a:rPr lang="en-US" dirty="0"/>
-              <a:t> </a:t>
-            </a:r>
-            <a:r>
-              <a:rPr lang="en-US" dirty="0" smtClean="0"/>
-              <a:t>   &lt;</a:t>
-            </a:r>
-            <a:r>
-              <a:rPr lang="en-US" dirty="0"/>
-              <a:t>div class="container"&gt;</a:t>
-            </a:r>
-            <a:endParaRPr lang="en-US" dirty="0" smtClean="0"/>
-          </a:p>
-          <a:p>
-            <a:r>
-              <a:rPr lang="en-US" dirty="0"/>
-              <a:t> </a:t>
-            </a:r>
-            <a:r>
-              <a:rPr lang="en-US" dirty="0" smtClean="0"/>
-              <a:t>       &lt;div </a:t>
-            </a:r>
-            <a:r>
-              <a:rPr lang="en-US" dirty="0"/>
-              <a:t>id="content"&gt;</a:t>
-            </a:r>
-          </a:p>
-          <a:p>
-            <a:r>
-              <a:rPr lang="en-US" dirty="0"/>
-              <a:t>    </a:t>
-            </a:r>
-            <a:r>
-              <a:rPr lang="en-US" dirty="0" smtClean="0"/>
-              <a:t>    	&lt;</a:t>
-            </a:r>
-            <a:r>
-              <a:rPr lang="en-US" dirty="0"/>
-              <a:t>p&gt;main content&lt;/p</a:t>
-            </a:r>
-            <a:r>
-              <a:rPr lang="en-US" dirty="0" smtClean="0"/>
-              <a:t>&gt;</a:t>
-            </a:r>
-          </a:p>
-          <a:p>
-            <a:r>
-              <a:rPr lang="en-US" dirty="0" smtClean="0"/>
-              <a:t>        &lt;/div&gt;</a:t>
-            </a:r>
+          <p:cNvPr id="3" name="Content Placeholder 2"/>
+          <p:cNvSpPr>
+            <a:spLocks noGrp="1"/>
+          </p:cNvSpPr>
+          <p:nvPr>
+            <p:ph idx="1"/>
+          </p:nvPr>
+        </p:nvSpPr>
+        <p:spPr/>
+        <p:txBody>
+          <a:bodyPr/>
+          <a:lstStyle/>
+          <a:p>
+            <a:r>
+              <a:rPr lang="en-US" dirty="0" smtClean="0"/>
+              <a:t>Selector</a:t>
+            </a:r>
+          </a:p>
+          <a:p>
+            <a:pPr lvl="1"/>
+            <a:r>
+              <a:rPr lang="en-US" dirty="0" smtClean="0"/>
+              <a:t>Id, class, tag</a:t>
+            </a:r>
+          </a:p>
+          <a:p>
+            <a:r>
+              <a:rPr lang="en-US" dirty="0" smtClean="0"/>
+              <a:t>Declaration</a:t>
+            </a:r>
+          </a:p>
+          <a:p>
+            <a:pPr lvl="1"/>
+            <a:r>
+              <a:rPr lang="en-US" dirty="0" smtClean="0"/>
+              <a:t>Rules</a:t>
+            </a:r>
+          </a:p>
+          <a:p>
             <a:endParaRPr lang="en-US" dirty="0"/>
           </a:p>
-          <a:p>
-            <a:r>
-              <a:rPr lang="en-US" dirty="0" smtClean="0"/>
-              <a:t>    &lt;</a:t>
-            </a:r>
-            <a:r>
-              <a:rPr lang="en-US" dirty="0"/>
-              <a:t>/div</a:t>
-            </a:r>
-            <a:r>
-              <a:rPr lang="en-US" dirty="0" smtClean="0"/>
-              <a:t>&gt;</a:t>
-            </a:r>
-          </a:p>
-          <a:p>
-            <a:r>
-              <a:rPr lang="en-US" dirty="0" smtClean="0"/>
-              <a:t>&lt;/body&gt;</a:t>
-            </a:r>
-            <a:endParaRPr lang="en-US" dirty="0"/>
-          </a:p>
-        </p:txBody>
-      </p:sp>
-      <p:sp>
-        <p:nvSpPr>
-          <p:cNvPr id="6" name="Rectangle 5"/>
-          <p:cNvSpPr/>
-          <p:nvPr/>
-        </p:nvSpPr>
-        <p:spPr>
-          <a:xfrm>
-            <a:off x="574196" y="2144162"/>
-            <a:ext cx="3804541" cy="3416320"/>
-          </a:xfrm>
-          <a:prstGeom prst="rect">
-            <a:avLst/>
-          </a:prstGeom>
-        </p:spPr>
-        <p:txBody>
-          <a:bodyPr wrap="square">
-            <a:spAutoFit/>
-          </a:bodyPr>
-          <a:lstStyle/>
-          <a:p>
-            <a:r>
-              <a:rPr lang="en-US" dirty="0"/>
-              <a:t>b</a:t>
-            </a:r>
-            <a:r>
-              <a:rPr lang="en-US" dirty="0" smtClean="0"/>
-              <a:t>ody div div {</a:t>
-            </a:r>
-            <a:endParaRPr lang="en-US" dirty="0"/>
-          </a:p>
-          <a:p>
-            <a:r>
-              <a:rPr lang="en-US" dirty="0"/>
-              <a:t>    border: </a:t>
-            </a:r>
-            <a:r>
-              <a:rPr lang="en-US" dirty="0" smtClean="0"/>
-              <a:t>5px </a:t>
-            </a:r>
-            <a:r>
-              <a:rPr lang="en-US" dirty="0"/>
-              <a:t>solid </a:t>
-            </a:r>
-            <a:r>
-              <a:rPr lang="en-US" dirty="0" smtClean="0"/>
-              <a:t>red;</a:t>
-            </a:r>
-            <a:endParaRPr lang="en-US" dirty="0"/>
-          </a:p>
-          <a:p>
-            <a:r>
-              <a:rPr lang="en-US" dirty="0" smtClean="0"/>
-              <a:t>}</a:t>
-            </a:r>
-          </a:p>
-          <a:p>
-            <a:endParaRPr lang="en-US" dirty="0"/>
-          </a:p>
-          <a:p>
-            <a:r>
-              <a:rPr lang="en-US" dirty="0"/>
-              <a:t>b</a:t>
-            </a:r>
-            <a:r>
-              <a:rPr lang="en-US" dirty="0" smtClean="0"/>
-              <a:t>ody .container div {</a:t>
-            </a:r>
-          </a:p>
-          <a:p>
-            <a:r>
-              <a:rPr lang="en-US" dirty="0" smtClean="0"/>
-              <a:t>   </a:t>
-            </a:r>
-            <a:r>
-              <a:rPr lang="en-US" dirty="0"/>
-              <a:t>border: 5px solid red</a:t>
-            </a:r>
-            <a:r>
-              <a:rPr lang="en-US" dirty="0" smtClean="0"/>
-              <a:t>;</a:t>
-            </a:r>
-          </a:p>
-          <a:p>
-            <a:r>
-              <a:rPr lang="en-US" dirty="0" smtClean="0"/>
-              <a:t>}</a:t>
-            </a:r>
-          </a:p>
-          <a:p>
-            <a:endParaRPr lang="en-US" dirty="0"/>
-          </a:p>
-          <a:p>
-            <a:r>
-              <a:rPr lang="en-US" dirty="0"/>
-              <a:t>#</a:t>
-            </a:r>
-            <a:r>
-              <a:rPr lang="en-US" dirty="0" smtClean="0"/>
-              <a:t>content </a:t>
-            </a:r>
-            <a:r>
-              <a:rPr lang="en-US" dirty="0"/>
-              <a:t>{</a:t>
-            </a:r>
-          </a:p>
-          <a:p>
-            <a:r>
-              <a:rPr lang="en-US" dirty="0"/>
-              <a:t>   border: 5px solid red</a:t>
-            </a:r>
-            <a:r>
-              <a:rPr lang="en-US" dirty="0" smtClean="0"/>
-              <a:t>;</a:t>
-            </a:r>
-          </a:p>
-          <a:p>
-            <a:r>
-              <a:rPr lang="en-US" dirty="0" smtClean="0"/>
-              <a:t>}</a:t>
-            </a:r>
-            <a:endParaRPr lang="en-US" dirty="0"/>
-          </a:p>
-          <a:p>
-            <a:endParaRPr lang="en-US" dirty="0"/>
-          </a:p>
-        </p:txBody>
-      </p:sp>
-      <p:pic>
-        <p:nvPicPr>
-          <p:cNvPr id="7" name="Picture 6"/>
-          <p:cNvPicPr>
-            <a:picLocks noChangeAspect="1"/>
-          </p:cNvPicPr>
-          <p:nvPr/>
-        </p:nvPicPr>
-        <p:blipFill>
-          <a:blip r:embed="rId2"/>
-          <a:stretch>
-            <a:fillRect/>
-          </a:stretch>
-        </p:blipFill>
-        <p:spPr>
-          <a:xfrm>
-            <a:off x="1176134" y="5388910"/>
-            <a:ext cx="6985000" cy="927100"/>
-          </a:xfrm>
-          <a:prstGeom prst="rect">
-            <a:avLst/>
-          </a:prstGeom>
-        </p:spPr>
-      </p:pic>
+        </p:txBody>
+      </p:sp>
     </p:spTree>
     <p:extLst>
       <p:ext uri="{BB962C8B-B14F-4D97-AF65-F5344CB8AC3E}">
-        <p14:creationId xmlns:p14="http://schemas.microsoft.com/office/powerpoint/2010/main" val="2952412969"/>
+        <p14:creationId xmlns:p14="http://schemas.microsoft.com/office/powerpoint/2010/main" val="2684417700"/>
       </p:ext>
     </p:extLst>
   </p:cSld>
@@ -11008,8 +10301,12 @@
           <a:lstStyle/>
           <a:p>
             <a:r>
-              <a:rPr lang="en-US" dirty="0" smtClean="0"/>
-              <a:t>Selector performance</a:t>
+              <a:rPr lang="en-US" dirty="0"/>
+              <a:t>S</a:t>
+            </a:r>
+            <a:r>
+              <a:rPr lang="en-US" dirty="0" smtClean="0"/>
+              <a:t>elector</a:t>
             </a:r>
             <a:endParaRPr lang="en-US" dirty="0"/>
           </a:p>
@@ -11017,117 +10314,263 @@
       </p:sp>
       <p:sp>
         <p:nvSpPr>
-          <p:cNvPr id="3" name="Content Placeholder 2"/>
-          <p:cNvSpPr>
-            <a:spLocks noGrp="1"/>
-          </p:cNvSpPr>
-          <p:nvPr>
-            <p:ph idx="1"/>
-          </p:nvPr>
-        </p:nvSpPr>
-        <p:spPr/>
-        <p:txBody>
-          <a:bodyPr>
-            <a:normAutofit fontScale="85000" lnSpcReduction="20000"/>
+          <p:cNvPr id="4" name="Rectangle 3"/>
+          <p:cNvSpPr/>
+          <p:nvPr/>
+        </p:nvSpPr>
+        <p:spPr>
+          <a:xfrm>
+            <a:off x="4378737" y="2134665"/>
+            <a:ext cx="3987014" cy="2031325"/>
+          </a:xfrm>
+          <a:prstGeom prst="rect">
+            <a:avLst/>
+          </a:prstGeom>
+        </p:spPr>
+        <p:txBody>
+          <a:bodyPr wrap="square">
+            <a:spAutoFit/>
           </a:bodyPr>
           <a:lstStyle/>
           <a:p>
             <a:r>
               <a:rPr lang="en-US" dirty="0" smtClean="0"/>
-              <a:t>Id</a:t>
-            </a:r>
-          </a:p>
-          <a:p>
-            <a:r>
-              <a:rPr lang="en-US" dirty="0" smtClean="0"/>
-              <a:t>Class</a:t>
-            </a:r>
-          </a:p>
-          <a:p>
-            <a:r>
-              <a:rPr lang="en-US" dirty="0" smtClean="0"/>
-              <a:t>Tag</a:t>
-            </a:r>
-          </a:p>
-          <a:p>
-            <a:r>
-              <a:rPr lang="en-US" dirty="0" smtClean="0"/>
-              <a:t>Adjacent sibling (h1 + p)</a:t>
-            </a:r>
-          </a:p>
-          <a:p>
-            <a:r>
-              <a:rPr lang="en-US" dirty="0" smtClean="0"/>
-              <a:t>Child (</a:t>
-            </a:r>
-            <a:r>
-              <a:rPr lang="en-US" dirty="0" err="1" smtClean="0"/>
-              <a:t>ul</a:t>
-            </a:r>
+              <a:t>&lt;body&gt;</a:t>
+            </a:r>
+          </a:p>
+          <a:p>
             <a:r>
               <a:rPr lang="en-US" dirty="0"/>
               <a:t> </a:t>
             </a:r>
             <a:r>
               <a:rPr lang="en-US" dirty="0" smtClean="0"/>
-              <a:t>&gt; li)</a:t>
-            </a:r>
-          </a:p>
-          <a:p>
-            <a:r>
-              <a:rPr lang="en-US" dirty="0" smtClean="0"/>
-              <a:t>Descendent (li a)</a:t>
-            </a:r>
-          </a:p>
-          <a:p>
-            <a:r>
-              <a:rPr lang="en-US" dirty="0" smtClean="0"/>
-              <a:t>Universal (*)</a:t>
-            </a:r>
-          </a:p>
-          <a:p>
-            <a:r>
-              <a:rPr lang="en-US" dirty="0" smtClean="0"/>
-              <a:t>Attribute (a[</a:t>
-            </a:r>
-            <a:r>
-              <a:rPr lang="en-US" dirty="0" err="1" smtClean="0"/>
-              <a:t>rel</a:t>
-            </a:r>
-            <a:r>
-              <a:rPr lang="en-US" dirty="0" smtClean="0"/>
-              <a:t>=“external”])</a:t>
-            </a:r>
-          </a:p>
-          <a:p>
-            <a:r>
-              <a:rPr lang="en-US" dirty="0" smtClean="0"/>
-              <a:t>Pseudo-class and pseudo-element (</a:t>
-            </a:r>
-            <a:r>
-              <a:rPr lang="en-US" dirty="0" err="1" smtClean="0"/>
-              <a:t>a:hover</a:t>
-            </a:r>
-            <a:r>
-              <a:rPr lang="en-US" dirty="0" smtClean="0"/>
-              <a:t>, </a:t>
-            </a:r>
-            <a:r>
-              <a:rPr lang="en-US" dirty="0" err="1" smtClean="0"/>
-              <a:t>li:first</a:t>
-            </a:r>
-            <a:r>
-              <a:rPr lang="en-US" dirty="0" smtClean="0"/>
-              <a:t>)</a:t>
+              <a:t>   &lt;</a:t>
+            </a:r>
+            <a:r>
+              <a:rPr lang="en-US" dirty="0"/>
+              <a:t>div class="container"&gt;</a:t>
+            </a:r>
+            <a:endParaRPr lang="en-US" dirty="0" smtClean="0"/>
+          </a:p>
+          <a:p>
+            <a:r>
+              <a:rPr lang="en-US" dirty="0"/>
+              <a:t> </a:t>
+            </a:r>
+            <a:r>
+              <a:rPr lang="en-US" dirty="0" smtClean="0"/>
+              <a:t>       &lt;div </a:t>
+            </a:r>
+            <a:r>
+              <a:rPr lang="en-US" dirty="0"/>
+              <a:t>id="content"&gt;</a:t>
+            </a:r>
+          </a:p>
+          <a:p>
+            <a:r>
+              <a:rPr lang="en-US" dirty="0"/>
+              <a:t>    </a:t>
+            </a:r>
+            <a:r>
+              <a:rPr lang="en-US" dirty="0" smtClean="0"/>
+              <a:t>    	&lt;</a:t>
+            </a:r>
+            <a:r>
+              <a:rPr lang="en-US" dirty="0"/>
+              <a:t>p&gt;main content&lt;/p</a:t>
+            </a:r>
+            <a:r>
+              <a:rPr lang="en-US" dirty="0" smtClean="0"/>
+              <a:t>&gt;</a:t>
+            </a:r>
+          </a:p>
+          <a:p>
+            <a:r>
+              <a:rPr lang="en-US" dirty="0" smtClean="0"/>
+              <a:t>        &lt;/div&gt;</a:t>
             </a:r>
             <a:endParaRPr lang="en-US" dirty="0"/>
           </a:p>
-        </p:txBody>
-      </p:sp>
+          <a:p>
+            <a:r>
+              <a:rPr lang="en-US" dirty="0" smtClean="0"/>
+              <a:t>    &lt;</a:t>
+            </a:r>
+            <a:r>
+              <a:rPr lang="en-US" dirty="0"/>
+              <a:t>/div</a:t>
+            </a:r>
+            <a:r>
+              <a:rPr lang="en-US" dirty="0" smtClean="0"/>
+              <a:t>&gt;</a:t>
+            </a:r>
+          </a:p>
+          <a:p>
+            <a:r>
+              <a:rPr lang="en-US" dirty="0" smtClean="0"/>
+              <a:t>&lt;/body&gt;</a:t>
+            </a:r>
+            <a:endParaRPr lang="en-US" dirty="0"/>
+          </a:p>
+        </p:txBody>
+      </p:sp>
+      <p:sp>
+        <p:nvSpPr>
+          <p:cNvPr id="6" name="Rectangle 5"/>
+          <p:cNvSpPr/>
+          <p:nvPr/>
+        </p:nvSpPr>
+        <p:spPr>
+          <a:xfrm>
+            <a:off x="574196" y="2144162"/>
+            <a:ext cx="3804541" cy="3416320"/>
+          </a:xfrm>
+          <a:prstGeom prst="rect">
+            <a:avLst/>
+          </a:prstGeom>
+        </p:spPr>
+        <p:txBody>
+          <a:bodyPr wrap="square">
+            <a:spAutoFit/>
+          </a:bodyPr>
+          <a:lstStyle/>
+          <a:p>
+            <a:r>
+              <a:rPr lang="en-US" dirty="0"/>
+              <a:t>b</a:t>
+            </a:r>
+            <a:r>
+              <a:rPr lang="en-US" dirty="0" smtClean="0"/>
+              <a:t>ody div div {</a:t>
+            </a:r>
+            <a:endParaRPr lang="en-US" dirty="0"/>
+          </a:p>
+          <a:p>
+            <a:r>
+              <a:rPr lang="en-US" dirty="0"/>
+              <a:t>    border: </a:t>
+            </a:r>
+            <a:r>
+              <a:rPr lang="en-US" dirty="0" smtClean="0"/>
+              <a:t>5px </a:t>
+            </a:r>
+            <a:r>
+              <a:rPr lang="en-US" dirty="0"/>
+              <a:t>solid </a:t>
+            </a:r>
+            <a:r>
+              <a:rPr lang="en-US" dirty="0" smtClean="0"/>
+              <a:t>red;</a:t>
+            </a:r>
+            <a:endParaRPr lang="en-US" dirty="0"/>
+          </a:p>
+          <a:p>
+            <a:r>
+              <a:rPr lang="en-US" dirty="0" smtClean="0"/>
+              <a:t>}</a:t>
+            </a:r>
+          </a:p>
+          <a:p>
+            <a:endParaRPr lang="en-US" dirty="0"/>
+          </a:p>
+          <a:p>
+            <a:r>
+              <a:rPr lang="en-US" dirty="0"/>
+              <a:t>b</a:t>
+            </a:r>
+            <a:r>
+              <a:rPr lang="en-US" dirty="0" smtClean="0"/>
+              <a:t>ody .container div {</a:t>
+            </a:r>
+          </a:p>
+          <a:p>
+            <a:r>
+              <a:rPr lang="en-US" dirty="0" smtClean="0"/>
+              <a:t>   </a:t>
+            </a:r>
+            <a:r>
+              <a:rPr lang="en-US" dirty="0"/>
+              <a:t>border: 5px solid red</a:t>
+            </a:r>
+            <a:r>
+              <a:rPr lang="en-US" dirty="0" smtClean="0"/>
+              <a:t>;</a:t>
+            </a:r>
+          </a:p>
+          <a:p>
+            <a:r>
+              <a:rPr lang="en-US" dirty="0" smtClean="0"/>
+              <a:t>}</a:t>
+            </a:r>
+          </a:p>
+          <a:p>
+            <a:endParaRPr lang="en-US" dirty="0"/>
+          </a:p>
+          <a:p>
+            <a:r>
+              <a:rPr lang="en-US" dirty="0"/>
+              <a:t>#</a:t>
+            </a:r>
+            <a:r>
+              <a:rPr lang="en-US" dirty="0" smtClean="0"/>
+              <a:t>content </a:t>
+            </a:r>
+            <a:r>
+              <a:rPr lang="en-US" dirty="0"/>
+              <a:t>{</a:t>
+            </a:r>
+          </a:p>
+          <a:p>
+            <a:r>
+              <a:rPr lang="en-US" dirty="0"/>
+              <a:t>   border: 5px solid red</a:t>
+            </a:r>
+            <a:r>
+              <a:rPr lang="en-US" dirty="0" smtClean="0"/>
+              <a:t>;</a:t>
+            </a:r>
+          </a:p>
+          <a:p>
+            <a:r>
+              <a:rPr lang="en-US" dirty="0" smtClean="0"/>
+              <a:t>}</a:t>
+            </a:r>
+            <a:endParaRPr lang="en-US" dirty="0"/>
+          </a:p>
+          <a:p>
+            <a:endParaRPr lang="en-US" dirty="0"/>
+          </a:p>
+        </p:txBody>
+      </p:sp>
+      <p:pic>
+        <p:nvPicPr>
+          <p:cNvPr id="7" name="Picture 6"/>
+          <p:cNvPicPr>
+            <a:picLocks noChangeAspect="1"/>
+          </p:cNvPicPr>
+          <p:nvPr/>
+        </p:nvPicPr>
+        <p:blipFill>
+          <a:blip r:embed="rId2"/>
+          <a:stretch>
+            <a:fillRect/>
+          </a:stretch>
+        </p:blipFill>
+        <p:spPr>
+          <a:xfrm>
+            <a:off x="1176134" y="5388910"/>
+            <a:ext cx="6985000" cy="927100"/>
+          </a:xfrm>
+          <a:prstGeom prst="rect">
+            <a:avLst/>
+          </a:prstGeom>
+        </p:spPr>
+      </p:pic>
     </p:spTree>
     <p:extLst>
       <p:ext uri="{BB962C8B-B14F-4D97-AF65-F5344CB8AC3E}">
-        <p14:creationId xmlns:p14="http://schemas.microsoft.com/office/powerpoint/2010/main" val="4045010217"/>
+        <p14:creationId xmlns:p14="http://schemas.microsoft.com/office/powerpoint/2010/main" val="2952412969"/>
       </p:ext>
     </p:extLst>
   </p:cSld>

</xml_diff>

<commit_message>
add and modify the ppt
</commit_message>
<xml_diff>
--- a/CSS/CSS.pptx
+++ b/CSS/CSS.pptx
@@ -11,16 +11,16 @@
     <p:sldId id="256" r:id="rId2"/>
     <p:sldId id="268" r:id="rId3"/>
     <p:sldId id="265" r:id="rId4"/>
-    <p:sldId id="278" r:id="rId5"/>
-    <p:sldId id="266" r:id="rId6"/>
-    <p:sldId id="257" r:id="rId7"/>
-    <p:sldId id="277" r:id="rId8"/>
-    <p:sldId id="261" r:id="rId9"/>
-    <p:sldId id="262" r:id="rId10"/>
-    <p:sldId id="269" r:id="rId11"/>
-    <p:sldId id="258" r:id="rId12"/>
-    <p:sldId id="270" r:id="rId13"/>
-    <p:sldId id="259" r:id="rId14"/>
+    <p:sldId id="266" r:id="rId5"/>
+    <p:sldId id="257" r:id="rId6"/>
+    <p:sldId id="277" r:id="rId7"/>
+    <p:sldId id="261" r:id="rId8"/>
+    <p:sldId id="262" r:id="rId9"/>
+    <p:sldId id="269" r:id="rId10"/>
+    <p:sldId id="258" r:id="rId11"/>
+    <p:sldId id="270" r:id="rId12"/>
+    <p:sldId id="259" r:id="rId13"/>
+    <p:sldId id="278" r:id="rId14"/>
     <p:sldId id="274" r:id="rId15"/>
     <p:sldId id="275" r:id="rId16"/>
     <p:sldId id="272" r:id="rId17"/>
@@ -7811,7 +7811,7 @@
           <a:p>
             <a:r>
               <a:rPr lang="en-US" dirty="0" smtClean="0"/>
-              <a:t>Declarations</a:t>
+              <a:t>Why it is Cascading</a:t>
             </a:r>
             <a:endParaRPr lang="en-US" dirty="0"/>
           </a:p>
@@ -7834,65 +7834,189 @@
           <a:p>
             <a:r>
               <a:rPr lang="en-US" dirty="0" smtClean="0"/>
-              <a:t>Property</a:t>
+              <a:t>Override the style</a:t>
             </a:r>
           </a:p>
           <a:p>
             <a:pPr lvl="1"/>
-            <a:r>
-              <a:rPr lang="en-US" dirty="0" smtClean="0"/>
-              <a:t>Position</a:t>
-            </a:r>
-          </a:p>
-          <a:p>
-            <a:pPr lvl="1"/>
-            <a:r>
-              <a:rPr lang="en-US" dirty="0" smtClean="0"/>
-              <a:t>Box</a:t>
-            </a:r>
-          </a:p>
-          <a:p>
-            <a:pPr lvl="1"/>
-            <a:r>
-              <a:rPr lang="en-US" dirty="0" smtClean="0"/>
-              <a:t>Other</a:t>
-            </a:r>
-          </a:p>
-          <a:p>
-            <a:pPr lvl="2"/>
-            <a:r>
-              <a:rPr lang="en-US" dirty="0" smtClean="0"/>
-              <a:t>Background, text</a:t>
-            </a:r>
-          </a:p>
-          <a:p>
-            <a:r>
-              <a:rPr lang="en-US" dirty="0" smtClean="0"/>
-              <a:t>Value</a:t>
-            </a:r>
-          </a:p>
-          <a:p>
-            <a:pPr lvl="1"/>
-            <a:r>
-              <a:rPr lang="en-US" dirty="0" smtClean="0">
-                <a:solidFill>
-                  <a:srgbClr val="FF0000"/>
-                </a:solidFill>
-              </a:rPr>
-              <a:t>Different kind of value</a:t>
-            </a:r>
-            <a:endParaRPr lang="en-US" dirty="0" smtClean="0">
-              <a:solidFill>
-                <a:srgbClr val="FF0000"/>
-              </a:solidFill>
-            </a:endParaRPr>
-          </a:p>
-        </p:txBody>
-      </p:sp>
+            <a:endParaRPr lang="en-US" dirty="0" smtClean="0"/>
+          </a:p>
+          <a:p>
+            <a:endParaRPr lang="en-US" dirty="0"/>
+          </a:p>
+        </p:txBody>
+      </p:sp>
+      <p:sp>
+        <p:nvSpPr>
+          <p:cNvPr id="4" name="Rectangle 3"/>
+          <p:cNvSpPr/>
+          <p:nvPr/>
+        </p:nvSpPr>
+        <p:spPr>
+          <a:xfrm>
+            <a:off x="508245" y="2791109"/>
+            <a:ext cx="4572000" cy="1754327"/>
+          </a:xfrm>
+          <a:prstGeom prst="rect">
+            <a:avLst/>
+          </a:prstGeom>
+        </p:spPr>
+        <p:txBody>
+          <a:bodyPr>
+            <a:spAutoFit/>
+          </a:bodyPr>
+          <a:lstStyle/>
+          <a:p>
+            <a:r>
+              <a:rPr lang="en-US" dirty="0" smtClean="0"/>
+              <a:t>&lt;div&gt;</a:t>
+            </a:r>
+          </a:p>
+          <a:p>
+            <a:r>
+              <a:rPr lang="en-US" dirty="0" smtClean="0"/>
+              <a:t>  This is a normal div</a:t>
+            </a:r>
+          </a:p>
+          <a:p>
+            <a:r>
+              <a:rPr lang="en-US" dirty="0" smtClean="0"/>
+              <a:t>&lt;/div&gt;</a:t>
+            </a:r>
+          </a:p>
+          <a:p>
+            <a:r>
+              <a:rPr lang="en-US" dirty="0" smtClean="0"/>
+              <a:t>&lt;div class="override"&gt;</a:t>
+            </a:r>
+          </a:p>
+          <a:p>
+            <a:r>
+              <a:rPr lang="en-US" dirty="0" smtClean="0"/>
+              <a:t>  The style of this div will be </a:t>
+            </a:r>
+            <a:r>
+              <a:rPr lang="en-US" dirty="0" err="1" smtClean="0"/>
+              <a:t>overrided</a:t>
+            </a:r>
+            <a:endParaRPr lang="en-US" dirty="0" smtClean="0"/>
+          </a:p>
+          <a:p>
+            <a:r>
+              <a:rPr lang="en-US" dirty="0" smtClean="0"/>
+              <a:t>&lt;/div&gt;</a:t>
+            </a:r>
+            <a:endParaRPr lang="en-US" dirty="0"/>
+          </a:p>
+        </p:txBody>
+      </p:sp>
+      <p:sp>
+        <p:nvSpPr>
+          <p:cNvPr id="5" name="Rectangle 4"/>
+          <p:cNvSpPr/>
+          <p:nvPr/>
+        </p:nvSpPr>
+        <p:spPr>
+          <a:xfrm>
+            <a:off x="5024701" y="2400498"/>
+            <a:ext cx="3755199" cy="2862323"/>
+          </a:xfrm>
+          <a:prstGeom prst="rect">
+            <a:avLst/>
+          </a:prstGeom>
+        </p:spPr>
+        <p:txBody>
+          <a:bodyPr wrap="square">
+            <a:spAutoFit/>
+          </a:bodyPr>
+          <a:lstStyle/>
+          <a:p>
+            <a:r>
+              <a:rPr lang="en-US" dirty="0"/>
+              <a:t>div {</a:t>
+            </a:r>
+          </a:p>
+          <a:p>
+            <a:r>
+              <a:rPr lang="en-US" dirty="0"/>
+              <a:t>  background-color: #ff0000;</a:t>
+            </a:r>
+          </a:p>
+          <a:p>
+            <a:r>
+              <a:rPr lang="en-US" dirty="0"/>
+              <a:t>  margin: 20px;</a:t>
+            </a:r>
+          </a:p>
+          <a:p>
+            <a:r>
+              <a:rPr lang="en-US" dirty="0"/>
+              <a:t>  height: 40px;</a:t>
+            </a:r>
+          </a:p>
+          <a:p>
+            <a:r>
+              <a:rPr lang="en-US" dirty="0"/>
+              <a:t>  width: 200px;</a:t>
+            </a:r>
+          </a:p>
+          <a:p>
+            <a:r>
+              <a:rPr lang="en-US" dirty="0"/>
+              <a:t>}</a:t>
+            </a:r>
+          </a:p>
+          <a:p>
+            <a:endParaRPr lang="en-US" dirty="0"/>
+          </a:p>
+          <a:p>
+            <a:r>
+              <a:rPr lang="en-US" dirty="0"/>
+              <a:t>.override {</a:t>
+            </a:r>
+          </a:p>
+          <a:p>
+            <a:r>
+              <a:rPr lang="en-US" dirty="0"/>
+              <a:t>  background-color: #00ff00;</a:t>
+            </a:r>
+          </a:p>
+          <a:p>
+            <a:r>
+              <a:rPr lang="en-US" dirty="0"/>
+              <a:t>}</a:t>
+            </a:r>
+          </a:p>
+        </p:txBody>
+      </p:sp>
+      <p:pic>
+        <p:nvPicPr>
+          <p:cNvPr id="6" name="Picture 5"/>
+          <p:cNvPicPr>
+            <a:picLocks noChangeAspect="1"/>
+          </p:cNvPicPr>
+          <p:nvPr/>
+        </p:nvPicPr>
+        <p:blipFill>
+          <a:blip r:embed="rId2"/>
+          <a:stretch>
+            <a:fillRect/>
+          </a:stretch>
+        </p:blipFill>
+        <p:spPr>
+          <a:xfrm>
+            <a:off x="1658828" y="4593286"/>
+            <a:ext cx="2959100" cy="1701800"/>
+          </a:xfrm>
+          <a:prstGeom prst="rect">
+            <a:avLst/>
+          </a:prstGeom>
+        </p:spPr>
+      </p:pic>
     </p:spTree>
     <p:extLst>
       <p:ext uri="{BB962C8B-B14F-4D97-AF65-F5344CB8AC3E}">
-        <p14:creationId xmlns:p14="http://schemas.microsoft.com/office/powerpoint/2010/main" val="650350762"/>
+        <p14:creationId xmlns:p14="http://schemas.microsoft.com/office/powerpoint/2010/main" val="2503540566"/>
       </p:ext>
     </p:extLst>
   </p:cSld>
@@ -7943,7 +8067,11 @@
           <a:p>
             <a:r>
               <a:rPr lang="en-US" dirty="0" smtClean="0"/>
-              <a:t>Why it is Cascading</a:t>
+              <a:t>Ways to </a:t>
+            </a:r>
+            <a:r>
+              <a:rPr lang="en-US" dirty="0" smtClean="0"/>
+              <a:t>write CSS</a:t>
             </a:r>
             <a:endParaRPr lang="en-US" dirty="0"/>
           </a:p>
@@ -7966,202 +8094,28 @@
           <a:p>
             <a:r>
               <a:rPr lang="en-US" dirty="0" smtClean="0"/>
-              <a:t>Different style source </a:t>
-            </a:r>
-          </a:p>
-          <a:p>
-            <a:pPr lvl="1"/>
-            <a:r>
-              <a:rPr lang="en-US" dirty="0" smtClean="0"/>
-              <a:t>User, Browser, Author</a:t>
-            </a:r>
-          </a:p>
-          <a:p>
-            <a:r>
-              <a:rPr lang="en-US" dirty="0" smtClean="0"/>
-              <a:t>Override the style</a:t>
-            </a:r>
-          </a:p>
-          <a:p>
-            <a:pPr lvl="1"/>
-            <a:endParaRPr lang="en-US" dirty="0" smtClean="0"/>
-          </a:p>
-          <a:p>
+              <a:t>Inline</a:t>
+            </a:r>
+          </a:p>
+          <a:p>
+            <a:r>
+              <a:rPr lang="en-US" dirty="0" smtClean="0"/>
+              <a:t>Internal Style Sheet</a:t>
+            </a:r>
+          </a:p>
+          <a:p>
+            <a:r>
+              <a:rPr lang="en-US" dirty="0" smtClean="0"/>
+              <a:t>External Style Sheet</a:t>
+            </a:r>
             <a:endParaRPr lang="en-US" dirty="0"/>
           </a:p>
         </p:txBody>
       </p:sp>
-      <p:sp>
-        <p:nvSpPr>
-          <p:cNvPr id="4" name="Rectangle 3"/>
-          <p:cNvSpPr/>
-          <p:nvPr/>
-        </p:nvSpPr>
-        <p:spPr>
-          <a:xfrm>
-            <a:off x="367125" y="3532031"/>
-            <a:ext cx="4572000" cy="1754327"/>
-          </a:xfrm>
-          <a:prstGeom prst="rect">
-            <a:avLst/>
-          </a:prstGeom>
-        </p:spPr>
-        <p:txBody>
-          <a:bodyPr>
-            <a:spAutoFit/>
-          </a:bodyPr>
-          <a:lstStyle/>
-          <a:p>
-            <a:r>
-              <a:rPr lang="en-US" dirty="0" smtClean="0"/>
-              <a:t>&lt;div&gt;</a:t>
-            </a:r>
-          </a:p>
-          <a:p>
-            <a:r>
-              <a:rPr lang="en-US" dirty="0" smtClean="0"/>
-              <a:t>  This is a normal div</a:t>
-            </a:r>
-          </a:p>
-          <a:p>
-            <a:r>
-              <a:rPr lang="en-US" dirty="0" smtClean="0"/>
-              <a:t>&lt;/div&gt;</a:t>
-            </a:r>
-          </a:p>
-          <a:p>
-            <a:r>
-              <a:rPr lang="en-US" dirty="0" smtClean="0"/>
-              <a:t>&lt;div class="override"&gt;</a:t>
-            </a:r>
-          </a:p>
-          <a:p>
-            <a:r>
-              <a:rPr lang="en-US" dirty="0" smtClean="0"/>
-              <a:t>  The style of this div will be </a:t>
-            </a:r>
-            <a:r>
-              <a:rPr lang="en-US" dirty="0" err="1" smtClean="0"/>
-              <a:t>overrided</a:t>
-            </a:r>
-            <a:endParaRPr lang="en-US" dirty="0" smtClean="0"/>
-          </a:p>
-          <a:p>
-            <a:r>
-              <a:rPr lang="en-US" dirty="0" smtClean="0"/>
-              <a:t>&lt;/div&gt;</a:t>
-            </a:r>
-            <a:endParaRPr lang="en-US" dirty="0"/>
-          </a:p>
-        </p:txBody>
-      </p:sp>
-      <p:sp>
-        <p:nvSpPr>
-          <p:cNvPr id="5" name="Rectangle 4"/>
-          <p:cNvSpPr/>
-          <p:nvPr/>
-        </p:nvSpPr>
-        <p:spPr>
-          <a:xfrm>
-            <a:off x="5024701" y="2453421"/>
-            <a:ext cx="3755199" cy="2862323"/>
-          </a:xfrm>
-          <a:prstGeom prst="rect">
-            <a:avLst/>
-          </a:prstGeom>
-        </p:spPr>
-        <p:txBody>
-          <a:bodyPr wrap="square">
-            <a:spAutoFit/>
-          </a:bodyPr>
-          <a:lstStyle/>
-          <a:p>
-            <a:r>
-              <a:rPr lang="en-US" dirty="0"/>
-              <a:t>div {</a:t>
-            </a:r>
-          </a:p>
-          <a:p>
-            <a:r>
-              <a:rPr lang="en-US" dirty="0"/>
-              <a:t>  background-color: #ff0000;</a:t>
-            </a:r>
-          </a:p>
-          <a:p>
-            <a:r>
-              <a:rPr lang="en-US" dirty="0"/>
-              <a:t>  margin: 20px;</a:t>
-            </a:r>
-          </a:p>
-          <a:p>
-            <a:r>
-              <a:rPr lang="en-US" dirty="0"/>
-              <a:t>  height: 40px;</a:t>
-            </a:r>
-          </a:p>
-          <a:p>
-            <a:r>
-              <a:rPr lang="en-US" dirty="0"/>
-              <a:t>  width: 200px;</a:t>
-            </a:r>
-          </a:p>
-          <a:p>
-            <a:r>
-              <a:rPr lang="en-US" dirty="0"/>
-              <a:t>}</a:t>
-            </a:r>
-          </a:p>
-          <a:p>
-            <a:endParaRPr lang="en-US" dirty="0"/>
-          </a:p>
-          <a:p>
-            <a:r>
-              <a:rPr lang="en-US" dirty="0"/>
-              <a:t>.override {</a:t>
-            </a:r>
-          </a:p>
-          <a:p>
-            <a:r>
-              <a:rPr lang="en-US" dirty="0"/>
-              <a:t>  background-color: #00ff00;</a:t>
-            </a:r>
-          </a:p>
-          <a:p>
-            <a:r>
-              <a:rPr lang="en-US" dirty="0"/>
-              <a:t>}</a:t>
-            </a:r>
-          </a:p>
-        </p:txBody>
-      </p:sp>
-      <p:pic>
-        <p:nvPicPr>
-          <p:cNvPr id="6" name="Picture 5"/>
-          <p:cNvPicPr>
-            <a:picLocks noChangeAspect="1"/>
-          </p:cNvPicPr>
-          <p:nvPr/>
-        </p:nvPicPr>
-        <p:blipFill>
-          <a:blip r:embed="rId2"/>
-          <a:stretch>
-            <a:fillRect/>
-          </a:stretch>
-        </p:blipFill>
-        <p:spPr>
-          <a:xfrm>
-            <a:off x="1747028" y="5140157"/>
-            <a:ext cx="2959100" cy="1701800"/>
-          </a:xfrm>
-          <a:prstGeom prst="rect">
-            <a:avLst/>
-          </a:prstGeom>
-        </p:spPr>
-      </p:pic>
     </p:spTree>
     <p:extLst>
       <p:ext uri="{BB962C8B-B14F-4D97-AF65-F5344CB8AC3E}">
-        <p14:creationId xmlns:p14="http://schemas.microsoft.com/office/powerpoint/2010/main" val="2503540566"/>
+        <p14:creationId xmlns:p14="http://schemas.microsoft.com/office/powerpoint/2010/main" val="717254940"/>
       </p:ext>
     </p:extLst>
   </p:cSld>
@@ -8212,11 +8166,7 @@
           <a:p>
             <a:r>
               <a:rPr lang="en-US" dirty="0" smtClean="0"/>
-              <a:t>Ways to </a:t>
-            </a:r>
-            <a:r>
-              <a:rPr lang="en-US" dirty="0" smtClean="0"/>
-              <a:t>write CSS</a:t>
+              <a:t>Single item</a:t>
             </a:r>
             <a:endParaRPr lang="en-US" dirty="0"/>
           </a:p>
@@ -8239,28 +8189,72 @@
           <a:p>
             <a:r>
               <a:rPr lang="en-US" dirty="0" smtClean="0"/>
-              <a:t>Inline</a:t>
-            </a:r>
-          </a:p>
-          <a:p>
-            <a:r>
-              <a:rPr lang="en-US" dirty="0" smtClean="0"/>
-              <a:t>Internal Style Sheet</a:t>
-            </a:r>
-          </a:p>
-          <a:p>
-            <a:r>
-              <a:rPr lang="en-US" dirty="0" smtClean="0"/>
-              <a:t>External Style Sheet</a:t>
-            </a:r>
-            <a:endParaRPr lang="en-US" dirty="0"/>
-          </a:p>
-        </p:txBody>
-      </p:sp>
+              <a:t>Button</a:t>
+            </a:r>
+          </a:p>
+          <a:p>
+            <a:pPr lvl="1"/>
+            <a:r>
+              <a:rPr lang="en-US" dirty="0" smtClean="0"/>
+              <a:t>Box model</a:t>
+            </a:r>
+          </a:p>
+          <a:p>
+            <a:pPr lvl="2"/>
+            <a:r>
+              <a:rPr lang="en-US" dirty="0" smtClean="0"/>
+              <a:t>Border, padding, margin</a:t>
+            </a:r>
+            <a:r>
+              <a:rPr lang="en-US" dirty="0" smtClean="0"/>
+              <a:t>, width, height</a:t>
+            </a:r>
+          </a:p>
+          <a:p>
+            <a:pPr lvl="1"/>
+            <a:r>
+              <a:rPr lang="en-US" dirty="0" smtClean="0"/>
+              <a:t>Background style</a:t>
+            </a:r>
+          </a:p>
+          <a:p>
+            <a:pPr lvl="1"/>
+            <a:r>
+              <a:rPr lang="en-US" dirty="0" smtClean="0"/>
+              <a:t>Text style</a:t>
+            </a:r>
+            <a:endParaRPr lang="en-US" dirty="0" smtClean="0"/>
+          </a:p>
+        </p:txBody>
+      </p:sp>
+      <p:pic>
+        <p:nvPicPr>
+          <p:cNvPr id="4" name="Picture 3"/>
+          <p:cNvPicPr>
+            <a:picLocks noChangeAspect="1"/>
+          </p:cNvPicPr>
+          <p:nvPr/>
+        </p:nvPicPr>
+        <p:blipFill>
+          <a:blip r:embed="rId2"/>
+          <a:stretch>
+            <a:fillRect/>
+          </a:stretch>
+        </p:blipFill>
+        <p:spPr>
+          <a:xfrm>
+            <a:off x="2767495" y="4134294"/>
+            <a:ext cx="3568700" cy="965200"/>
+          </a:xfrm>
+          <a:prstGeom prst="rect">
+            <a:avLst/>
+          </a:prstGeom>
+        </p:spPr>
+      </p:pic>
     </p:spTree>
     <p:extLst>
       <p:ext uri="{BB962C8B-B14F-4D97-AF65-F5344CB8AC3E}">
-        <p14:creationId xmlns:p14="http://schemas.microsoft.com/office/powerpoint/2010/main" val="717254940"/>
+        <p14:creationId xmlns:p14="http://schemas.microsoft.com/office/powerpoint/2010/main" val="283046464"/>
       </p:ext>
     </p:extLst>
   </p:cSld>
@@ -8311,7 +8305,7 @@
           <a:p>
             <a:r>
               <a:rPr lang="en-US" dirty="0" smtClean="0"/>
-              <a:t>Single item</a:t>
+              <a:t>Two items</a:t>
             </a:r>
             <a:endParaRPr lang="en-US" dirty="0"/>
           </a:p>
@@ -8334,41 +8328,23 @@
           <a:p>
             <a:r>
               <a:rPr lang="en-US" dirty="0" smtClean="0"/>
-              <a:t>Button</a:t>
+              <a:t>Margin collapse</a:t>
             </a:r>
           </a:p>
           <a:p>
             <a:pPr lvl="1"/>
             <a:r>
               <a:rPr lang="en-US" dirty="0" smtClean="0"/>
-              <a:t>Box model</a:t>
-            </a:r>
-          </a:p>
-          <a:p>
-            <a:pPr lvl="2"/>
-            <a:r>
-              <a:rPr lang="en-US" dirty="0" smtClean="0"/>
-              <a:t>Border, padding, margin</a:t>
-            </a:r>
-            <a:r>
-              <a:rPr lang="en-US" dirty="0" smtClean="0"/>
-              <a:t>, width, height</a:t>
+              <a:t>Vertical direction</a:t>
             </a:r>
           </a:p>
           <a:p>
             <a:pPr lvl="1"/>
             <a:r>
               <a:rPr lang="en-US" dirty="0" smtClean="0"/>
-              <a:t>Background style</a:t>
-            </a:r>
-          </a:p>
-          <a:p>
-            <a:pPr lvl="1"/>
-            <a:r>
-              <a:rPr lang="en-US" dirty="0" smtClean="0"/>
-              <a:t>Text style</a:t>
-            </a:r>
-            <a:endParaRPr lang="en-US" dirty="0" smtClean="0"/>
+              <a:t>Near margin</a:t>
+            </a:r>
+            <a:endParaRPr lang="en-US" dirty="0"/>
           </a:p>
         </p:txBody>
       </p:sp>
@@ -8388,8 +8364,32 @@
         </p:blipFill>
         <p:spPr>
           <a:xfrm>
-            <a:off x="2767495" y="4134294"/>
-            <a:ext cx="3568700" cy="965200"/>
+            <a:off x="1781430" y="3467100"/>
+            <a:ext cx="1524000" cy="2692400"/>
+          </a:xfrm>
+          <a:prstGeom prst="rect">
+            <a:avLst/>
+          </a:prstGeom>
+        </p:spPr>
+      </p:pic>
+      <p:pic>
+        <p:nvPicPr>
+          <p:cNvPr id="5" name="Picture 4"/>
+          <p:cNvPicPr>
+            <a:picLocks noChangeAspect="1"/>
+          </p:cNvPicPr>
+          <p:nvPr/>
+        </p:nvPicPr>
+        <p:blipFill>
+          <a:blip r:embed="rId3"/>
+          <a:stretch>
+            <a:fillRect/>
+          </a:stretch>
+        </p:blipFill>
+        <p:spPr>
+          <a:xfrm>
+            <a:off x="5203539" y="3357563"/>
+            <a:ext cx="1524000" cy="2768600"/>
           </a:xfrm>
           <a:prstGeom prst="rect">
             <a:avLst/>
@@ -8399,20 +8399,13 @@
     </p:spTree>
     <p:extLst>
       <p:ext uri="{BB962C8B-B14F-4D97-AF65-F5344CB8AC3E}">
-        <p14:creationId xmlns:p14="http://schemas.microsoft.com/office/powerpoint/2010/main" val="283046464"/>
+        <p14:creationId xmlns:p14="http://schemas.microsoft.com/office/powerpoint/2010/main" val="638422001"/>
       </p:ext>
     </p:extLst>
   </p:cSld>
   <p:clrMapOvr>
     <a:masterClrMapping/>
   </p:clrMapOvr>
-  <p:timing>
-    <p:tnLst>
-      <p:par>
-        <p:cTn xmlns:p14="http://schemas.microsoft.com/office/powerpoint/2010/main" id="1" dur="indefinite" restart="never" nodeType="tmRoot"/>
-      </p:par>
-    </p:tnLst>
-  </p:timing>
 </p:sld>
 </file>
 
@@ -8486,8 +8479,8 @@
         </p:nvSpPr>
         <p:spPr>
           <a:xfrm>
-            <a:off x="291541" y="2867259"/>
-            <a:ext cx="5513752" cy="1200329"/>
+            <a:off x="457198" y="2743772"/>
+            <a:ext cx="4446649" cy="2585323"/>
           </a:xfrm>
           <a:prstGeom prst="rect">
             <a:avLst/>
@@ -8500,28 +8493,75 @@
           <a:lstStyle/>
           <a:p>
             <a:r>
-              <a:rPr lang="en-US" dirty="0" smtClean="0"/>
+              <a:rPr lang="en-US" dirty="0"/>
               <a:t>&lt;section&gt;</a:t>
             </a:r>
           </a:p>
           <a:p>
             <a:r>
-              <a:rPr lang="en-US" dirty="0" smtClean="0"/>
-              <a:t>  &lt;span&gt; I want button on the left &lt;/span&gt;</a:t>
-            </a:r>
-          </a:p>
-          <a:p>
-            <a:r>
-              <a:rPr lang="en-US" dirty="0" smtClean="0"/>
-              <a:t>  &lt;input type="submit" class="button"/&gt;</a:t>
-            </a:r>
-          </a:p>
-          <a:p>
-            <a:r>
-              <a:rPr lang="en-US" dirty="0" smtClean="0"/>
-              <a:t>&lt;/section&gt;</a:t>
-            </a:r>
-            <a:endParaRPr lang="en-US" dirty="0"/>
+              <a:rPr lang="en-US" dirty="0"/>
+              <a:t>  &lt;</a:t>
+            </a:r>
+            <a:r>
+              <a:rPr lang="en-US" dirty="0" err="1"/>
+              <a:t>img</a:t>
+            </a:r>
+            <a:r>
+              <a:rPr lang="en-US" dirty="0"/>
+              <a:t> </a:t>
+            </a:r>
+            <a:r>
+              <a:rPr lang="en-US" dirty="0" err="1"/>
+              <a:t>src</a:t>
+            </a:r>
+            <a:r>
+              <a:rPr lang="en-US" dirty="0" smtClean="0"/>
+              <a:t>=“</a:t>
+            </a:r>
+            <a:r>
+              <a:rPr lang="en-US" dirty="0" err="1" smtClean="0"/>
+              <a:t>star.png</a:t>
+            </a:r>
+            <a:r>
+              <a:rPr lang="en-US" dirty="0" smtClean="0"/>
+              <a:t>"</a:t>
+            </a:r>
+            <a:r>
+              <a:rPr lang="en-US" dirty="0"/>
+              <a:t>/&gt; </a:t>
+            </a:r>
+          </a:p>
+          <a:p>
+            <a:r>
+              <a:rPr lang="en-US" dirty="0"/>
+              <a:t>  &lt;span&gt;</a:t>
+            </a:r>
+          </a:p>
+          <a:p>
+            <a:r>
+              <a:rPr lang="en-US" dirty="0"/>
+              <a:t>    I want button on the left, I want button on the left, I want button on the left, I want button on the left, I want button on the left</a:t>
+            </a:r>
+          </a:p>
+          <a:p>
+            <a:r>
+              <a:rPr lang="en-US" dirty="0"/>
+              <a:t>  &lt;/span</a:t>
+            </a:r>
+            <a:r>
+              <a:rPr lang="en-US" dirty="0" smtClean="0"/>
+              <a:t>&gt;</a:t>
+            </a:r>
+          </a:p>
+          <a:p>
+            <a:r>
+              <a:rPr lang="en-US" dirty="0" smtClean="0"/>
+              <a:t>&lt;</a:t>
+            </a:r>
+            <a:r>
+              <a:rPr lang="en-US" dirty="0"/>
+              <a:t>/section&gt;</a:t>
+            </a:r>
           </a:p>
         </p:txBody>
       </p:sp>
@@ -8533,8 +8573,8 @@
         </p:nvSpPr>
         <p:spPr>
           <a:xfrm>
-            <a:off x="5313090" y="2509982"/>
-            <a:ext cx="3304972" cy="1754327"/>
+            <a:off x="4903847" y="2282107"/>
+            <a:ext cx="3304972" cy="923330"/>
           </a:xfrm>
           <a:prstGeom prst="rect">
             <a:avLst/>
@@ -8547,28 +8587,14 @@
           <a:lstStyle/>
           <a:p>
             <a:r>
-              <a:rPr lang="en-US" dirty="0"/>
-              <a:t>span {</a:t>
-            </a:r>
-          </a:p>
-          <a:p>
-            <a:r>
-              <a:rPr lang="en-US" dirty="0"/>
-              <a:t>  background: #00ff00;</a:t>
-            </a:r>
-          </a:p>
-          <a:p>
-            <a:r>
-              <a:rPr lang="en-US" dirty="0" smtClean="0"/>
-              <a:t>}</a:t>
+              <a:rPr lang="en-US" dirty="0" err="1" smtClean="0"/>
+              <a:t>img</a:t>
+            </a:r>
+            <a:r>
+              <a:rPr lang="en-US" dirty="0" smtClean="0"/>
+              <a:t> {</a:t>
             </a:r>
             <a:endParaRPr lang="en-US" dirty="0"/>
-          </a:p>
-          <a:p>
-            <a:r>
-              <a:rPr lang="en-US" dirty="0"/>
-              <a:t>.button {</a:t>
-            </a:r>
           </a:p>
           <a:p>
             <a:r>
@@ -8586,7 +8612,7 @@
       </p:sp>
       <p:pic>
         <p:nvPicPr>
-          <p:cNvPr id="6" name="Picture 5"/>
+          <p:cNvPr id="7" name="Picture 6"/>
           <p:cNvPicPr>
             <a:picLocks noChangeAspect="1"/>
           </p:cNvPicPr>
@@ -8600,8 +8626,32 @@
         </p:blipFill>
         <p:spPr>
           <a:xfrm>
-            <a:off x="2731606" y="4925007"/>
-            <a:ext cx="3708400" cy="419100"/>
+            <a:off x="1916572" y="5106855"/>
+            <a:ext cx="3975100" cy="1333500"/>
+          </a:xfrm>
+          <a:prstGeom prst="rect">
+            <a:avLst/>
+          </a:prstGeom>
+        </p:spPr>
+      </p:pic>
+      <p:pic>
+        <p:nvPicPr>
+          <p:cNvPr id="8" name="Picture 7"/>
+          <p:cNvPicPr>
+            <a:picLocks noChangeAspect="1"/>
+          </p:cNvPicPr>
+          <p:nvPr/>
+        </p:nvPicPr>
+        <p:blipFill>
+          <a:blip r:embed="rId4"/>
+          <a:stretch>
+            <a:fillRect/>
+          </a:stretch>
+        </p:blipFill>
+        <p:spPr>
+          <a:xfrm>
+            <a:off x="4903847" y="3422650"/>
+            <a:ext cx="3759200" cy="1079500"/>
           </a:xfrm>
           <a:prstGeom prst="rect">
             <a:avLst/>
@@ -8956,14 +9006,200 @@
             </a:r>
             <a:r>
               <a:rPr lang="en-US" dirty="0" smtClean="0"/>
-              <a:t> properties</a:t>
-            </a:r>
-          </a:p>
-          <a:p>
-            <a:r>
-              <a:rPr lang="en-US" dirty="0" smtClean="0"/>
-              <a:t>Order</a:t>
-            </a:r>
+              <a:t> </a:t>
+            </a:r>
+            <a:r>
+              <a:rPr lang="en-US" dirty="0" smtClean="0"/>
+              <a:t>properties</a:t>
+            </a:r>
+            <a:endParaRPr lang="en-US" dirty="0" smtClean="0"/>
+          </a:p>
+        </p:txBody>
+      </p:sp>
+      <p:sp>
+        <p:nvSpPr>
+          <p:cNvPr id="4" name="Rectangle 3"/>
+          <p:cNvSpPr/>
+          <p:nvPr/>
+        </p:nvSpPr>
+        <p:spPr>
+          <a:xfrm>
+            <a:off x="368999" y="3416255"/>
+            <a:ext cx="4572000" cy="2031325"/>
+          </a:xfrm>
+          <a:prstGeom prst="rect">
+            <a:avLst/>
+          </a:prstGeom>
+        </p:spPr>
+        <p:txBody>
+          <a:bodyPr>
+            <a:spAutoFit/>
+          </a:bodyPr>
+          <a:lstStyle/>
+          <a:p>
+            <a:endParaRPr lang="en-US" dirty="0"/>
+          </a:p>
+          <a:p>
+            <a:r>
+              <a:rPr lang="en-US" dirty="0"/>
+              <a:t>header, </a:t>
+            </a:r>
+            <a:endParaRPr lang="en-US" dirty="0" smtClean="0"/>
+          </a:p>
+          <a:p>
+            <a:r>
+              <a:rPr lang="en-US" dirty="0" smtClean="0"/>
+              <a:t>article {</a:t>
+            </a:r>
+            <a:endParaRPr lang="en-US" dirty="0"/>
+          </a:p>
+          <a:p>
+            <a:r>
+              <a:rPr lang="en-US" dirty="0"/>
+              <a:t>	width: 1024px;</a:t>
+            </a:r>
+          </a:p>
+          <a:p>
+            <a:r>
+              <a:rPr lang="en-US" dirty="0"/>
+              <a:t>	margin: 0 auto;</a:t>
+            </a:r>
+          </a:p>
+          <a:p>
+            <a:r>
+              <a:rPr lang="en-US" dirty="0"/>
+              <a:t>	padding-bottom: 100px;</a:t>
+            </a:r>
+          </a:p>
+          <a:p>
+            <a:r>
+              <a:rPr lang="en-US" dirty="0"/>
+              <a:t>}</a:t>
+            </a:r>
+          </a:p>
+        </p:txBody>
+      </p:sp>
+      <p:sp>
+        <p:nvSpPr>
+          <p:cNvPr id="5" name="Rectangle 4"/>
+          <p:cNvSpPr/>
+          <p:nvPr/>
+        </p:nvSpPr>
+        <p:spPr>
+          <a:xfrm>
+            <a:off x="4173454" y="3411356"/>
+            <a:ext cx="4572000" cy="2862323"/>
+          </a:xfrm>
+          <a:prstGeom prst="rect">
+            <a:avLst/>
+          </a:prstGeom>
+        </p:spPr>
+        <p:txBody>
+          <a:bodyPr>
+            <a:spAutoFit/>
+          </a:bodyPr>
+          <a:lstStyle/>
+          <a:p>
+            <a:r>
+              <a:rPr lang="fr-FR" dirty="0"/>
+              <a:t>#content {</a:t>
+            </a:r>
+          </a:p>
+          <a:p>
+            <a:r>
+              <a:rPr lang="fr-FR" dirty="0"/>
+              <a:t>	</a:t>
+            </a:r>
+            <a:r>
+              <a:rPr lang="fr-FR" dirty="0" err="1"/>
+              <a:t>padding</a:t>
+            </a:r>
+            <a:r>
+              <a:rPr lang="fr-FR" dirty="0"/>
+              <a:t>: 40px 20px 0 30px</a:t>
+            </a:r>
+            <a:r>
+              <a:rPr lang="fr-FR" dirty="0" smtClean="0"/>
+              <a:t>;</a:t>
+            </a:r>
+          </a:p>
+          <a:p>
+            <a:r>
+              <a:rPr lang="fr-FR" dirty="0" smtClean="0"/>
+              <a:t>}</a:t>
+            </a:r>
+          </a:p>
+          <a:p>
+            <a:endParaRPr lang="fr-FR" dirty="0"/>
+          </a:p>
+          <a:p>
+            <a:r>
+              <a:rPr lang="fr-FR" dirty="0" smtClean="0"/>
+              <a:t>#content {</a:t>
+            </a:r>
+          </a:p>
+          <a:p>
+            <a:r>
+              <a:rPr lang="fr-FR" dirty="0"/>
+              <a:t>	</a:t>
+            </a:r>
+            <a:r>
+              <a:rPr lang="fr-FR" dirty="0" err="1" smtClean="0"/>
+              <a:t>padding</a:t>
+            </a:r>
+            <a:r>
+              <a:rPr lang="fr-FR" dirty="0" smtClean="0"/>
+              <a:t>-top: 40px;</a:t>
+            </a:r>
+          </a:p>
+          <a:p>
+            <a:r>
+              <a:rPr lang="fr-FR" dirty="0"/>
+              <a:t>	</a:t>
+            </a:r>
+            <a:r>
+              <a:rPr lang="fr-FR" dirty="0" err="1" smtClean="0"/>
+              <a:t>padding</a:t>
+            </a:r>
+            <a:r>
+              <a:rPr lang="fr-FR" dirty="0" smtClean="0"/>
+              <a:t>-right: 20px;</a:t>
+            </a:r>
+          </a:p>
+          <a:p>
+            <a:r>
+              <a:rPr lang="fr-FR" dirty="0"/>
+              <a:t>	</a:t>
+            </a:r>
+            <a:r>
+              <a:rPr lang="fr-FR" dirty="0" err="1" smtClean="0"/>
+              <a:t>padding-bottom</a:t>
+            </a:r>
+            <a:r>
+              <a:rPr lang="fr-FR" dirty="0" smtClean="0"/>
+              <a:t>: 0;</a:t>
+            </a:r>
+          </a:p>
+          <a:p>
+            <a:r>
+              <a:rPr lang="fr-FR" dirty="0"/>
+              <a:t>	</a:t>
+            </a:r>
+            <a:r>
+              <a:rPr lang="fr-FR" dirty="0" err="1" smtClean="0"/>
+              <a:t>padding-left</a:t>
+            </a:r>
+            <a:r>
+              <a:rPr lang="fr-FR" dirty="0" smtClean="0"/>
+              <a:t>: 30px;</a:t>
+            </a:r>
+          </a:p>
+          <a:p>
+            <a:r>
+              <a:rPr lang="fr-FR" dirty="0"/>
+              <a:t>}</a:t>
+            </a:r>
+            <a:endParaRPr lang="en-US" dirty="0"/>
           </a:p>
         </p:txBody>
       </p:sp>
@@ -9618,7 +9854,7 @@
           <a:p>
             <a:r>
               <a:rPr lang="en-US" dirty="0" smtClean="0"/>
-              <a:t>Two box models</a:t>
+              <a:t>Document flow</a:t>
             </a:r>
             <a:endParaRPr lang="en-US" dirty="0"/>
           </a:p>
@@ -9639,20 +9875,151 @@
           <a:bodyPr/>
           <a:lstStyle/>
           <a:p>
-            <a:endParaRPr lang="en-US"/>
+            <a:r>
+              <a:rPr lang="en-US" dirty="0" smtClean="0"/>
+              <a:t>block, inline</a:t>
+            </a:r>
+            <a:endParaRPr lang="en-US" dirty="0"/>
+          </a:p>
+        </p:txBody>
+      </p:sp>
+      <p:pic>
+        <p:nvPicPr>
+          <p:cNvPr id="4" name="Picture 3"/>
+          <p:cNvPicPr>
+            <a:picLocks noChangeAspect="1"/>
+          </p:cNvPicPr>
+          <p:nvPr/>
+        </p:nvPicPr>
+        <p:blipFill>
+          <a:blip r:embed="rId2"/>
+          <a:stretch>
+            <a:fillRect/>
+          </a:stretch>
+        </p:blipFill>
+        <p:spPr>
+          <a:xfrm>
+            <a:off x="204305" y="5376825"/>
+            <a:ext cx="8763000" cy="863600"/>
+          </a:xfrm>
+          <a:prstGeom prst="rect">
+            <a:avLst/>
+          </a:prstGeom>
+        </p:spPr>
+      </p:pic>
+      <p:sp>
+        <p:nvSpPr>
+          <p:cNvPr id="5" name="Rectangle 4"/>
+          <p:cNvSpPr/>
+          <p:nvPr/>
+        </p:nvSpPr>
+        <p:spPr>
+          <a:xfrm>
+            <a:off x="1720009" y="2892988"/>
+            <a:ext cx="5154825" cy="2031325"/>
+          </a:xfrm>
+          <a:prstGeom prst="rect">
+            <a:avLst/>
+          </a:prstGeom>
+        </p:spPr>
+        <p:txBody>
+          <a:bodyPr wrap="square">
+            <a:spAutoFit/>
+          </a:bodyPr>
+          <a:lstStyle/>
+          <a:p>
+            <a:r>
+              <a:rPr lang="en-US" dirty="0"/>
+              <a:t>&lt;p class</a:t>
+            </a:r>
+            <a:r>
+              <a:rPr lang="en-US" dirty="0" smtClean="0"/>
+              <a:t>=”red"</a:t>
+            </a:r>
+            <a:r>
+              <a:rPr lang="en-US" dirty="0"/>
+              <a:t>&gt;</a:t>
+            </a:r>
+          </a:p>
+          <a:p>
+            <a:r>
+              <a:rPr lang="en-US" dirty="0"/>
+              <a:t>  This is a block element</a:t>
+            </a:r>
+          </a:p>
+          <a:p>
+            <a:r>
+              <a:rPr lang="en-US" dirty="0"/>
+              <a:t>&lt;/p&gt;</a:t>
+            </a:r>
+          </a:p>
+          <a:p>
+            <a:r>
+              <a:rPr lang="en-US" dirty="0"/>
+              <a:t>&lt;p class</a:t>
+            </a:r>
+            <a:r>
+              <a:rPr lang="en-US" dirty="0" smtClean="0"/>
+              <a:t>=”red"</a:t>
+            </a:r>
+            <a:r>
+              <a:rPr lang="en-US" dirty="0"/>
+              <a:t>&gt;</a:t>
+            </a:r>
+          </a:p>
+          <a:p>
+            <a:r>
+              <a:rPr lang="en-US" dirty="0"/>
+              <a:t>  &lt;</a:t>
+            </a:r>
+            <a:r>
+              <a:rPr lang="en-US" dirty="0" err="1"/>
+              <a:t>em</a:t>
+            </a:r>
+            <a:r>
+              <a:rPr lang="en-US" dirty="0"/>
+              <a:t>&gt;this is a inline element&lt;/</a:t>
+            </a:r>
+            <a:r>
+              <a:rPr lang="en-US" dirty="0" err="1"/>
+              <a:t>em</a:t>
+            </a:r>
+            <a:r>
+              <a:rPr lang="en-US" dirty="0"/>
+              <a:t>&gt;</a:t>
+            </a:r>
+          </a:p>
+          <a:p>
+            <a:r>
+              <a:rPr lang="en-US" dirty="0"/>
+              <a:t>  &lt;span&gt;this is also a inline element&lt;/span&gt;</a:t>
+            </a:r>
+          </a:p>
+          <a:p>
+            <a:r>
+              <a:rPr lang="en-US" dirty="0"/>
+              <a:t>&lt;/p&gt;</a:t>
+            </a:r>
           </a:p>
         </p:txBody>
       </p:sp>
     </p:spTree>
     <p:extLst>
       <p:ext uri="{BB962C8B-B14F-4D97-AF65-F5344CB8AC3E}">
-        <p14:creationId xmlns:p14="http://schemas.microsoft.com/office/powerpoint/2010/main" val="4143059879"/>
+        <p14:creationId xmlns:p14="http://schemas.microsoft.com/office/powerpoint/2010/main" val="1468592906"/>
       </p:ext>
     </p:extLst>
   </p:cSld>
   <p:clrMapOvr>
     <a:masterClrMapping/>
   </p:clrMapOvr>
+  <p:timing>
+    <p:tnLst>
+      <p:par>
+        <p:cTn xmlns:p14="http://schemas.microsoft.com/office/powerpoint/2010/main" id="1" dur="indefinite" restart="never" nodeType="tmRoot"/>
+      </p:par>
+    </p:tnLst>
+  </p:timing>
 </p:sld>
 </file>
 
@@ -9690,193 +10057,6 @@
           <a:p>
             <a:r>
               <a:rPr lang="en-US" dirty="0" smtClean="0"/>
-              <a:t>Document flow</a:t>
-            </a:r>
-            <a:endParaRPr lang="en-US" dirty="0"/>
-          </a:p>
-        </p:txBody>
-      </p:sp>
-      <p:sp>
-        <p:nvSpPr>
-          <p:cNvPr id="3" name="Content Placeholder 2"/>
-          <p:cNvSpPr>
-            <a:spLocks noGrp="1"/>
-          </p:cNvSpPr>
-          <p:nvPr>
-            <p:ph idx="1"/>
-          </p:nvPr>
-        </p:nvSpPr>
-        <p:spPr/>
-        <p:txBody>
-          <a:bodyPr/>
-          <a:lstStyle/>
-          <a:p>
-            <a:r>
-              <a:rPr lang="en-US" dirty="0" smtClean="0"/>
-              <a:t>block, inline</a:t>
-            </a:r>
-            <a:endParaRPr lang="en-US" dirty="0"/>
-          </a:p>
-        </p:txBody>
-      </p:sp>
-      <p:pic>
-        <p:nvPicPr>
-          <p:cNvPr id="4" name="Picture 3"/>
-          <p:cNvPicPr>
-            <a:picLocks noChangeAspect="1"/>
-          </p:cNvPicPr>
-          <p:nvPr/>
-        </p:nvPicPr>
-        <p:blipFill>
-          <a:blip r:embed="rId2"/>
-          <a:stretch>
-            <a:fillRect/>
-          </a:stretch>
-        </p:blipFill>
-        <p:spPr>
-          <a:xfrm>
-            <a:off x="204305" y="5376825"/>
-            <a:ext cx="8763000" cy="863600"/>
-          </a:xfrm>
-          <a:prstGeom prst="rect">
-            <a:avLst/>
-          </a:prstGeom>
-        </p:spPr>
-      </p:pic>
-      <p:sp>
-        <p:nvSpPr>
-          <p:cNvPr id="5" name="Rectangle 4"/>
-          <p:cNvSpPr/>
-          <p:nvPr/>
-        </p:nvSpPr>
-        <p:spPr>
-          <a:xfrm>
-            <a:off x="1720009" y="2892988"/>
-            <a:ext cx="5154825" cy="2031325"/>
-          </a:xfrm>
-          <a:prstGeom prst="rect">
-            <a:avLst/>
-          </a:prstGeom>
-        </p:spPr>
-        <p:txBody>
-          <a:bodyPr wrap="square">
-            <a:spAutoFit/>
-          </a:bodyPr>
-          <a:lstStyle/>
-          <a:p>
-            <a:r>
-              <a:rPr lang="en-US" dirty="0"/>
-              <a:t>&lt;p class="block"&gt;</a:t>
-            </a:r>
-          </a:p>
-          <a:p>
-            <a:r>
-              <a:rPr lang="en-US" dirty="0"/>
-              <a:t>  This is a block element</a:t>
-            </a:r>
-          </a:p>
-          <a:p>
-            <a:r>
-              <a:rPr lang="en-US" dirty="0"/>
-              <a:t>&lt;/p&gt;</a:t>
-            </a:r>
-          </a:p>
-          <a:p>
-            <a:r>
-              <a:rPr lang="en-US" dirty="0"/>
-              <a:t>&lt;p class="block"&gt;</a:t>
-            </a:r>
-          </a:p>
-          <a:p>
-            <a:r>
-              <a:rPr lang="en-US" dirty="0"/>
-              <a:t>  &lt;</a:t>
-            </a:r>
-            <a:r>
-              <a:rPr lang="en-US" dirty="0" err="1"/>
-              <a:t>em</a:t>
-            </a:r>
-            <a:r>
-              <a:rPr lang="en-US" dirty="0"/>
-              <a:t>&gt;this is a inline element&lt;/</a:t>
-            </a:r>
-            <a:r>
-              <a:rPr lang="en-US" dirty="0" err="1"/>
-              <a:t>em</a:t>
-            </a:r>
-            <a:r>
-              <a:rPr lang="en-US" dirty="0"/>
-              <a:t>&gt;</a:t>
-            </a:r>
-          </a:p>
-          <a:p>
-            <a:r>
-              <a:rPr lang="en-US" dirty="0"/>
-              <a:t>  &lt;span&gt;this is also a inline element&lt;/span&gt;</a:t>
-            </a:r>
-          </a:p>
-          <a:p>
-            <a:r>
-              <a:rPr lang="en-US" dirty="0"/>
-              <a:t>&lt;/p&gt;</a:t>
-            </a:r>
-          </a:p>
-        </p:txBody>
-      </p:sp>
-    </p:spTree>
-    <p:extLst>
-      <p:ext uri="{BB962C8B-B14F-4D97-AF65-F5344CB8AC3E}">
-        <p14:creationId xmlns:p14="http://schemas.microsoft.com/office/powerpoint/2010/main" val="1468592906"/>
-      </p:ext>
-    </p:extLst>
-  </p:cSld>
-  <p:clrMapOvr>
-    <a:masterClrMapping/>
-  </p:clrMapOvr>
-  <p:timing>
-    <p:tnLst>
-      <p:par>
-        <p:cTn xmlns:p14="http://schemas.microsoft.com/office/powerpoint/2010/main" id="1" dur="indefinite" restart="never" nodeType="tmRoot"/>
-      </p:par>
-    </p:tnLst>
-  </p:timing>
-</p:sld>
-</file>
-
-<file path=ppt/slides/slide6.xml><?xml version="1.0" encoding="utf-8"?>
-<p:sld xmlns:a="http://schemas.openxmlformats.org/drawingml/2006/main" xmlns:r="http://schemas.openxmlformats.org/officeDocument/2006/relationships" xmlns:p="http://schemas.openxmlformats.org/presentationml/2006/main">
-  <p:cSld>
-    <p:spTree>
-      <p:nvGrpSpPr>
-        <p:cNvPr id="1" name=""/>
-        <p:cNvGrpSpPr/>
-        <p:nvPr/>
-      </p:nvGrpSpPr>
-      <p:grpSpPr>
-        <a:xfrm>
-          <a:off x="0" y="0"/>
-          <a:ext cx="0" cy="0"/>
-          <a:chOff x="0" y="0"/>
-          <a:chExt cx="0" cy="0"/>
-        </a:xfrm>
-      </p:grpSpPr>
-      <p:sp>
-        <p:nvSpPr>
-          <p:cNvPr id="2" name="Title 1"/>
-          <p:cNvSpPr>
-            <a:spLocks noGrp="1"/>
-          </p:cNvSpPr>
-          <p:nvPr>
-            <p:ph type="title"/>
-          </p:nvPr>
-        </p:nvSpPr>
-        <p:spPr/>
-        <p:txBody>
-          <a:bodyPr/>
-          <a:lstStyle/>
-          <a:p>
-            <a:r>
-              <a:rPr lang="en-US" dirty="0" smtClean="0"/>
               <a:t>What is CSS</a:t>
             </a:r>
             <a:endParaRPr lang="en-US" dirty="0"/>
@@ -9953,7 +10133,7 @@
 </p:sld>
 </file>
 
-<file path=ppt/slides/slide7.xml><?xml version="1.0" encoding="utf-8"?>
+<file path=ppt/slides/slide6.xml><?xml version="1.0" encoding="utf-8"?>
 <p:sld xmlns:a="http://schemas.openxmlformats.org/drawingml/2006/main" xmlns:r="http://schemas.openxmlformats.org/officeDocument/2006/relationships" xmlns:p="http://schemas.openxmlformats.org/presentationml/2006/main">
   <p:cSld>
     <p:spTree>
@@ -10163,6 +10343,189 @@
 </p:sld>
 </file>
 
+<file path=ppt/slides/slide7.xml><?xml version="1.0" encoding="utf-8"?>
+<p:sld xmlns:a="http://schemas.openxmlformats.org/drawingml/2006/main" xmlns:r="http://schemas.openxmlformats.org/officeDocument/2006/relationships" xmlns:p="http://schemas.openxmlformats.org/presentationml/2006/main">
+  <p:cSld>
+    <p:spTree>
+      <p:nvGrpSpPr>
+        <p:cNvPr id="1" name=""/>
+        <p:cNvGrpSpPr/>
+        <p:nvPr/>
+      </p:nvGrpSpPr>
+      <p:grpSpPr>
+        <a:xfrm>
+          <a:off x="0" y="0"/>
+          <a:ext cx="0" cy="0"/>
+          <a:chOff x="0" y="0"/>
+          <a:chExt cx="0" cy="0"/>
+        </a:xfrm>
+      </p:grpSpPr>
+      <p:sp>
+        <p:nvSpPr>
+          <p:cNvPr id="2" name="Title 1"/>
+          <p:cNvSpPr>
+            <a:spLocks noGrp="1"/>
+          </p:cNvSpPr>
+          <p:nvPr>
+            <p:ph type="title"/>
+          </p:nvPr>
+        </p:nvSpPr>
+        <p:spPr/>
+        <p:txBody>
+          <a:bodyPr/>
+          <a:lstStyle/>
+          <a:p>
+            <a:r>
+              <a:rPr lang="en-US" dirty="0" smtClean="0"/>
+              <a:t>Component of CSS</a:t>
+            </a:r>
+            <a:endParaRPr lang="en-US" dirty="0"/>
+          </a:p>
+        </p:txBody>
+      </p:sp>
+      <p:sp>
+        <p:nvSpPr>
+          <p:cNvPr id="3" name="Content Placeholder 2"/>
+          <p:cNvSpPr>
+            <a:spLocks noGrp="1"/>
+          </p:cNvSpPr>
+          <p:nvPr>
+            <p:ph idx="1"/>
+          </p:nvPr>
+        </p:nvSpPr>
+        <p:spPr/>
+        <p:txBody>
+          <a:bodyPr/>
+          <a:lstStyle/>
+          <a:p>
+            <a:r>
+              <a:rPr lang="en-US" dirty="0" smtClean="0"/>
+              <a:t>Selector</a:t>
+            </a:r>
+          </a:p>
+          <a:p>
+            <a:pPr lvl="1"/>
+            <a:r>
+              <a:rPr lang="en-US" dirty="0" smtClean="0"/>
+              <a:t>Id, class, tag</a:t>
+            </a:r>
+          </a:p>
+          <a:p>
+            <a:r>
+              <a:rPr lang="en-US" dirty="0" smtClean="0"/>
+              <a:t>Declaration</a:t>
+            </a:r>
+          </a:p>
+          <a:p>
+            <a:pPr lvl="1"/>
+            <a:r>
+              <a:rPr lang="en-US" dirty="0" smtClean="0"/>
+              <a:t>Rules</a:t>
+            </a:r>
+          </a:p>
+          <a:p>
+            <a:endParaRPr lang="en-US" dirty="0"/>
+          </a:p>
+        </p:txBody>
+      </p:sp>
+      <p:sp>
+        <p:nvSpPr>
+          <p:cNvPr id="4" name="Rectangle 3"/>
+          <p:cNvSpPr/>
+          <p:nvPr/>
+        </p:nvSpPr>
+        <p:spPr>
+          <a:xfrm>
+            <a:off x="3220906" y="3713345"/>
+            <a:ext cx="4572000" cy="1477328"/>
+          </a:xfrm>
+          <a:prstGeom prst="rect">
+            <a:avLst/>
+          </a:prstGeom>
+        </p:spPr>
+        <p:txBody>
+          <a:bodyPr>
+            <a:spAutoFit/>
+          </a:bodyPr>
+          <a:lstStyle/>
+          <a:p>
+            <a:r>
+              <a:rPr lang="en-US" dirty="0" smtClean="0"/>
+              <a:t>#container .</a:t>
+            </a:r>
+            <a:r>
+              <a:rPr lang="en-US" dirty="0" err="1" smtClean="0"/>
+              <a:t>nav</a:t>
+            </a:r>
+            <a:r>
+              <a:rPr lang="en-US" dirty="0" smtClean="0"/>
+              <a:t> a {</a:t>
+            </a:r>
+            <a:endParaRPr lang="en-US" dirty="0"/>
+          </a:p>
+          <a:p>
+            <a:r>
+              <a:rPr lang="en-US" dirty="0"/>
+              <a:t> </a:t>
+            </a:r>
+            <a:r>
+              <a:rPr lang="en-US" dirty="0" smtClean="0"/>
+              <a:t>     width</a:t>
+            </a:r>
+            <a:r>
+              <a:rPr lang="en-US" dirty="0"/>
+              <a:t>:100px;</a:t>
+            </a:r>
+          </a:p>
+          <a:p>
+            <a:r>
+              <a:rPr lang="en-US" dirty="0" smtClean="0"/>
+              <a:t>      height</a:t>
+            </a:r>
+            <a:r>
+              <a:rPr lang="en-US" dirty="0"/>
+              <a:t>:100px;</a:t>
+            </a:r>
+          </a:p>
+          <a:p>
+            <a:r>
+              <a:rPr lang="en-US" dirty="0" smtClean="0"/>
+              <a:t>      background</a:t>
+            </a:r>
+            <a:r>
+              <a:rPr lang="en-US" dirty="0"/>
+              <a:t>:#C90502;</a:t>
+            </a:r>
+          </a:p>
+          <a:p>
+            <a:r>
+              <a:rPr lang="en-US" dirty="0" smtClean="0"/>
+              <a:t>}</a:t>
+            </a:r>
+            <a:endParaRPr lang="en-US" dirty="0"/>
+          </a:p>
+        </p:txBody>
+      </p:sp>
+    </p:spTree>
+    <p:extLst>
+      <p:ext uri="{BB962C8B-B14F-4D97-AF65-F5344CB8AC3E}">
+        <p14:creationId xmlns:p14="http://schemas.microsoft.com/office/powerpoint/2010/main" val="2684417700"/>
+      </p:ext>
+    </p:extLst>
+  </p:cSld>
+  <p:clrMapOvr>
+    <a:masterClrMapping/>
+  </p:clrMapOvr>
+  <p:timing>
+    <p:tnLst>
+      <p:par>
+        <p:cTn xmlns:p14="http://schemas.microsoft.com/office/powerpoint/2010/main" id="1" dur="indefinite" restart="never" nodeType="tmRoot"/>
+      </p:par>
+    </p:tnLst>
+  </p:timing>
+</p:sld>
+</file>
+
 <file path=ppt/slides/slide8.xml><?xml version="1.0" encoding="utf-8"?>
 <p:sld xmlns:a="http://schemas.openxmlformats.org/drawingml/2006/main" xmlns:r="http://schemas.openxmlformats.org/officeDocument/2006/relationships" xmlns:p="http://schemas.openxmlformats.org/presentationml/2006/main">
   <p:cSld>
@@ -10196,8 +10559,12 @@
           <a:lstStyle/>
           <a:p>
             <a:r>
-              <a:rPr lang="en-US" dirty="0" smtClean="0"/>
-              <a:t>Component of CSS</a:t>
+              <a:rPr lang="en-US" dirty="0"/>
+              <a:t>S</a:t>
+            </a:r>
+            <a:r>
+              <a:rPr lang="en-US" dirty="0" smtClean="0"/>
+              <a:t>elector</a:t>
             </a:r>
             <a:endParaRPr lang="en-US" dirty="0"/>
           </a:p>
@@ -10205,53 +10572,263 @@
       </p:sp>
       <p:sp>
         <p:nvSpPr>
-          <p:cNvPr id="3" name="Content Placeholder 2"/>
-          <p:cNvSpPr>
-            <a:spLocks noGrp="1"/>
-          </p:cNvSpPr>
-          <p:nvPr>
-            <p:ph idx="1"/>
-          </p:nvPr>
-        </p:nvSpPr>
-        <p:spPr/>
-        <p:txBody>
-          <a:bodyPr/>
-          <a:lstStyle/>
-          <a:p>
-            <a:r>
-              <a:rPr lang="en-US" dirty="0" smtClean="0"/>
-              <a:t>Selector</a:t>
-            </a:r>
-          </a:p>
-          <a:p>
-            <a:pPr lvl="1"/>
-            <a:r>
-              <a:rPr lang="en-US" dirty="0" smtClean="0"/>
-              <a:t>Id, class, tag</a:t>
-            </a:r>
-          </a:p>
-          <a:p>
-            <a:r>
-              <a:rPr lang="en-US" dirty="0" smtClean="0"/>
-              <a:t>Declaration</a:t>
-            </a:r>
-          </a:p>
-          <a:p>
-            <a:pPr lvl="1"/>
-            <a:r>
-              <a:rPr lang="en-US" dirty="0" smtClean="0"/>
-              <a:t>Rules</a:t>
-            </a:r>
-          </a:p>
-          <a:p>
+          <p:cNvPr id="4" name="Rectangle 3"/>
+          <p:cNvSpPr/>
+          <p:nvPr/>
+        </p:nvSpPr>
+        <p:spPr>
+          <a:xfrm>
+            <a:off x="4378737" y="2134665"/>
+            <a:ext cx="3987014" cy="2031325"/>
+          </a:xfrm>
+          <a:prstGeom prst="rect">
+            <a:avLst/>
+          </a:prstGeom>
+        </p:spPr>
+        <p:txBody>
+          <a:bodyPr wrap="square">
+            <a:spAutoFit/>
+          </a:bodyPr>
+          <a:lstStyle/>
+          <a:p>
+            <a:r>
+              <a:rPr lang="en-US" dirty="0" smtClean="0"/>
+              <a:t>&lt;body&gt;</a:t>
+            </a:r>
+          </a:p>
+          <a:p>
+            <a:r>
+              <a:rPr lang="en-US" dirty="0"/>
+              <a:t> </a:t>
+            </a:r>
+            <a:r>
+              <a:rPr lang="en-US" dirty="0" smtClean="0"/>
+              <a:t>   &lt;</a:t>
+            </a:r>
+            <a:r>
+              <a:rPr lang="en-US" dirty="0"/>
+              <a:t>div class="container"&gt;</a:t>
+            </a:r>
+            <a:endParaRPr lang="en-US" dirty="0" smtClean="0"/>
+          </a:p>
+          <a:p>
+            <a:r>
+              <a:rPr lang="en-US" dirty="0"/>
+              <a:t> </a:t>
+            </a:r>
+            <a:r>
+              <a:rPr lang="en-US" dirty="0" smtClean="0"/>
+              <a:t>       &lt;div </a:t>
+            </a:r>
+            <a:r>
+              <a:rPr lang="en-US" dirty="0"/>
+              <a:t>id="content"&gt;</a:t>
+            </a:r>
+          </a:p>
+          <a:p>
+            <a:r>
+              <a:rPr lang="en-US" dirty="0"/>
+              <a:t>    </a:t>
+            </a:r>
+            <a:r>
+              <a:rPr lang="en-US" dirty="0" smtClean="0"/>
+              <a:t>    	&lt;</a:t>
+            </a:r>
+            <a:r>
+              <a:rPr lang="en-US" dirty="0"/>
+              <a:t>p&gt;main content&lt;/p</a:t>
+            </a:r>
+            <a:r>
+              <a:rPr lang="en-US" dirty="0" smtClean="0"/>
+              <a:t>&gt;</a:t>
+            </a:r>
+          </a:p>
+          <a:p>
+            <a:r>
+              <a:rPr lang="en-US" dirty="0" smtClean="0"/>
+              <a:t>        &lt;/div&gt;</a:t>
+            </a:r>
             <a:endParaRPr lang="en-US" dirty="0"/>
           </a:p>
-        </p:txBody>
-      </p:sp>
+          <a:p>
+            <a:r>
+              <a:rPr lang="en-US" dirty="0" smtClean="0"/>
+              <a:t>    &lt;</a:t>
+            </a:r>
+            <a:r>
+              <a:rPr lang="en-US" dirty="0"/>
+              <a:t>/div</a:t>
+            </a:r>
+            <a:r>
+              <a:rPr lang="en-US" dirty="0" smtClean="0"/>
+              <a:t>&gt;</a:t>
+            </a:r>
+          </a:p>
+          <a:p>
+            <a:r>
+              <a:rPr lang="en-US" dirty="0" smtClean="0"/>
+              <a:t>&lt;/body&gt;</a:t>
+            </a:r>
+            <a:endParaRPr lang="en-US" dirty="0"/>
+          </a:p>
+        </p:txBody>
+      </p:sp>
+      <p:sp>
+        <p:nvSpPr>
+          <p:cNvPr id="6" name="Rectangle 5"/>
+          <p:cNvSpPr/>
+          <p:nvPr/>
+        </p:nvSpPr>
+        <p:spPr>
+          <a:xfrm>
+            <a:off x="574196" y="2144162"/>
+            <a:ext cx="3804541" cy="3416320"/>
+          </a:xfrm>
+          <a:prstGeom prst="rect">
+            <a:avLst/>
+          </a:prstGeom>
+        </p:spPr>
+        <p:txBody>
+          <a:bodyPr wrap="square">
+            <a:spAutoFit/>
+          </a:bodyPr>
+          <a:lstStyle/>
+          <a:p>
+            <a:r>
+              <a:rPr lang="en-US" dirty="0"/>
+              <a:t>b</a:t>
+            </a:r>
+            <a:r>
+              <a:rPr lang="en-US" dirty="0" smtClean="0"/>
+              <a:t>ody div div {</a:t>
+            </a:r>
+            <a:endParaRPr lang="en-US" dirty="0"/>
+          </a:p>
+          <a:p>
+            <a:r>
+              <a:rPr lang="en-US" dirty="0"/>
+              <a:t>    border: </a:t>
+            </a:r>
+            <a:r>
+              <a:rPr lang="en-US" dirty="0" smtClean="0"/>
+              <a:t>5px </a:t>
+            </a:r>
+            <a:r>
+              <a:rPr lang="en-US" dirty="0"/>
+              <a:t>solid </a:t>
+            </a:r>
+            <a:r>
+              <a:rPr lang="en-US" dirty="0" smtClean="0"/>
+              <a:t>red;</a:t>
+            </a:r>
+            <a:endParaRPr lang="en-US" dirty="0"/>
+          </a:p>
+          <a:p>
+            <a:r>
+              <a:rPr lang="en-US" dirty="0" smtClean="0"/>
+              <a:t>}</a:t>
+            </a:r>
+          </a:p>
+          <a:p>
+            <a:endParaRPr lang="en-US" dirty="0"/>
+          </a:p>
+          <a:p>
+            <a:r>
+              <a:rPr lang="en-US" dirty="0" smtClean="0"/>
+              <a:t>.container &gt; </a:t>
+            </a:r>
+            <a:r>
+              <a:rPr lang="en-US" dirty="0" smtClean="0"/>
+              <a:t>div {</a:t>
+            </a:r>
+          </a:p>
+          <a:p>
+            <a:r>
+              <a:rPr lang="en-US" dirty="0" smtClean="0"/>
+              <a:t>   </a:t>
+            </a:r>
+            <a:r>
+              <a:rPr lang="en-US" dirty="0"/>
+              <a:t>border: 5px solid red</a:t>
+            </a:r>
+            <a:r>
+              <a:rPr lang="en-US" dirty="0" smtClean="0"/>
+              <a:t>;</a:t>
+            </a:r>
+          </a:p>
+          <a:p>
+            <a:r>
+              <a:rPr lang="en-US" dirty="0" smtClean="0"/>
+              <a:t>}</a:t>
+            </a:r>
+          </a:p>
+          <a:p>
+            <a:endParaRPr lang="en-US" dirty="0"/>
+          </a:p>
+          <a:p>
+            <a:r>
+              <a:rPr lang="en-US" dirty="0"/>
+              <a:t>#</a:t>
+            </a:r>
+            <a:r>
+              <a:rPr lang="en-US" dirty="0" smtClean="0"/>
+              <a:t>content </a:t>
+            </a:r>
+            <a:r>
+              <a:rPr lang="en-US" dirty="0"/>
+              <a:t>{</a:t>
+            </a:r>
+          </a:p>
+          <a:p>
+            <a:r>
+              <a:rPr lang="en-US" dirty="0"/>
+              <a:t>   border: 5px solid red</a:t>
+            </a:r>
+            <a:r>
+              <a:rPr lang="en-US" dirty="0" smtClean="0"/>
+              <a:t>;</a:t>
+            </a:r>
+          </a:p>
+          <a:p>
+            <a:r>
+              <a:rPr lang="en-US" dirty="0" smtClean="0"/>
+              <a:t>}</a:t>
+            </a:r>
+            <a:endParaRPr lang="en-US" dirty="0"/>
+          </a:p>
+          <a:p>
+            <a:endParaRPr lang="en-US" dirty="0"/>
+          </a:p>
+        </p:txBody>
+      </p:sp>
+      <p:pic>
+        <p:nvPicPr>
+          <p:cNvPr id="7" name="Picture 6"/>
+          <p:cNvPicPr>
+            <a:picLocks noChangeAspect="1"/>
+          </p:cNvPicPr>
+          <p:nvPr/>
+        </p:nvPicPr>
+        <p:blipFill>
+          <a:blip r:embed="rId2"/>
+          <a:stretch>
+            <a:fillRect/>
+          </a:stretch>
+        </p:blipFill>
+        <p:spPr>
+          <a:xfrm>
+            <a:off x="1176134" y="5388910"/>
+            <a:ext cx="6985000" cy="927100"/>
+          </a:xfrm>
+          <a:prstGeom prst="rect">
+            <a:avLst/>
+          </a:prstGeom>
+        </p:spPr>
+      </p:pic>
     </p:spTree>
     <p:extLst>
       <p:ext uri="{BB962C8B-B14F-4D97-AF65-F5344CB8AC3E}">
-        <p14:creationId xmlns:p14="http://schemas.microsoft.com/office/powerpoint/2010/main" val="2684417700"/>
+        <p14:creationId xmlns:p14="http://schemas.microsoft.com/office/powerpoint/2010/main" val="2952412969"/>
       </p:ext>
     </p:extLst>
   </p:cSld>
@@ -10301,12 +10878,8 @@
           <a:lstStyle/>
           <a:p>
             <a:r>
-              <a:rPr lang="en-US" dirty="0"/>
-              <a:t>S</a:t>
-            </a:r>
-            <a:r>
-              <a:rPr lang="en-US" dirty="0" smtClean="0"/>
-              <a:t>elector</a:t>
+              <a:rPr lang="en-US" dirty="0" smtClean="0"/>
+              <a:t>Declarations</a:t>
             </a:r>
             <a:endParaRPr lang="en-US" dirty="0"/>
           </a:p>
@@ -10314,263 +10887,126 @@
       </p:sp>
       <p:sp>
         <p:nvSpPr>
-          <p:cNvPr id="4" name="Rectangle 3"/>
-          <p:cNvSpPr/>
-          <p:nvPr/>
-        </p:nvSpPr>
-        <p:spPr>
-          <a:xfrm>
-            <a:off x="4378737" y="2134665"/>
-            <a:ext cx="3987014" cy="2031325"/>
-          </a:xfrm>
-          <a:prstGeom prst="rect">
-            <a:avLst/>
-          </a:prstGeom>
-        </p:spPr>
-        <p:txBody>
-          <a:bodyPr wrap="square">
-            <a:spAutoFit/>
+          <p:cNvPr id="3" name="Content Placeholder 2"/>
+          <p:cNvSpPr>
+            <a:spLocks noGrp="1"/>
+          </p:cNvSpPr>
+          <p:nvPr>
+            <p:ph idx="1"/>
+          </p:nvPr>
+        </p:nvSpPr>
+        <p:spPr/>
+        <p:txBody>
+          <a:bodyPr>
+            <a:normAutofit fontScale="92500" lnSpcReduction="20000"/>
           </a:bodyPr>
           <a:lstStyle/>
           <a:p>
             <a:r>
               <a:rPr lang="en-US" dirty="0" smtClean="0"/>
-              <a:t>&lt;body&gt;</a:t>
-            </a:r>
-          </a:p>
-          <a:p>
-            <a:r>
-              <a:rPr lang="en-US" dirty="0"/>
-              <a:t> </a:t>
-            </a:r>
-            <a:r>
-              <a:rPr lang="en-US" dirty="0" smtClean="0"/>
-              <a:t>   &lt;</a:t>
-            </a:r>
-            <a:r>
-              <a:rPr lang="en-US" dirty="0"/>
-              <a:t>div class="container"&gt;</a:t>
+              <a:t>Property</a:t>
+            </a:r>
+          </a:p>
+          <a:p>
+            <a:pPr lvl="1"/>
+            <a:r>
+              <a:rPr lang="en-US" dirty="0" smtClean="0"/>
+              <a:t>Position</a:t>
+            </a:r>
+          </a:p>
+          <a:p>
+            <a:pPr lvl="1"/>
+            <a:r>
+              <a:rPr lang="en-US" dirty="0" smtClean="0"/>
+              <a:t>Box</a:t>
+            </a:r>
+          </a:p>
+          <a:p>
+            <a:pPr lvl="1"/>
+            <a:r>
+              <a:rPr lang="en-US" dirty="0" smtClean="0"/>
+              <a:t>Other</a:t>
+            </a:r>
+          </a:p>
+          <a:p>
+            <a:pPr lvl="2"/>
+            <a:r>
+              <a:rPr lang="en-US" dirty="0" smtClean="0"/>
+              <a:t>Background, text</a:t>
+            </a:r>
+          </a:p>
+          <a:p>
+            <a:r>
+              <a:rPr lang="en-US" dirty="0" smtClean="0"/>
+              <a:t>Value</a:t>
+            </a:r>
+          </a:p>
+          <a:p>
+            <a:pPr lvl="1"/>
+            <a:r>
+              <a:rPr lang="en-US" dirty="0" smtClean="0"/>
+              <a:t>Number</a:t>
+            </a:r>
+          </a:p>
+          <a:p>
+            <a:pPr lvl="1"/>
+            <a:r>
+              <a:rPr lang="en-US" dirty="0" smtClean="0"/>
+              <a:t>Numbe</a:t>
+            </a:r>
+            <a:r>
+              <a:rPr lang="en-US" dirty="0" smtClean="0"/>
+              <a:t>r + </a:t>
+            </a:r>
+            <a:r>
+              <a:rPr lang="en-US" dirty="0" err="1" smtClean="0"/>
+              <a:t>px</a:t>
+            </a:r>
+            <a:r>
+              <a:rPr lang="en-US" dirty="0" smtClean="0"/>
+              <a:t>, </a:t>
+            </a:r>
+            <a:r>
+              <a:rPr lang="en-US" dirty="0" err="1" smtClean="0"/>
+              <a:t>em</a:t>
+            </a:r>
+            <a:endParaRPr lang="en-US" dirty="0"/>
+          </a:p>
+          <a:p>
+            <a:pPr lvl="1"/>
+            <a:r>
+              <a:rPr lang="en-US" dirty="0" smtClean="0"/>
+              <a:t>Percentage</a:t>
+            </a:r>
+          </a:p>
+          <a:p>
+            <a:pPr lvl="1"/>
+            <a:r>
+              <a:rPr lang="en-US" dirty="0" err="1" smtClean="0"/>
+              <a:t>url</a:t>
             </a:r>
             <a:endParaRPr lang="en-US" dirty="0" smtClean="0"/>
           </a:p>
           <a:p>
-            <a:r>
-              <a:rPr lang="en-US" dirty="0"/>
-              <a:t> </a:t>
-            </a:r>
-            <a:r>
-              <a:rPr lang="en-US" dirty="0" smtClean="0"/>
-              <a:t>       &lt;div </a:t>
-            </a:r>
-            <a:r>
-              <a:rPr lang="en-US" dirty="0"/>
-              <a:t>id="content"&gt;</a:t>
-            </a:r>
-          </a:p>
-          <a:p>
-            <a:r>
-              <a:rPr lang="en-US" dirty="0"/>
-              <a:t>    </a:t>
-            </a:r>
-            <a:r>
-              <a:rPr lang="en-US" dirty="0" smtClean="0"/>
-              <a:t>    	&lt;</a:t>
-            </a:r>
-            <a:r>
-              <a:rPr lang="en-US" dirty="0"/>
-              <a:t>p&gt;main content&lt;/p</a:t>
-            </a:r>
-            <a:r>
-              <a:rPr lang="en-US" dirty="0" smtClean="0"/>
-              <a:t>&gt;</a:t>
-            </a:r>
-          </a:p>
-          <a:p>
-            <a:r>
-              <a:rPr lang="en-US" dirty="0" smtClean="0"/>
-              <a:t>        &lt;/div&gt;</a:t>
-            </a:r>
-            <a:endParaRPr lang="en-US" dirty="0"/>
-          </a:p>
-          <a:p>
-            <a:r>
-              <a:rPr lang="en-US" dirty="0" smtClean="0"/>
-              <a:t>    &lt;</a:t>
-            </a:r>
-            <a:r>
-              <a:rPr lang="en-US" dirty="0"/>
-              <a:t>/div</a:t>
-            </a:r>
-            <a:r>
-              <a:rPr lang="en-US" dirty="0" smtClean="0"/>
-              <a:t>&gt;</a:t>
-            </a:r>
-          </a:p>
-          <a:p>
-            <a:r>
-              <a:rPr lang="en-US" dirty="0" smtClean="0"/>
-              <a:t>&lt;/body&gt;</a:t>
-            </a:r>
-            <a:endParaRPr lang="en-US" dirty="0"/>
-          </a:p>
-        </p:txBody>
-      </p:sp>
-      <p:sp>
-        <p:nvSpPr>
-          <p:cNvPr id="6" name="Rectangle 5"/>
-          <p:cNvSpPr/>
-          <p:nvPr/>
-        </p:nvSpPr>
-        <p:spPr>
-          <a:xfrm>
-            <a:off x="574196" y="2144162"/>
-            <a:ext cx="3804541" cy="3416320"/>
-          </a:xfrm>
-          <a:prstGeom prst="rect">
-            <a:avLst/>
-          </a:prstGeom>
-        </p:spPr>
-        <p:txBody>
-          <a:bodyPr wrap="square">
-            <a:spAutoFit/>
-          </a:bodyPr>
-          <a:lstStyle/>
-          <a:p>
-            <a:r>
-              <a:rPr lang="en-US" dirty="0"/>
-              <a:t>b</a:t>
-            </a:r>
-            <a:r>
-              <a:rPr lang="en-US" dirty="0" smtClean="0"/>
-              <a:t>ody div div {</a:t>
-            </a:r>
-            <a:endParaRPr lang="en-US" dirty="0"/>
-          </a:p>
-          <a:p>
-            <a:r>
-              <a:rPr lang="en-US" dirty="0"/>
-              <a:t>    border: </a:t>
-            </a:r>
-            <a:r>
-              <a:rPr lang="en-US" dirty="0" smtClean="0"/>
-              <a:t>5px </a:t>
-            </a:r>
-            <a:r>
-              <a:rPr lang="en-US" dirty="0"/>
-              <a:t>solid </a:t>
-            </a:r>
-            <a:r>
-              <a:rPr lang="en-US" dirty="0" smtClean="0"/>
-              <a:t>red;</a:t>
-            </a:r>
-            <a:endParaRPr lang="en-US" dirty="0"/>
-          </a:p>
-          <a:p>
-            <a:r>
-              <a:rPr lang="en-US" dirty="0" smtClean="0"/>
-              <a:t>}</a:t>
-            </a:r>
-          </a:p>
-          <a:p>
-            <a:endParaRPr lang="en-US" dirty="0"/>
-          </a:p>
-          <a:p>
-            <a:r>
-              <a:rPr lang="en-US" dirty="0"/>
-              <a:t>b</a:t>
-            </a:r>
-            <a:r>
-              <a:rPr lang="en-US" dirty="0" smtClean="0"/>
-              <a:t>ody .container div {</a:t>
-            </a:r>
-          </a:p>
-          <a:p>
-            <a:r>
-              <a:rPr lang="en-US" dirty="0" smtClean="0"/>
-              <a:t>   </a:t>
-            </a:r>
-            <a:r>
-              <a:rPr lang="en-US" dirty="0"/>
-              <a:t>border: 5px solid red</a:t>
-            </a:r>
-            <a:r>
-              <a:rPr lang="en-US" dirty="0" smtClean="0"/>
-              <a:t>;</a:t>
-            </a:r>
-          </a:p>
-          <a:p>
-            <a:r>
-              <a:rPr lang="en-US" dirty="0" smtClean="0"/>
-              <a:t>}</a:t>
-            </a:r>
-          </a:p>
-          <a:p>
-            <a:endParaRPr lang="en-US" dirty="0"/>
-          </a:p>
-          <a:p>
-            <a:r>
-              <a:rPr lang="en-US" dirty="0"/>
-              <a:t>#</a:t>
-            </a:r>
-            <a:r>
-              <a:rPr lang="en-US" dirty="0" smtClean="0"/>
-              <a:t>content </a:t>
-            </a:r>
-            <a:r>
-              <a:rPr lang="en-US" dirty="0"/>
-              <a:t>{</a:t>
-            </a:r>
-          </a:p>
-          <a:p>
-            <a:r>
-              <a:rPr lang="en-US" dirty="0"/>
-              <a:t>   border: 5px solid red</a:t>
-            </a:r>
-            <a:r>
-              <a:rPr lang="en-US" dirty="0" smtClean="0"/>
-              <a:t>;</a:t>
-            </a:r>
-          </a:p>
-          <a:p>
-            <a:r>
-              <a:rPr lang="en-US" dirty="0" smtClean="0"/>
-              <a:t>}</a:t>
-            </a:r>
-            <a:endParaRPr lang="en-US" dirty="0"/>
-          </a:p>
-          <a:p>
-            <a:endParaRPr lang="en-US" dirty="0"/>
-          </a:p>
-        </p:txBody>
-      </p:sp>
-      <p:pic>
-        <p:nvPicPr>
-          <p:cNvPr id="7" name="Picture 6"/>
-          <p:cNvPicPr>
-            <a:picLocks noChangeAspect="1"/>
-          </p:cNvPicPr>
-          <p:nvPr/>
-        </p:nvPicPr>
-        <p:blipFill>
-          <a:blip r:embed="rId2"/>
-          <a:stretch>
-            <a:fillRect/>
-          </a:stretch>
-        </p:blipFill>
-        <p:spPr>
-          <a:xfrm>
-            <a:off x="1176134" y="5388910"/>
-            <a:ext cx="6985000" cy="927100"/>
-          </a:xfrm>
-          <a:prstGeom prst="rect">
-            <a:avLst/>
-          </a:prstGeom>
-        </p:spPr>
-      </p:pic>
+            <a:pPr lvl="1"/>
+            <a:r>
+              <a:rPr lang="en-US" dirty="0" smtClean="0"/>
+              <a:t>Color </a:t>
+            </a:r>
+          </a:p>
+          <a:p>
+            <a:pPr lvl="1"/>
+            <a:r>
+              <a:rPr lang="en-US" dirty="0" smtClean="0"/>
+              <a:t>String</a:t>
+            </a:r>
+          </a:p>
+        </p:txBody>
+      </p:sp>
     </p:spTree>
     <p:extLst>
       <p:ext uri="{BB962C8B-B14F-4D97-AF65-F5344CB8AC3E}">
-        <p14:creationId xmlns:p14="http://schemas.microsoft.com/office/powerpoint/2010/main" val="2952412969"/>
+        <p14:creationId xmlns:p14="http://schemas.microsoft.com/office/powerpoint/2010/main" val="650350762"/>
       </p:ext>
     </p:extLst>
   </p:cSld>

</xml_diff>